<commit_message>
Create org chart app
</commit_message>
<xml_diff>
--- a/utilities/org_chart/src/org_chart_usat_by_dept_responsive_ordered_wrapped_tenure.pptx
+++ b/utilities/org_chart/src/org_chart_usat_by_dept_responsive_ordered_wrapped_tenure.pptx
@@ -4143,6 +4143,221 @@
         <p:spPr>
           <a:xfrm>
             <a:off x="8716295" y="4206240"/>
+            <a:ext cx="3" cy="640072"/>
+          </a:xfrm>
+          <a:prstGeom prst="rect">
+            <a:avLst/>
+          </a:prstGeom>
+          <a:solidFill>
+            <a:srgbClr val="646464"/>
+          </a:solidFill>
+          <a:ln>
+            <a:noFill/>
+          </a:ln>
+        </p:spPr>
+        <p:style>
+          <a:lnRef idx="1">
+            <a:schemeClr val="accent1"/>
+          </a:lnRef>
+          <a:fillRef idx="3">
+            <a:schemeClr val="accent1"/>
+          </a:fillRef>
+          <a:effectRef idx="2">
+            <a:schemeClr val="accent1"/>
+          </a:effectRef>
+          <a:fontRef idx="minor">
+            <a:schemeClr val="lt1"/>
+          </a:fontRef>
+        </p:style>
+        <p:txBody>
+          <a:bodyPr rtlCol="0" anchor="ctr"/>
+          <a:lstStyle/>
+          <a:p>
+            <a:pPr algn="ctr"/>
+          </a:p>
+        </p:txBody>
+      </p:sp>
+      <p:sp>
+        <p:nvSpPr>
+          <p:cNvPr id="9" name="Rectangle 8"/>
+          <p:cNvSpPr/>
+          <p:nvPr/>
+        </p:nvSpPr>
+        <p:spPr>
+          <a:xfrm>
+            <a:off x="5029200" y="4846310"/>
+            <a:ext cx="3687096" cy="3"/>
+          </a:xfrm>
+          <a:prstGeom prst="rect">
+            <a:avLst/>
+          </a:prstGeom>
+          <a:solidFill>
+            <a:srgbClr val="646464"/>
+          </a:solidFill>
+          <a:ln>
+            <a:noFill/>
+          </a:ln>
+        </p:spPr>
+        <p:style>
+          <a:lnRef idx="1">
+            <a:schemeClr val="accent1"/>
+          </a:lnRef>
+          <a:fillRef idx="3">
+            <a:schemeClr val="accent1"/>
+          </a:fillRef>
+          <a:effectRef idx="2">
+            <a:schemeClr val="accent1"/>
+          </a:effectRef>
+          <a:fontRef idx="minor">
+            <a:schemeClr val="lt1"/>
+          </a:fontRef>
+        </p:style>
+        <p:txBody>
+          <a:bodyPr rtlCol="0" anchor="ctr"/>
+          <a:lstStyle/>
+          <a:p>
+            <a:pPr algn="ctr"/>
+          </a:p>
+        </p:txBody>
+      </p:sp>
+      <p:sp>
+        <p:nvSpPr>
+          <p:cNvPr id="10" name="Rectangle 9"/>
+          <p:cNvSpPr/>
+          <p:nvPr/>
+        </p:nvSpPr>
+        <p:spPr>
+          <a:xfrm>
+            <a:off x="5029198" y="4846312"/>
+            <a:ext cx="3" cy="640088"/>
+          </a:xfrm>
+          <a:prstGeom prst="rect">
+            <a:avLst/>
+          </a:prstGeom>
+          <a:solidFill>
+            <a:srgbClr val="646464"/>
+          </a:solidFill>
+          <a:ln>
+            <a:noFill/>
+          </a:ln>
+        </p:spPr>
+        <p:style>
+          <a:lnRef idx="1">
+            <a:schemeClr val="accent1"/>
+          </a:lnRef>
+          <a:fillRef idx="3">
+            <a:schemeClr val="accent1"/>
+          </a:fillRef>
+          <a:effectRef idx="2">
+            <a:schemeClr val="accent1"/>
+          </a:effectRef>
+          <a:fontRef idx="minor">
+            <a:schemeClr val="lt1"/>
+          </a:fontRef>
+        </p:style>
+        <p:txBody>
+          <a:bodyPr rtlCol="0" anchor="ctr"/>
+          <a:lstStyle/>
+          <a:p>
+            <a:pPr algn="ctr"/>
+          </a:p>
+        </p:txBody>
+      </p:sp>
+      <p:sp>
+        <p:nvSpPr>
+          <p:cNvPr id="11" name="Rectangle 10"/>
+          <p:cNvSpPr/>
+          <p:nvPr/>
+        </p:nvSpPr>
+        <p:spPr>
+          <a:xfrm>
+            <a:off x="5029198" y="2011680"/>
+            <a:ext cx="3" cy="640064"/>
+          </a:xfrm>
+          <a:prstGeom prst="rect">
+            <a:avLst/>
+          </a:prstGeom>
+          <a:solidFill>
+            <a:srgbClr val="646464"/>
+          </a:solidFill>
+          <a:ln>
+            <a:noFill/>
+          </a:ln>
+        </p:spPr>
+        <p:style>
+          <a:lnRef idx="1">
+            <a:schemeClr val="accent1"/>
+          </a:lnRef>
+          <a:fillRef idx="3">
+            <a:schemeClr val="accent1"/>
+          </a:fillRef>
+          <a:effectRef idx="2">
+            <a:schemeClr val="accent1"/>
+          </a:effectRef>
+          <a:fontRef idx="minor">
+            <a:schemeClr val="lt1"/>
+          </a:fontRef>
+        </p:style>
+        <p:txBody>
+          <a:bodyPr rtlCol="0" anchor="ctr"/>
+          <a:lstStyle/>
+          <a:p>
+            <a:pPr algn="ctr"/>
+          </a:p>
+        </p:txBody>
+      </p:sp>
+      <p:sp>
+        <p:nvSpPr>
+          <p:cNvPr id="12" name="Rectangle 11"/>
+          <p:cNvSpPr/>
+          <p:nvPr/>
+        </p:nvSpPr>
+        <p:spPr>
+          <a:xfrm>
+            <a:off x="1342103" y="2651742"/>
+            <a:ext cx="3687096" cy="3"/>
+          </a:xfrm>
+          <a:prstGeom prst="rect">
+            <a:avLst/>
+          </a:prstGeom>
+          <a:solidFill>
+            <a:srgbClr val="646464"/>
+          </a:solidFill>
+          <a:ln>
+            <a:noFill/>
+          </a:ln>
+        </p:spPr>
+        <p:style>
+          <a:lnRef idx="1">
+            <a:schemeClr val="accent1"/>
+          </a:lnRef>
+          <a:fillRef idx="3">
+            <a:schemeClr val="accent1"/>
+          </a:fillRef>
+          <a:effectRef idx="2">
+            <a:schemeClr val="accent1"/>
+          </a:effectRef>
+          <a:fontRef idx="minor">
+            <a:schemeClr val="lt1"/>
+          </a:fontRef>
+        </p:style>
+        <p:txBody>
+          <a:bodyPr rtlCol="0" anchor="ctr"/>
+          <a:lstStyle/>
+          <a:p>
+            <a:pPr algn="ctr"/>
+          </a:p>
+        </p:txBody>
+      </p:sp>
+      <p:sp>
+        <p:nvSpPr>
+          <p:cNvPr id="13" name="Rectangle 12"/>
+          <p:cNvSpPr/>
+          <p:nvPr/>
+        </p:nvSpPr>
+        <p:spPr>
+          <a:xfrm>
+            <a:off x="1342101" y="2651744"/>
             <a:ext cx="3" cy="640096"/>
           </a:xfrm>
           <a:prstGeom prst="rect">
@@ -4179,13 +4394,142 @@
       </p:sp>
       <p:sp>
         <p:nvSpPr>
-          <p:cNvPr id="9" name="Rectangle 8"/>
-          <p:cNvSpPr/>
-          <p:nvPr/>
-        </p:nvSpPr>
-        <p:spPr>
-          <a:xfrm>
-            <a:off x="5029200" y="4846334"/>
+          <p:cNvPr id="14" name="Rectangle 13"/>
+          <p:cNvSpPr/>
+          <p:nvPr/>
+        </p:nvSpPr>
+        <p:spPr>
+          <a:xfrm>
+            <a:off x="5029198" y="2011680"/>
+            <a:ext cx="3" cy="640064"/>
+          </a:xfrm>
+          <a:prstGeom prst="rect">
+            <a:avLst/>
+          </a:prstGeom>
+          <a:solidFill>
+            <a:srgbClr val="646464"/>
+          </a:solidFill>
+          <a:ln>
+            <a:noFill/>
+          </a:ln>
+        </p:spPr>
+        <p:style>
+          <a:lnRef idx="1">
+            <a:schemeClr val="accent1"/>
+          </a:lnRef>
+          <a:fillRef idx="3">
+            <a:schemeClr val="accent1"/>
+          </a:fillRef>
+          <a:effectRef idx="2">
+            <a:schemeClr val="accent1"/>
+          </a:effectRef>
+          <a:fontRef idx="minor">
+            <a:schemeClr val="lt1"/>
+          </a:fontRef>
+        </p:style>
+        <p:txBody>
+          <a:bodyPr rtlCol="0" anchor="ctr"/>
+          <a:lstStyle/>
+          <a:p>
+            <a:pPr algn="ctr"/>
+          </a:p>
+        </p:txBody>
+      </p:sp>
+      <p:sp>
+        <p:nvSpPr>
+          <p:cNvPr id="15" name="Rectangle 14"/>
+          <p:cNvSpPr/>
+          <p:nvPr/>
+        </p:nvSpPr>
+        <p:spPr>
+          <a:xfrm>
+            <a:off x="5029198" y="2651744"/>
+            <a:ext cx="3" cy="640096"/>
+          </a:xfrm>
+          <a:prstGeom prst="rect">
+            <a:avLst/>
+          </a:prstGeom>
+          <a:solidFill>
+            <a:srgbClr val="646464"/>
+          </a:solidFill>
+          <a:ln>
+            <a:noFill/>
+          </a:ln>
+        </p:spPr>
+        <p:style>
+          <a:lnRef idx="1">
+            <a:schemeClr val="accent1"/>
+          </a:lnRef>
+          <a:fillRef idx="3">
+            <a:schemeClr val="accent1"/>
+          </a:fillRef>
+          <a:effectRef idx="2">
+            <a:schemeClr val="accent1"/>
+          </a:effectRef>
+          <a:fontRef idx="minor">
+            <a:schemeClr val="lt1"/>
+          </a:fontRef>
+        </p:style>
+        <p:txBody>
+          <a:bodyPr rtlCol="0" anchor="ctr"/>
+          <a:lstStyle/>
+          <a:p>
+            <a:pPr algn="ctr"/>
+          </a:p>
+        </p:txBody>
+      </p:sp>
+      <p:sp>
+        <p:nvSpPr>
+          <p:cNvPr id="16" name="Rectangle 15"/>
+          <p:cNvSpPr/>
+          <p:nvPr/>
+        </p:nvSpPr>
+        <p:spPr>
+          <a:xfrm>
+            <a:off x="5029198" y="2011680"/>
+            <a:ext cx="3" cy="640064"/>
+          </a:xfrm>
+          <a:prstGeom prst="rect">
+            <a:avLst/>
+          </a:prstGeom>
+          <a:solidFill>
+            <a:srgbClr val="646464"/>
+          </a:solidFill>
+          <a:ln>
+            <a:noFill/>
+          </a:ln>
+        </p:spPr>
+        <p:style>
+          <a:lnRef idx="1">
+            <a:schemeClr val="accent1"/>
+          </a:lnRef>
+          <a:fillRef idx="3">
+            <a:schemeClr val="accent1"/>
+          </a:fillRef>
+          <a:effectRef idx="2">
+            <a:schemeClr val="accent1"/>
+          </a:effectRef>
+          <a:fontRef idx="minor">
+            <a:schemeClr val="lt1"/>
+          </a:fontRef>
+        </p:style>
+        <p:txBody>
+          <a:bodyPr rtlCol="0" anchor="ctr"/>
+          <a:lstStyle/>
+          <a:p>
+            <a:pPr algn="ctr"/>
+          </a:p>
+        </p:txBody>
+      </p:sp>
+      <p:sp>
+        <p:nvSpPr>
+          <p:cNvPr id="17" name="Rectangle 16"/>
+          <p:cNvSpPr/>
+          <p:nvPr/>
+        </p:nvSpPr>
+        <p:spPr>
+          <a:xfrm>
+            <a:off x="5029200" y="2651742"/>
             <a:ext cx="3687096" cy="3"/>
           </a:xfrm>
           <a:prstGeom prst="rect">
@@ -4222,358 +4566,14 @@
       </p:sp>
       <p:sp>
         <p:nvSpPr>
-          <p:cNvPr id="10" name="Rectangle 9"/>
-          <p:cNvSpPr/>
-          <p:nvPr/>
-        </p:nvSpPr>
-        <p:spPr>
-          <a:xfrm>
-            <a:off x="5029198" y="4846336"/>
-            <a:ext cx="3" cy="640064"/>
-          </a:xfrm>
-          <a:prstGeom prst="rect">
-            <a:avLst/>
-          </a:prstGeom>
-          <a:solidFill>
-            <a:srgbClr val="646464"/>
-          </a:solidFill>
-          <a:ln>
-            <a:noFill/>
-          </a:ln>
-        </p:spPr>
-        <p:style>
-          <a:lnRef idx="1">
-            <a:schemeClr val="accent1"/>
-          </a:lnRef>
-          <a:fillRef idx="3">
-            <a:schemeClr val="accent1"/>
-          </a:fillRef>
-          <a:effectRef idx="2">
-            <a:schemeClr val="accent1"/>
-          </a:effectRef>
-          <a:fontRef idx="minor">
-            <a:schemeClr val="lt1"/>
-          </a:fontRef>
-        </p:style>
-        <p:txBody>
-          <a:bodyPr rtlCol="0" anchor="ctr"/>
-          <a:lstStyle/>
-          <a:p>
-            <a:pPr algn="ctr"/>
-          </a:p>
-        </p:txBody>
-      </p:sp>
-      <p:sp>
-        <p:nvSpPr>
-          <p:cNvPr id="11" name="Rectangle 10"/>
-          <p:cNvSpPr/>
-          <p:nvPr/>
-        </p:nvSpPr>
-        <p:spPr>
-          <a:xfrm>
-            <a:off x="5029198" y="2011680"/>
+          <p:cNvPr id="18" name="Rectangle 17"/>
+          <p:cNvSpPr/>
+          <p:nvPr/>
+        </p:nvSpPr>
+        <p:spPr>
+          <a:xfrm>
+            <a:off x="8716295" y="2651744"/>
             <a:ext cx="3" cy="640096"/>
-          </a:xfrm>
-          <a:prstGeom prst="rect">
-            <a:avLst/>
-          </a:prstGeom>
-          <a:solidFill>
-            <a:srgbClr val="646464"/>
-          </a:solidFill>
-          <a:ln>
-            <a:noFill/>
-          </a:ln>
-        </p:spPr>
-        <p:style>
-          <a:lnRef idx="1">
-            <a:schemeClr val="accent1"/>
-          </a:lnRef>
-          <a:fillRef idx="3">
-            <a:schemeClr val="accent1"/>
-          </a:fillRef>
-          <a:effectRef idx="2">
-            <a:schemeClr val="accent1"/>
-          </a:effectRef>
-          <a:fontRef idx="minor">
-            <a:schemeClr val="lt1"/>
-          </a:fontRef>
-        </p:style>
-        <p:txBody>
-          <a:bodyPr rtlCol="0" anchor="ctr"/>
-          <a:lstStyle/>
-          <a:p>
-            <a:pPr algn="ctr"/>
-          </a:p>
-        </p:txBody>
-      </p:sp>
-      <p:sp>
-        <p:nvSpPr>
-          <p:cNvPr id="12" name="Rectangle 11"/>
-          <p:cNvSpPr/>
-          <p:nvPr/>
-        </p:nvSpPr>
-        <p:spPr>
-          <a:xfrm>
-            <a:off x="1342103" y="2651774"/>
-            <a:ext cx="3687096" cy="3"/>
-          </a:xfrm>
-          <a:prstGeom prst="rect">
-            <a:avLst/>
-          </a:prstGeom>
-          <a:solidFill>
-            <a:srgbClr val="646464"/>
-          </a:solidFill>
-          <a:ln>
-            <a:noFill/>
-          </a:ln>
-        </p:spPr>
-        <p:style>
-          <a:lnRef idx="1">
-            <a:schemeClr val="accent1"/>
-          </a:lnRef>
-          <a:fillRef idx="3">
-            <a:schemeClr val="accent1"/>
-          </a:fillRef>
-          <a:effectRef idx="2">
-            <a:schemeClr val="accent1"/>
-          </a:effectRef>
-          <a:fontRef idx="minor">
-            <a:schemeClr val="lt1"/>
-          </a:fontRef>
-        </p:style>
-        <p:txBody>
-          <a:bodyPr rtlCol="0" anchor="ctr"/>
-          <a:lstStyle/>
-          <a:p>
-            <a:pPr algn="ctr"/>
-          </a:p>
-        </p:txBody>
-      </p:sp>
-      <p:sp>
-        <p:nvSpPr>
-          <p:cNvPr id="13" name="Rectangle 12"/>
-          <p:cNvSpPr/>
-          <p:nvPr/>
-        </p:nvSpPr>
-        <p:spPr>
-          <a:xfrm>
-            <a:off x="1342101" y="2651776"/>
-            <a:ext cx="3" cy="640064"/>
-          </a:xfrm>
-          <a:prstGeom prst="rect">
-            <a:avLst/>
-          </a:prstGeom>
-          <a:solidFill>
-            <a:srgbClr val="646464"/>
-          </a:solidFill>
-          <a:ln>
-            <a:noFill/>
-          </a:ln>
-        </p:spPr>
-        <p:style>
-          <a:lnRef idx="1">
-            <a:schemeClr val="accent1"/>
-          </a:lnRef>
-          <a:fillRef idx="3">
-            <a:schemeClr val="accent1"/>
-          </a:fillRef>
-          <a:effectRef idx="2">
-            <a:schemeClr val="accent1"/>
-          </a:effectRef>
-          <a:fontRef idx="minor">
-            <a:schemeClr val="lt1"/>
-          </a:fontRef>
-        </p:style>
-        <p:txBody>
-          <a:bodyPr rtlCol="0" anchor="ctr"/>
-          <a:lstStyle/>
-          <a:p>
-            <a:pPr algn="ctr"/>
-          </a:p>
-        </p:txBody>
-      </p:sp>
-      <p:sp>
-        <p:nvSpPr>
-          <p:cNvPr id="14" name="Rectangle 13"/>
-          <p:cNvSpPr/>
-          <p:nvPr/>
-        </p:nvSpPr>
-        <p:spPr>
-          <a:xfrm>
-            <a:off x="5029198" y="2011680"/>
-            <a:ext cx="3" cy="640096"/>
-          </a:xfrm>
-          <a:prstGeom prst="rect">
-            <a:avLst/>
-          </a:prstGeom>
-          <a:solidFill>
-            <a:srgbClr val="646464"/>
-          </a:solidFill>
-          <a:ln>
-            <a:noFill/>
-          </a:ln>
-        </p:spPr>
-        <p:style>
-          <a:lnRef idx="1">
-            <a:schemeClr val="accent1"/>
-          </a:lnRef>
-          <a:fillRef idx="3">
-            <a:schemeClr val="accent1"/>
-          </a:fillRef>
-          <a:effectRef idx="2">
-            <a:schemeClr val="accent1"/>
-          </a:effectRef>
-          <a:fontRef idx="minor">
-            <a:schemeClr val="lt1"/>
-          </a:fontRef>
-        </p:style>
-        <p:txBody>
-          <a:bodyPr rtlCol="0" anchor="ctr"/>
-          <a:lstStyle/>
-          <a:p>
-            <a:pPr algn="ctr"/>
-          </a:p>
-        </p:txBody>
-      </p:sp>
-      <p:sp>
-        <p:nvSpPr>
-          <p:cNvPr id="15" name="Rectangle 14"/>
-          <p:cNvSpPr/>
-          <p:nvPr/>
-        </p:nvSpPr>
-        <p:spPr>
-          <a:xfrm>
-            <a:off x="5029198" y="2651776"/>
-            <a:ext cx="3" cy="640064"/>
-          </a:xfrm>
-          <a:prstGeom prst="rect">
-            <a:avLst/>
-          </a:prstGeom>
-          <a:solidFill>
-            <a:srgbClr val="646464"/>
-          </a:solidFill>
-          <a:ln>
-            <a:noFill/>
-          </a:ln>
-        </p:spPr>
-        <p:style>
-          <a:lnRef idx="1">
-            <a:schemeClr val="accent1"/>
-          </a:lnRef>
-          <a:fillRef idx="3">
-            <a:schemeClr val="accent1"/>
-          </a:fillRef>
-          <a:effectRef idx="2">
-            <a:schemeClr val="accent1"/>
-          </a:effectRef>
-          <a:fontRef idx="minor">
-            <a:schemeClr val="lt1"/>
-          </a:fontRef>
-        </p:style>
-        <p:txBody>
-          <a:bodyPr rtlCol="0" anchor="ctr"/>
-          <a:lstStyle/>
-          <a:p>
-            <a:pPr algn="ctr"/>
-          </a:p>
-        </p:txBody>
-      </p:sp>
-      <p:sp>
-        <p:nvSpPr>
-          <p:cNvPr id="16" name="Rectangle 15"/>
-          <p:cNvSpPr/>
-          <p:nvPr/>
-        </p:nvSpPr>
-        <p:spPr>
-          <a:xfrm>
-            <a:off x="5029198" y="2011680"/>
-            <a:ext cx="3" cy="640096"/>
-          </a:xfrm>
-          <a:prstGeom prst="rect">
-            <a:avLst/>
-          </a:prstGeom>
-          <a:solidFill>
-            <a:srgbClr val="646464"/>
-          </a:solidFill>
-          <a:ln>
-            <a:noFill/>
-          </a:ln>
-        </p:spPr>
-        <p:style>
-          <a:lnRef idx="1">
-            <a:schemeClr val="accent1"/>
-          </a:lnRef>
-          <a:fillRef idx="3">
-            <a:schemeClr val="accent1"/>
-          </a:fillRef>
-          <a:effectRef idx="2">
-            <a:schemeClr val="accent1"/>
-          </a:effectRef>
-          <a:fontRef idx="minor">
-            <a:schemeClr val="lt1"/>
-          </a:fontRef>
-        </p:style>
-        <p:txBody>
-          <a:bodyPr rtlCol="0" anchor="ctr"/>
-          <a:lstStyle/>
-          <a:p>
-            <a:pPr algn="ctr"/>
-          </a:p>
-        </p:txBody>
-      </p:sp>
-      <p:sp>
-        <p:nvSpPr>
-          <p:cNvPr id="17" name="Rectangle 16"/>
-          <p:cNvSpPr/>
-          <p:nvPr/>
-        </p:nvSpPr>
-        <p:spPr>
-          <a:xfrm>
-            <a:off x="5029200" y="2651774"/>
-            <a:ext cx="3687096" cy="3"/>
-          </a:xfrm>
-          <a:prstGeom prst="rect">
-            <a:avLst/>
-          </a:prstGeom>
-          <a:solidFill>
-            <a:srgbClr val="646464"/>
-          </a:solidFill>
-          <a:ln>
-            <a:noFill/>
-          </a:ln>
-        </p:spPr>
-        <p:style>
-          <a:lnRef idx="1">
-            <a:schemeClr val="accent1"/>
-          </a:lnRef>
-          <a:fillRef idx="3">
-            <a:schemeClr val="accent1"/>
-          </a:fillRef>
-          <a:effectRef idx="2">
-            <a:schemeClr val="accent1"/>
-          </a:effectRef>
-          <a:fontRef idx="minor">
-            <a:schemeClr val="lt1"/>
-          </a:fontRef>
-        </p:style>
-        <p:txBody>
-          <a:bodyPr rtlCol="0" anchor="ctr"/>
-          <a:lstStyle/>
-          <a:p>
-            <a:pPr algn="ctr"/>
-          </a:p>
-        </p:txBody>
-      </p:sp>
-      <p:sp>
-        <p:nvSpPr>
-          <p:cNvPr id="18" name="Rectangle 17"/>
-          <p:cNvSpPr/>
-          <p:nvPr/>
-        </p:nvSpPr>
-        <p:spPr>
-          <a:xfrm>
-            <a:off x="8716295" y="2651776"/>
-            <a:ext cx="3" cy="640064"/>
           </a:xfrm>
           <a:prstGeom prst="rect">
             <a:avLst/>
@@ -5425,7 +5425,7 @@
         <p:spPr>
           <a:xfrm>
             <a:off x="6342991" y="4206240"/>
-            <a:ext cx="3" cy="640064"/>
+            <a:ext cx="3" cy="640080"/>
           </a:xfrm>
           <a:prstGeom prst="rect">
             <a:avLst/>
@@ -5467,8 +5467,8 @@
         </p:nvSpPr>
         <p:spPr>
           <a:xfrm>
-            <a:off x="6342991" y="4846304"/>
-            <a:ext cx="3" cy="640096"/>
+            <a:off x="6342991" y="4846320"/>
+            <a:ext cx="3" cy="640080"/>
           </a:xfrm>
           <a:prstGeom prst="rect">
             <a:avLst/>
@@ -5726,7 +5726,7 @@
         <p:spPr>
           <a:xfrm>
             <a:off x="8970577" y="4206240"/>
-            <a:ext cx="3" cy="640080"/>
+            <a:ext cx="3" cy="640096"/>
           </a:xfrm>
           <a:prstGeom prst="rect">
             <a:avLst/>
@@ -5768,8 +5768,8 @@
         </p:nvSpPr>
         <p:spPr>
           <a:xfrm>
-            <a:off x="8970577" y="4846320"/>
-            <a:ext cx="3" cy="640080"/>
+            <a:off x="8970577" y="4846336"/>
+            <a:ext cx="3" cy="640064"/>
           </a:xfrm>
           <a:prstGeom prst="rect">
             <a:avLst/>
@@ -5812,7 +5812,7 @@
         <p:spPr>
           <a:xfrm>
             <a:off x="5029198" y="2011680"/>
-            <a:ext cx="3" cy="640080"/>
+            <a:ext cx="3" cy="640096"/>
           </a:xfrm>
           <a:prstGeom prst="rect">
             <a:avLst/>
@@ -5854,7 +5854,7 @@
         </p:nvSpPr>
         <p:spPr>
           <a:xfrm>
-            <a:off x="1087820" y="2651758"/>
+            <a:off x="1087820" y="2651774"/>
             <a:ext cx="3941379" cy="3"/>
           </a:xfrm>
           <a:prstGeom prst="rect">
@@ -5897,8 +5897,8 @@
         </p:nvSpPr>
         <p:spPr>
           <a:xfrm>
-            <a:off x="1087819" y="2651760"/>
-            <a:ext cx="3" cy="640080"/>
+            <a:off x="1087819" y="2651776"/>
+            <a:ext cx="3" cy="640064"/>
           </a:xfrm>
           <a:prstGeom prst="rect">
             <a:avLst/>
@@ -5941,7 +5941,7 @@
         <p:spPr>
           <a:xfrm>
             <a:off x="5029198" y="2011680"/>
-            <a:ext cx="3" cy="640080"/>
+            <a:ext cx="3" cy="640096"/>
           </a:xfrm>
           <a:prstGeom prst="rect">
             <a:avLst/>
@@ -5983,7 +5983,7 @@
         </p:nvSpPr>
         <p:spPr>
           <a:xfrm>
-            <a:off x="3715406" y="2651758"/>
+            <a:off x="3715406" y="2651774"/>
             <a:ext cx="1313793" cy="3"/>
           </a:xfrm>
           <a:prstGeom prst="rect">
@@ -6026,8 +6026,8 @@
         </p:nvSpPr>
         <p:spPr>
           <a:xfrm>
-            <a:off x="3715405" y="2651760"/>
-            <a:ext cx="3" cy="640080"/>
+            <a:off x="3715405" y="2651776"/>
+            <a:ext cx="3" cy="640064"/>
           </a:xfrm>
           <a:prstGeom prst="rect">
             <a:avLst/>
@@ -6070,7 +6070,7 @@
         <p:spPr>
           <a:xfrm>
             <a:off x="5029198" y="2011680"/>
-            <a:ext cx="3" cy="640080"/>
+            <a:ext cx="3" cy="640096"/>
           </a:xfrm>
           <a:prstGeom prst="rect">
             <a:avLst/>
@@ -6112,7 +6112,7 @@
         </p:nvSpPr>
         <p:spPr>
           <a:xfrm>
-            <a:off x="5029200" y="2651758"/>
+            <a:off x="5029200" y="2651774"/>
             <a:ext cx="1313793" cy="3"/>
           </a:xfrm>
           <a:prstGeom prst="rect">
@@ -6155,8 +6155,8 @@
         </p:nvSpPr>
         <p:spPr>
           <a:xfrm>
-            <a:off x="6342991" y="2651760"/>
-            <a:ext cx="3" cy="640080"/>
+            <a:off x="6342991" y="2651776"/>
+            <a:ext cx="3" cy="640064"/>
           </a:xfrm>
           <a:prstGeom prst="rect">
             <a:avLst/>
@@ -6199,7 +6199,7 @@
         <p:spPr>
           <a:xfrm>
             <a:off x="5029198" y="2011680"/>
-            <a:ext cx="3" cy="640080"/>
+            <a:ext cx="3" cy="640096"/>
           </a:xfrm>
           <a:prstGeom prst="rect">
             <a:avLst/>
@@ -6241,7 +6241,7 @@
         </p:nvSpPr>
         <p:spPr>
           <a:xfrm>
-            <a:off x="5029200" y="2651758"/>
+            <a:off x="5029200" y="2651774"/>
             <a:ext cx="3941379" cy="3"/>
           </a:xfrm>
           <a:prstGeom prst="rect">
@@ -6284,8 +6284,8 @@
         </p:nvSpPr>
         <p:spPr>
           <a:xfrm>
-            <a:off x="8970577" y="2651760"/>
-            <a:ext cx="3" cy="640080"/>
+            <a:off x="8970577" y="2651776"/>
+            <a:ext cx="3" cy="640064"/>
           </a:xfrm>
           <a:prstGeom prst="rect">
             <a:avLst/>
@@ -7059,7 +7059,7 @@
         <p:spPr>
           <a:xfrm>
             <a:off x="5029198" y="2011680"/>
-            <a:ext cx="3" cy="640072"/>
+            <a:ext cx="3" cy="640064"/>
           </a:xfrm>
           <a:prstGeom prst="rect">
             <a:avLst/>
@@ -7101,7 +7101,7 @@
         </p:nvSpPr>
         <p:spPr>
           <a:xfrm>
-            <a:off x="1005840" y="2651750"/>
+            <a:off x="1005840" y="2651742"/>
             <a:ext cx="4023360" cy="3"/>
           </a:xfrm>
           <a:prstGeom prst="rect">
@@ -7144,8 +7144,8 @@
         </p:nvSpPr>
         <p:spPr>
           <a:xfrm>
-            <a:off x="1005838" y="2651752"/>
-            <a:ext cx="3" cy="640088"/>
+            <a:off x="1005838" y="2651744"/>
+            <a:ext cx="3" cy="640096"/>
           </a:xfrm>
           <a:prstGeom prst="rect">
             <a:avLst/>
@@ -7188,7 +7188,7 @@
         <p:spPr>
           <a:xfrm>
             <a:off x="5029198" y="2011680"/>
-            <a:ext cx="3" cy="640072"/>
+            <a:ext cx="3" cy="640064"/>
           </a:xfrm>
           <a:prstGeom prst="rect">
             <a:avLst/>
@@ -7230,7 +7230,7 @@
         </p:nvSpPr>
         <p:spPr>
           <a:xfrm>
-            <a:off x="2615184" y="2651750"/>
+            <a:off x="2615184" y="2651742"/>
             <a:ext cx="2414016" cy="3"/>
           </a:xfrm>
           <a:prstGeom prst="rect">
@@ -7273,8 +7273,8 @@
         </p:nvSpPr>
         <p:spPr>
           <a:xfrm>
-            <a:off x="2615182" y="2651752"/>
-            <a:ext cx="3" cy="640088"/>
+            <a:off x="2615182" y="2651744"/>
+            <a:ext cx="3" cy="640096"/>
           </a:xfrm>
           <a:prstGeom prst="rect">
             <a:avLst/>
@@ -7317,7 +7317,7 @@
         <p:spPr>
           <a:xfrm>
             <a:off x="5029198" y="2011680"/>
-            <a:ext cx="3" cy="640072"/>
+            <a:ext cx="3" cy="640064"/>
           </a:xfrm>
           <a:prstGeom prst="rect">
             <a:avLst/>
@@ -7359,7 +7359,7 @@
         </p:nvSpPr>
         <p:spPr>
           <a:xfrm>
-            <a:off x="4224528" y="2651750"/>
+            <a:off x="4224528" y="2651742"/>
             <a:ext cx="804672" cy="3"/>
           </a:xfrm>
           <a:prstGeom prst="rect">
@@ -7402,8 +7402,8 @@
         </p:nvSpPr>
         <p:spPr>
           <a:xfrm>
-            <a:off x="4224526" y="2651752"/>
-            <a:ext cx="3" cy="640088"/>
+            <a:off x="4224526" y="2651744"/>
+            <a:ext cx="3" cy="640096"/>
           </a:xfrm>
           <a:prstGeom prst="rect">
             <a:avLst/>
@@ -7446,7 +7446,7 @@
         <p:spPr>
           <a:xfrm>
             <a:off x="5029198" y="2011680"/>
-            <a:ext cx="3" cy="640072"/>
+            <a:ext cx="3" cy="640064"/>
           </a:xfrm>
           <a:prstGeom prst="rect">
             <a:avLst/>
@@ -7488,7 +7488,7 @@
         </p:nvSpPr>
         <p:spPr>
           <a:xfrm>
-            <a:off x="5029200" y="2651750"/>
+            <a:off x="5029200" y="2651742"/>
             <a:ext cx="804671" cy="3"/>
           </a:xfrm>
           <a:prstGeom prst="rect">
@@ -7531,8 +7531,8 @@
         </p:nvSpPr>
         <p:spPr>
           <a:xfrm>
-            <a:off x="5833870" y="2651752"/>
-            <a:ext cx="3" cy="640088"/>
+            <a:off x="5833870" y="2651744"/>
+            <a:ext cx="3" cy="640096"/>
           </a:xfrm>
           <a:prstGeom prst="rect">
             <a:avLst/>
@@ -7575,7 +7575,7 @@
         <p:spPr>
           <a:xfrm>
             <a:off x="5029198" y="2011680"/>
-            <a:ext cx="3" cy="640072"/>
+            <a:ext cx="3" cy="640064"/>
           </a:xfrm>
           <a:prstGeom prst="rect">
             <a:avLst/>
@@ -7617,7 +7617,7 @@
         </p:nvSpPr>
         <p:spPr>
           <a:xfrm>
-            <a:off x="5029200" y="2651750"/>
+            <a:off x="5029200" y="2651742"/>
             <a:ext cx="2414015" cy="3"/>
           </a:xfrm>
           <a:prstGeom prst="rect">
@@ -7660,8 +7660,8 @@
         </p:nvSpPr>
         <p:spPr>
           <a:xfrm>
-            <a:off x="7443214" y="2651752"/>
-            <a:ext cx="3" cy="640088"/>
+            <a:off x="7443214" y="2651744"/>
+            <a:ext cx="3" cy="640096"/>
           </a:xfrm>
           <a:prstGeom prst="rect">
             <a:avLst/>
@@ -7704,7 +7704,7 @@
         <p:spPr>
           <a:xfrm>
             <a:off x="5029198" y="2011680"/>
-            <a:ext cx="3" cy="640072"/>
+            <a:ext cx="3" cy="640064"/>
           </a:xfrm>
           <a:prstGeom prst="rect">
             <a:avLst/>
@@ -7746,7 +7746,7 @@
         </p:nvSpPr>
         <p:spPr>
           <a:xfrm>
-            <a:off x="5029200" y="2651750"/>
+            <a:off x="5029200" y="2651742"/>
             <a:ext cx="4023360" cy="3"/>
           </a:xfrm>
           <a:prstGeom prst="rect">
@@ -7789,8 +7789,8 @@
         </p:nvSpPr>
         <p:spPr>
           <a:xfrm>
-            <a:off x="9052558" y="2651752"/>
-            <a:ext cx="3" cy="640088"/>
+            <a:off x="9052558" y="2651744"/>
+            <a:ext cx="3" cy="640096"/>
           </a:xfrm>
           <a:prstGeom prst="rect">
             <a:avLst/>
@@ -7833,7 +7833,7 @@
         <p:spPr>
           <a:xfrm>
             <a:off x="5029198" y="2011680"/>
-            <a:ext cx="3" cy="1737352"/>
+            <a:ext cx="3" cy="1737344"/>
           </a:xfrm>
           <a:prstGeom prst="rect">
             <a:avLst/>
@@ -7875,8 +7875,8 @@
         </p:nvSpPr>
         <p:spPr>
           <a:xfrm>
-            <a:off x="5029198" y="3749032"/>
-            <a:ext cx="3" cy="1737368"/>
+            <a:off x="5029198" y="3749024"/>
+            <a:ext cx="3" cy="1737376"/>
           </a:xfrm>
           <a:prstGeom prst="rect">
             <a:avLst/>
@@ -8494,7 +8494,7 @@
         <p:spPr>
           <a:xfrm>
             <a:off x="3185650" y="4206240"/>
-            <a:ext cx="3" cy="640072"/>
+            <a:ext cx="3" cy="640080"/>
           </a:xfrm>
           <a:prstGeom prst="rect">
             <a:avLst/>
@@ -8536,7 +8536,7 @@
         </p:nvSpPr>
         <p:spPr>
           <a:xfrm>
-            <a:off x="1342103" y="4846310"/>
+            <a:off x="1342103" y="4846318"/>
             <a:ext cx="1843548" cy="3"/>
           </a:xfrm>
           <a:prstGeom prst="rect">
@@ -8579,8 +8579,8 @@
         </p:nvSpPr>
         <p:spPr>
           <a:xfrm>
-            <a:off x="1342101" y="4846312"/>
-            <a:ext cx="3" cy="640088"/>
+            <a:off x="1342101" y="4846320"/>
+            <a:ext cx="3" cy="640080"/>
           </a:xfrm>
           <a:prstGeom prst="rect">
             <a:avLst/>
@@ -8623,7 +8623,7 @@
         <p:spPr>
           <a:xfrm>
             <a:off x="3185650" y="4206240"/>
-            <a:ext cx="3" cy="640072"/>
+            <a:ext cx="3" cy="640080"/>
           </a:xfrm>
           <a:prstGeom prst="rect">
             <a:avLst/>
@@ -8665,7 +8665,7 @@
         </p:nvSpPr>
         <p:spPr>
           <a:xfrm>
-            <a:off x="3185651" y="4846310"/>
+            <a:off x="3185651" y="4846318"/>
             <a:ext cx="1843548" cy="3"/>
           </a:xfrm>
           <a:prstGeom prst="rect">
@@ -8708,8 +8708,8 @@
         </p:nvSpPr>
         <p:spPr>
           <a:xfrm>
-            <a:off x="5029198" y="4846312"/>
-            <a:ext cx="3" cy="640088"/>
+            <a:off x="5029198" y="4846320"/>
+            <a:ext cx="3" cy="640080"/>
           </a:xfrm>
           <a:prstGeom prst="rect">
             <a:avLst/>
@@ -8752,7 +8752,7 @@
         <p:spPr>
           <a:xfrm>
             <a:off x="3185650" y="4206240"/>
-            <a:ext cx="3" cy="640072"/>
+            <a:ext cx="3" cy="640080"/>
           </a:xfrm>
           <a:prstGeom prst="rect">
             <a:avLst/>
@@ -8794,7 +8794,7 @@
         </p:nvSpPr>
         <p:spPr>
           <a:xfrm>
-            <a:off x="3185651" y="4846310"/>
+            <a:off x="3185651" y="4846318"/>
             <a:ext cx="5530645" cy="3"/>
           </a:xfrm>
           <a:prstGeom prst="rect">
@@ -8837,8 +8837,8 @@
         </p:nvSpPr>
         <p:spPr>
           <a:xfrm>
-            <a:off x="8716295" y="4846312"/>
-            <a:ext cx="3" cy="640088"/>
+            <a:off x="8716295" y="4846320"/>
+            <a:ext cx="3" cy="640080"/>
           </a:xfrm>
           <a:prstGeom prst="rect">
             <a:avLst/>
@@ -8881,6 +8881,92 @@
         <p:spPr>
           <a:xfrm>
             <a:off x="5029198" y="2011680"/>
+            <a:ext cx="3" cy="640064"/>
+          </a:xfrm>
+          <a:prstGeom prst="rect">
+            <a:avLst/>
+          </a:prstGeom>
+          <a:solidFill>
+            <a:srgbClr val="646464"/>
+          </a:solidFill>
+          <a:ln>
+            <a:noFill/>
+          </a:ln>
+        </p:spPr>
+        <p:style>
+          <a:lnRef idx="1">
+            <a:schemeClr val="accent1"/>
+          </a:lnRef>
+          <a:fillRef idx="3">
+            <a:schemeClr val="accent1"/>
+          </a:fillRef>
+          <a:effectRef idx="2">
+            <a:schemeClr val="accent1"/>
+          </a:effectRef>
+          <a:fontRef idx="minor">
+            <a:schemeClr val="lt1"/>
+          </a:fontRef>
+        </p:style>
+        <p:txBody>
+          <a:bodyPr rtlCol="0" anchor="ctr"/>
+          <a:lstStyle/>
+          <a:p>
+            <a:pPr algn="ctr"/>
+          </a:p>
+        </p:txBody>
+      </p:sp>
+      <p:sp>
+        <p:nvSpPr>
+          <p:cNvPr id="19" name="Rectangle 18"/>
+          <p:cNvSpPr/>
+          <p:nvPr/>
+        </p:nvSpPr>
+        <p:spPr>
+          <a:xfrm>
+            <a:off x="3185651" y="2651742"/>
+            <a:ext cx="1843548" cy="3"/>
+          </a:xfrm>
+          <a:prstGeom prst="rect">
+            <a:avLst/>
+          </a:prstGeom>
+          <a:solidFill>
+            <a:srgbClr val="646464"/>
+          </a:solidFill>
+          <a:ln>
+            <a:noFill/>
+          </a:ln>
+        </p:spPr>
+        <p:style>
+          <a:lnRef idx="1">
+            <a:schemeClr val="accent1"/>
+          </a:lnRef>
+          <a:fillRef idx="3">
+            <a:schemeClr val="accent1"/>
+          </a:fillRef>
+          <a:effectRef idx="2">
+            <a:schemeClr val="accent1"/>
+          </a:effectRef>
+          <a:fontRef idx="minor">
+            <a:schemeClr val="lt1"/>
+          </a:fontRef>
+        </p:style>
+        <p:txBody>
+          <a:bodyPr rtlCol="0" anchor="ctr"/>
+          <a:lstStyle/>
+          <a:p>
+            <a:pPr algn="ctr"/>
+          </a:p>
+        </p:txBody>
+      </p:sp>
+      <p:sp>
+        <p:nvSpPr>
+          <p:cNvPr id="20" name="Rectangle 19"/>
+          <p:cNvSpPr/>
+          <p:nvPr/>
+        </p:nvSpPr>
+        <p:spPr>
+          <a:xfrm>
+            <a:off x="3185650" y="2651744"/>
             <a:ext cx="3" cy="640096"/>
           </a:xfrm>
           <a:prstGeom prst="rect">
@@ -8917,13 +9003,56 @@
       </p:sp>
       <p:sp>
         <p:nvSpPr>
-          <p:cNvPr id="19" name="Rectangle 18"/>
-          <p:cNvSpPr/>
-          <p:nvPr/>
-        </p:nvSpPr>
-        <p:spPr>
-          <a:xfrm>
-            <a:off x="3185651" y="2651774"/>
+          <p:cNvPr id="21" name="Rectangle 20"/>
+          <p:cNvSpPr/>
+          <p:nvPr/>
+        </p:nvSpPr>
+        <p:spPr>
+          <a:xfrm>
+            <a:off x="5029198" y="2011680"/>
+            <a:ext cx="3" cy="640064"/>
+          </a:xfrm>
+          <a:prstGeom prst="rect">
+            <a:avLst/>
+          </a:prstGeom>
+          <a:solidFill>
+            <a:srgbClr val="646464"/>
+          </a:solidFill>
+          <a:ln>
+            <a:noFill/>
+          </a:ln>
+        </p:spPr>
+        <p:style>
+          <a:lnRef idx="1">
+            <a:schemeClr val="accent1"/>
+          </a:lnRef>
+          <a:fillRef idx="3">
+            <a:schemeClr val="accent1"/>
+          </a:fillRef>
+          <a:effectRef idx="2">
+            <a:schemeClr val="accent1"/>
+          </a:effectRef>
+          <a:fontRef idx="minor">
+            <a:schemeClr val="lt1"/>
+          </a:fontRef>
+        </p:style>
+        <p:txBody>
+          <a:bodyPr rtlCol="0" anchor="ctr"/>
+          <a:lstStyle/>
+          <a:p>
+            <a:pPr algn="ctr"/>
+          </a:p>
+        </p:txBody>
+      </p:sp>
+      <p:sp>
+        <p:nvSpPr>
+          <p:cNvPr id="22" name="Rectangle 21"/>
+          <p:cNvSpPr/>
+          <p:nvPr/>
+        </p:nvSpPr>
+        <p:spPr>
+          <a:xfrm>
+            <a:off x="5029200" y="2651742"/>
             <a:ext cx="1843548" cy="3"/>
           </a:xfrm>
           <a:prstGeom prst="rect">
@@ -8960,143 +9089,14 @@
       </p:sp>
       <p:sp>
         <p:nvSpPr>
-          <p:cNvPr id="20" name="Rectangle 19"/>
-          <p:cNvSpPr/>
-          <p:nvPr/>
-        </p:nvSpPr>
-        <p:spPr>
-          <a:xfrm>
-            <a:off x="3185650" y="2651776"/>
-            <a:ext cx="3" cy="640064"/>
-          </a:xfrm>
-          <a:prstGeom prst="rect">
-            <a:avLst/>
-          </a:prstGeom>
-          <a:solidFill>
-            <a:srgbClr val="646464"/>
-          </a:solidFill>
-          <a:ln>
-            <a:noFill/>
-          </a:ln>
-        </p:spPr>
-        <p:style>
-          <a:lnRef idx="1">
-            <a:schemeClr val="accent1"/>
-          </a:lnRef>
-          <a:fillRef idx="3">
-            <a:schemeClr val="accent1"/>
-          </a:fillRef>
-          <a:effectRef idx="2">
-            <a:schemeClr val="accent1"/>
-          </a:effectRef>
-          <a:fontRef idx="minor">
-            <a:schemeClr val="lt1"/>
-          </a:fontRef>
-        </p:style>
-        <p:txBody>
-          <a:bodyPr rtlCol="0" anchor="ctr"/>
-          <a:lstStyle/>
-          <a:p>
-            <a:pPr algn="ctr"/>
-          </a:p>
-        </p:txBody>
-      </p:sp>
-      <p:sp>
-        <p:nvSpPr>
-          <p:cNvPr id="21" name="Rectangle 20"/>
-          <p:cNvSpPr/>
-          <p:nvPr/>
-        </p:nvSpPr>
-        <p:spPr>
-          <a:xfrm>
-            <a:off x="5029198" y="2011680"/>
+          <p:cNvPr id="23" name="Rectangle 22"/>
+          <p:cNvSpPr/>
+          <p:nvPr/>
+        </p:nvSpPr>
+        <p:spPr>
+          <a:xfrm>
+            <a:off x="6872746" y="2651744"/>
             <a:ext cx="3" cy="640096"/>
-          </a:xfrm>
-          <a:prstGeom prst="rect">
-            <a:avLst/>
-          </a:prstGeom>
-          <a:solidFill>
-            <a:srgbClr val="646464"/>
-          </a:solidFill>
-          <a:ln>
-            <a:noFill/>
-          </a:ln>
-        </p:spPr>
-        <p:style>
-          <a:lnRef idx="1">
-            <a:schemeClr val="accent1"/>
-          </a:lnRef>
-          <a:fillRef idx="3">
-            <a:schemeClr val="accent1"/>
-          </a:fillRef>
-          <a:effectRef idx="2">
-            <a:schemeClr val="accent1"/>
-          </a:effectRef>
-          <a:fontRef idx="minor">
-            <a:schemeClr val="lt1"/>
-          </a:fontRef>
-        </p:style>
-        <p:txBody>
-          <a:bodyPr rtlCol="0" anchor="ctr"/>
-          <a:lstStyle/>
-          <a:p>
-            <a:pPr algn="ctr"/>
-          </a:p>
-        </p:txBody>
-      </p:sp>
-      <p:sp>
-        <p:nvSpPr>
-          <p:cNvPr id="22" name="Rectangle 21"/>
-          <p:cNvSpPr/>
-          <p:nvPr/>
-        </p:nvSpPr>
-        <p:spPr>
-          <a:xfrm>
-            <a:off x="5029200" y="2651774"/>
-            <a:ext cx="1843548" cy="3"/>
-          </a:xfrm>
-          <a:prstGeom prst="rect">
-            <a:avLst/>
-          </a:prstGeom>
-          <a:solidFill>
-            <a:srgbClr val="646464"/>
-          </a:solidFill>
-          <a:ln>
-            <a:noFill/>
-          </a:ln>
-        </p:spPr>
-        <p:style>
-          <a:lnRef idx="1">
-            <a:schemeClr val="accent1"/>
-          </a:lnRef>
-          <a:fillRef idx="3">
-            <a:schemeClr val="accent1"/>
-          </a:fillRef>
-          <a:effectRef idx="2">
-            <a:schemeClr val="accent1"/>
-          </a:effectRef>
-          <a:fontRef idx="minor">
-            <a:schemeClr val="lt1"/>
-          </a:fontRef>
-        </p:style>
-        <p:txBody>
-          <a:bodyPr rtlCol="0" anchor="ctr"/>
-          <a:lstStyle/>
-          <a:p>
-            <a:pPr algn="ctr"/>
-          </a:p>
-        </p:txBody>
-      </p:sp>
-      <p:sp>
-        <p:nvSpPr>
-          <p:cNvPr id="23" name="Rectangle 22"/>
-          <p:cNvSpPr/>
-          <p:nvPr/>
-        </p:nvSpPr>
-        <p:spPr>
-          <a:xfrm>
-            <a:off x="6872746" y="2651776"/>
-            <a:ext cx="3" cy="640064"/>
           </a:xfrm>
           <a:prstGeom prst="rect">
             <a:avLst/>
@@ -9558,7 +9558,7 @@
         <p:spPr>
           <a:xfrm>
             <a:off x="5029198" y="2011680"/>
-            <a:ext cx="3" cy="640088"/>
+            <a:ext cx="3" cy="640064"/>
           </a:xfrm>
           <a:prstGeom prst="rect">
             <a:avLst/>
@@ -9600,7 +9600,7 @@
         </p:nvSpPr>
         <p:spPr>
           <a:xfrm>
-            <a:off x="1342103" y="2651766"/>
+            <a:off x="1342103" y="2651742"/>
             <a:ext cx="3687096" cy="3"/>
           </a:xfrm>
           <a:prstGeom prst="rect">
@@ -9643,8 +9643,8 @@
         </p:nvSpPr>
         <p:spPr>
           <a:xfrm>
-            <a:off x="1342101" y="2651768"/>
-            <a:ext cx="3" cy="640072"/>
+            <a:off x="1342101" y="2651744"/>
+            <a:ext cx="3" cy="640096"/>
           </a:xfrm>
           <a:prstGeom prst="rect">
             <a:avLst/>
@@ -9687,7 +9687,7 @@
         <p:spPr>
           <a:xfrm>
             <a:off x="5029198" y="2011680"/>
-            <a:ext cx="3" cy="640088"/>
+            <a:ext cx="3" cy="640064"/>
           </a:xfrm>
           <a:prstGeom prst="rect">
             <a:avLst/>
@@ -9729,8 +9729,8 @@
         </p:nvSpPr>
         <p:spPr>
           <a:xfrm>
-            <a:off x="5029198" y="2651768"/>
-            <a:ext cx="3" cy="640072"/>
+            <a:off x="5029198" y="2651744"/>
+            <a:ext cx="3" cy="640096"/>
           </a:xfrm>
           <a:prstGeom prst="rect">
             <a:avLst/>
@@ -9773,7 +9773,7 @@
         <p:spPr>
           <a:xfrm>
             <a:off x="5029198" y="2011680"/>
-            <a:ext cx="3" cy="640088"/>
+            <a:ext cx="3" cy="640064"/>
           </a:xfrm>
           <a:prstGeom prst="rect">
             <a:avLst/>
@@ -9815,7 +9815,7 @@
         </p:nvSpPr>
         <p:spPr>
           <a:xfrm>
-            <a:off x="5029200" y="2651766"/>
+            <a:off x="5029200" y="2651742"/>
             <a:ext cx="3687096" cy="3"/>
           </a:xfrm>
           <a:prstGeom prst="rect">
@@ -9858,8 +9858,8 @@
         </p:nvSpPr>
         <p:spPr>
           <a:xfrm>
-            <a:off x="8716295" y="2651768"/>
-            <a:ext cx="3" cy="640072"/>
+            <a:off x="8716295" y="2651744"/>
+            <a:ext cx="3" cy="640096"/>
           </a:xfrm>
           <a:prstGeom prst="rect">
             <a:avLst/>
@@ -10399,7 +10399,7 @@
         <p:spPr>
           <a:xfrm>
             <a:off x="5029198" y="2011680"/>
-            <a:ext cx="3" cy="640096"/>
+            <a:ext cx="3" cy="640080"/>
           </a:xfrm>
           <a:prstGeom prst="rect">
             <a:avLst/>
@@ -10441,7 +10441,7 @@
         </p:nvSpPr>
         <p:spPr>
           <a:xfrm>
-            <a:off x="1087820" y="2651774"/>
+            <a:off x="1087820" y="2651758"/>
             <a:ext cx="3941379" cy="3"/>
           </a:xfrm>
           <a:prstGeom prst="rect">
@@ -10484,8 +10484,8 @@
         </p:nvSpPr>
         <p:spPr>
           <a:xfrm>
-            <a:off x="1087819" y="2651776"/>
-            <a:ext cx="3" cy="640064"/>
+            <a:off x="1087819" y="2651760"/>
+            <a:ext cx="3" cy="640080"/>
           </a:xfrm>
           <a:prstGeom prst="rect">
             <a:avLst/>
@@ -10528,7 +10528,7 @@
         <p:spPr>
           <a:xfrm>
             <a:off x="5029198" y="2011680"/>
-            <a:ext cx="3" cy="640096"/>
+            <a:ext cx="3" cy="640080"/>
           </a:xfrm>
           <a:prstGeom prst="rect">
             <a:avLst/>
@@ -10570,7 +10570,7 @@
         </p:nvSpPr>
         <p:spPr>
           <a:xfrm>
-            <a:off x="3715406" y="2651774"/>
+            <a:off x="3715406" y="2651758"/>
             <a:ext cx="1313793" cy="3"/>
           </a:xfrm>
           <a:prstGeom prst="rect">
@@ -10613,8 +10613,8 @@
         </p:nvSpPr>
         <p:spPr>
           <a:xfrm>
-            <a:off x="3715405" y="2651776"/>
-            <a:ext cx="3" cy="640064"/>
+            <a:off x="3715405" y="2651760"/>
+            <a:ext cx="3" cy="640080"/>
           </a:xfrm>
           <a:prstGeom prst="rect">
             <a:avLst/>
@@ -10657,7 +10657,7 @@
         <p:spPr>
           <a:xfrm>
             <a:off x="5029198" y="2011680"/>
-            <a:ext cx="3" cy="640096"/>
+            <a:ext cx="3" cy="640080"/>
           </a:xfrm>
           <a:prstGeom prst="rect">
             <a:avLst/>
@@ -10699,7 +10699,7 @@
         </p:nvSpPr>
         <p:spPr>
           <a:xfrm>
-            <a:off x="5029200" y="2651774"/>
+            <a:off x="5029200" y="2651758"/>
             <a:ext cx="1313793" cy="3"/>
           </a:xfrm>
           <a:prstGeom prst="rect">
@@ -10742,8 +10742,8 @@
         </p:nvSpPr>
         <p:spPr>
           <a:xfrm>
-            <a:off x="6342991" y="2651776"/>
-            <a:ext cx="3" cy="640064"/>
+            <a:off x="6342991" y="2651760"/>
+            <a:ext cx="3" cy="640080"/>
           </a:xfrm>
           <a:prstGeom prst="rect">
             <a:avLst/>
@@ -10786,7 +10786,7 @@
         <p:spPr>
           <a:xfrm>
             <a:off x="5029198" y="2011680"/>
-            <a:ext cx="3" cy="640096"/>
+            <a:ext cx="3" cy="640080"/>
           </a:xfrm>
           <a:prstGeom prst="rect">
             <a:avLst/>
@@ -10828,7 +10828,7 @@
         </p:nvSpPr>
         <p:spPr>
           <a:xfrm>
-            <a:off x="5029200" y="2651774"/>
+            <a:off x="5029200" y="2651758"/>
             <a:ext cx="3941379" cy="3"/>
           </a:xfrm>
           <a:prstGeom prst="rect">
@@ -10871,8 +10871,8 @@
         </p:nvSpPr>
         <p:spPr>
           <a:xfrm>
-            <a:off x="8970577" y="2651776"/>
-            <a:ext cx="3" cy="640064"/>
+            <a:off x="8970577" y="2651760"/>
+            <a:ext cx="3" cy="640080"/>
           </a:xfrm>
           <a:prstGeom prst="rect">
             <a:avLst/>
@@ -11802,7 +11802,7 @@
         <p:spPr>
           <a:xfrm>
             <a:off x="9052558" y="4206240"/>
-            <a:ext cx="3" cy="640096"/>
+            <a:ext cx="3" cy="640080"/>
           </a:xfrm>
           <a:prstGeom prst="rect">
             <a:avLst/>
@@ -11844,7 +11844,7 @@
         </p:nvSpPr>
         <p:spPr>
           <a:xfrm>
-            <a:off x="6035040" y="4846334"/>
+            <a:off x="6035040" y="4846318"/>
             <a:ext cx="3017520" cy="3"/>
           </a:xfrm>
           <a:prstGeom prst="rect">
@@ -11887,8 +11887,8 @@
         </p:nvSpPr>
         <p:spPr>
           <a:xfrm>
-            <a:off x="6035038" y="4846336"/>
-            <a:ext cx="3" cy="640064"/>
+            <a:off x="6035038" y="4846320"/>
+            <a:ext cx="3" cy="640080"/>
           </a:xfrm>
           <a:prstGeom prst="rect">
             <a:avLst/>
@@ -11931,7 +11931,7 @@
         <p:spPr>
           <a:xfrm>
             <a:off x="9052558" y="4206240"/>
-            <a:ext cx="3" cy="640096"/>
+            <a:ext cx="3" cy="640080"/>
           </a:xfrm>
           <a:prstGeom prst="rect">
             <a:avLst/>
@@ -11973,7 +11973,7 @@
         </p:nvSpPr>
         <p:spPr>
           <a:xfrm>
-            <a:off x="8046720" y="4846334"/>
+            <a:off x="8046720" y="4846318"/>
             <a:ext cx="1005840" cy="3"/>
           </a:xfrm>
           <a:prstGeom prst="rect">
@@ -12016,8 +12016,8 @@
         </p:nvSpPr>
         <p:spPr>
           <a:xfrm>
-            <a:off x="8046718" y="4846336"/>
-            <a:ext cx="3" cy="640064"/>
+            <a:off x="8046718" y="4846320"/>
+            <a:ext cx="3" cy="640080"/>
           </a:xfrm>
           <a:prstGeom prst="rect">
             <a:avLst/>
@@ -12189,7 +12189,7 @@
         <p:spPr>
           <a:xfrm>
             <a:off x="7040878" y="4206240"/>
-            <a:ext cx="3" cy="640064"/>
+            <a:ext cx="3" cy="640072"/>
           </a:xfrm>
           <a:prstGeom prst="rect">
             <a:avLst/>
@@ -12231,7 +12231,7 @@
         </p:nvSpPr>
         <p:spPr>
           <a:xfrm>
-            <a:off x="4023360" y="4846302"/>
+            <a:off x="4023360" y="4846310"/>
             <a:ext cx="3017520" cy="3"/>
           </a:xfrm>
           <a:prstGeom prst="rect">
@@ -12274,8 +12274,8 @@
         </p:nvSpPr>
         <p:spPr>
           <a:xfrm>
-            <a:off x="4023358" y="4846304"/>
-            <a:ext cx="3" cy="640096"/>
+            <a:off x="4023358" y="4846312"/>
+            <a:ext cx="3" cy="640088"/>
           </a:xfrm>
           <a:prstGeom prst="rect">
             <a:avLst/>
@@ -12318,7 +12318,7 @@
         <p:spPr>
           <a:xfrm>
             <a:off x="5029198" y="2011680"/>
-            <a:ext cx="3" cy="640096"/>
+            <a:ext cx="3" cy="640088"/>
           </a:xfrm>
           <a:prstGeom prst="rect">
             <a:avLst/>
@@ -12360,7 +12360,7 @@
         </p:nvSpPr>
         <p:spPr>
           <a:xfrm>
-            <a:off x="1005840" y="2651774"/>
+            <a:off x="1005840" y="2651766"/>
             <a:ext cx="4023360" cy="3"/>
           </a:xfrm>
           <a:prstGeom prst="rect">
@@ -12403,8 +12403,8 @@
         </p:nvSpPr>
         <p:spPr>
           <a:xfrm>
-            <a:off x="1005838" y="2651776"/>
-            <a:ext cx="3" cy="640064"/>
+            <a:off x="1005838" y="2651768"/>
+            <a:ext cx="3" cy="640072"/>
           </a:xfrm>
           <a:prstGeom prst="rect">
             <a:avLst/>
@@ -12447,7 +12447,7 @@
         <p:spPr>
           <a:xfrm>
             <a:off x="5029198" y="2011680"/>
-            <a:ext cx="3" cy="640096"/>
+            <a:ext cx="3" cy="640088"/>
           </a:xfrm>
           <a:prstGeom prst="rect">
             <a:avLst/>
@@ -12489,7 +12489,7 @@
         </p:nvSpPr>
         <p:spPr>
           <a:xfrm>
-            <a:off x="3017520" y="2651774"/>
+            <a:off x="3017520" y="2651766"/>
             <a:ext cx="2011680" cy="3"/>
           </a:xfrm>
           <a:prstGeom prst="rect">
@@ -12532,8 +12532,8 @@
         </p:nvSpPr>
         <p:spPr>
           <a:xfrm>
-            <a:off x="3017518" y="2651776"/>
-            <a:ext cx="3" cy="640064"/>
+            <a:off x="3017518" y="2651768"/>
+            <a:ext cx="3" cy="640072"/>
           </a:xfrm>
           <a:prstGeom prst="rect">
             <a:avLst/>
@@ -12576,7 +12576,7 @@
         <p:spPr>
           <a:xfrm>
             <a:off x="5029198" y="2011680"/>
-            <a:ext cx="3" cy="640096"/>
+            <a:ext cx="3" cy="640088"/>
           </a:xfrm>
           <a:prstGeom prst="rect">
             <a:avLst/>
@@ -12618,8 +12618,8 @@
         </p:nvSpPr>
         <p:spPr>
           <a:xfrm>
-            <a:off x="5029198" y="2651776"/>
-            <a:ext cx="3" cy="640064"/>
+            <a:off x="5029198" y="2651768"/>
+            <a:ext cx="3" cy="640072"/>
           </a:xfrm>
           <a:prstGeom prst="rect">
             <a:avLst/>
@@ -12662,7 +12662,7 @@
         <p:spPr>
           <a:xfrm>
             <a:off x="5029198" y="2011680"/>
-            <a:ext cx="3" cy="640096"/>
+            <a:ext cx="3" cy="640088"/>
           </a:xfrm>
           <a:prstGeom prst="rect">
             <a:avLst/>
@@ -12704,7 +12704,7 @@
         </p:nvSpPr>
         <p:spPr>
           <a:xfrm>
-            <a:off x="5029200" y="2651774"/>
+            <a:off x="5029200" y="2651766"/>
             <a:ext cx="2011680" cy="3"/>
           </a:xfrm>
           <a:prstGeom prst="rect">
@@ -12747,8 +12747,8 @@
         </p:nvSpPr>
         <p:spPr>
           <a:xfrm>
-            <a:off x="7040878" y="2651776"/>
-            <a:ext cx="3" cy="640064"/>
+            <a:off x="7040878" y="2651768"/>
+            <a:ext cx="3" cy="640072"/>
           </a:xfrm>
           <a:prstGeom prst="rect">
             <a:avLst/>
@@ -12791,7 +12791,7 @@
         <p:spPr>
           <a:xfrm>
             <a:off x="5029198" y="2011680"/>
-            <a:ext cx="3" cy="640096"/>
+            <a:ext cx="3" cy="640088"/>
           </a:xfrm>
           <a:prstGeom prst="rect">
             <a:avLst/>
@@ -12833,7 +12833,7 @@
         </p:nvSpPr>
         <p:spPr>
           <a:xfrm>
-            <a:off x="5029200" y="2651774"/>
+            <a:off x="5029200" y="2651766"/>
             <a:ext cx="4023360" cy="3"/>
           </a:xfrm>
           <a:prstGeom prst="rect">
@@ -12876,8 +12876,8 @@
         </p:nvSpPr>
         <p:spPr>
           <a:xfrm>
-            <a:off x="9052558" y="2651776"/>
-            <a:ext cx="3" cy="640064"/>
+            <a:off x="9052558" y="2651768"/>
+            <a:ext cx="3" cy="640072"/>
           </a:xfrm>
           <a:prstGeom prst="rect">
             <a:avLst/>
@@ -13729,7 +13729,7 @@
         <p:spPr>
           <a:xfrm>
             <a:off x="3017518" y="4206240"/>
-            <a:ext cx="3" cy="640096"/>
+            <a:ext cx="3" cy="640080"/>
           </a:xfrm>
           <a:prstGeom prst="rect">
             <a:avLst/>
@@ -13771,8 +13771,8 @@
         </p:nvSpPr>
         <p:spPr>
           <a:xfrm>
-            <a:off x="3017518" y="4846336"/>
-            <a:ext cx="3" cy="640064"/>
+            <a:off x="3017518" y="4846320"/>
+            <a:ext cx="3" cy="640080"/>
           </a:xfrm>
           <a:prstGeom prst="rect">
             <a:avLst/>
@@ -13815,6 +13815,92 @@
         <p:spPr>
           <a:xfrm>
             <a:off x="9052558" y="4206240"/>
+            <a:ext cx="3" cy="640072"/>
+          </a:xfrm>
+          <a:prstGeom prst="rect">
+            <a:avLst/>
+          </a:prstGeom>
+          <a:solidFill>
+            <a:srgbClr val="646464"/>
+          </a:solidFill>
+          <a:ln>
+            <a:noFill/>
+          </a:ln>
+        </p:spPr>
+        <p:style>
+          <a:lnRef idx="1">
+            <a:schemeClr val="accent1"/>
+          </a:lnRef>
+          <a:fillRef idx="3">
+            <a:schemeClr val="accent1"/>
+          </a:fillRef>
+          <a:effectRef idx="2">
+            <a:schemeClr val="accent1"/>
+          </a:effectRef>
+          <a:fontRef idx="minor">
+            <a:schemeClr val="lt1"/>
+          </a:fontRef>
+        </p:style>
+        <p:txBody>
+          <a:bodyPr rtlCol="0" anchor="ctr"/>
+          <a:lstStyle/>
+          <a:p>
+            <a:pPr algn="ctr"/>
+          </a:p>
+        </p:txBody>
+      </p:sp>
+      <p:sp>
+        <p:nvSpPr>
+          <p:cNvPr id="15" name="Rectangle 14"/>
+          <p:cNvSpPr/>
+          <p:nvPr/>
+        </p:nvSpPr>
+        <p:spPr>
+          <a:xfrm>
+            <a:off x="5029200" y="4846310"/>
+            <a:ext cx="4023360" cy="3"/>
+          </a:xfrm>
+          <a:prstGeom prst="rect">
+            <a:avLst/>
+          </a:prstGeom>
+          <a:solidFill>
+            <a:srgbClr val="646464"/>
+          </a:solidFill>
+          <a:ln>
+            <a:noFill/>
+          </a:ln>
+        </p:spPr>
+        <p:style>
+          <a:lnRef idx="1">
+            <a:schemeClr val="accent1"/>
+          </a:lnRef>
+          <a:fillRef idx="3">
+            <a:schemeClr val="accent1"/>
+          </a:fillRef>
+          <a:effectRef idx="2">
+            <a:schemeClr val="accent1"/>
+          </a:effectRef>
+          <a:fontRef idx="minor">
+            <a:schemeClr val="lt1"/>
+          </a:fontRef>
+        </p:style>
+        <p:txBody>
+          <a:bodyPr rtlCol="0" anchor="ctr"/>
+          <a:lstStyle/>
+          <a:p>
+            <a:pPr algn="ctr"/>
+          </a:p>
+        </p:txBody>
+      </p:sp>
+      <p:sp>
+        <p:nvSpPr>
+          <p:cNvPr id="16" name="Rectangle 15"/>
+          <p:cNvSpPr/>
+          <p:nvPr/>
+        </p:nvSpPr>
+        <p:spPr>
+          <a:xfrm>
+            <a:off x="5029198" y="4846312"/>
             <a:ext cx="3" cy="640088"/>
           </a:xfrm>
           <a:prstGeom prst="rect">
@@ -13851,14 +13937,14 @@
       </p:sp>
       <p:sp>
         <p:nvSpPr>
-          <p:cNvPr id="15" name="Rectangle 14"/>
-          <p:cNvSpPr/>
-          <p:nvPr/>
-        </p:nvSpPr>
-        <p:spPr>
-          <a:xfrm>
-            <a:off x="5029200" y="4846326"/>
-            <a:ext cx="4023360" cy="3"/>
+          <p:cNvPr id="17" name="Rectangle 16"/>
+          <p:cNvSpPr/>
+          <p:nvPr/>
+        </p:nvSpPr>
+        <p:spPr>
+          <a:xfrm>
+            <a:off x="9052558" y="4206240"/>
+            <a:ext cx="3" cy="640072"/>
           </a:xfrm>
           <a:prstGeom prst="rect">
             <a:avLst/>
@@ -13894,14 +13980,14 @@
       </p:sp>
       <p:sp>
         <p:nvSpPr>
-          <p:cNvPr id="16" name="Rectangle 15"/>
-          <p:cNvSpPr/>
-          <p:nvPr/>
-        </p:nvSpPr>
-        <p:spPr>
-          <a:xfrm>
-            <a:off x="5029198" y="4846328"/>
-            <a:ext cx="3" cy="640072"/>
+          <p:cNvPr id="18" name="Rectangle 17"/>
+          <p:cNvSpPr/>
+          <p:nvPr/>
+        </p:nvSpPr>
+        <p:spPr>
+          <a:xfrm>
+            <a:off x="7040880" y="4846310"/>
+            <a:ext cx="2011680" cy="3"/>
           </a:xfrm>
           <a:prstGeom prst="rect">
             <a:avLst/>
@@ -13937,100 +14023,14 @@
       </p:sp>
       <p:sp>
         <p:nvSpPr>
-          <p:cNvPr id="17" name="Rectangle 16"/>
-          <p:cNvSpPr/>
-          <p:nvPr/>
-        </p:nvSpPr>
-        <p:spPr>
-          <a:xfrm>
-            <a:off x="9052558" y="4206240"/>
+          <p:cNvPr id="19" name="Rectangle 18"/>
+          <p:cNvSpPr/>
+          <p:nvPr/>
+        </p:nvSpPr>
+        <p:spPr>
+          <a:xfrm>
+            <a:off x="7040878" y="4846312"/>
             <a:ext cx="3" cy="640088"/>
-          </a:xfrm>
-          <a:prstGeom prst="rect">
-            <a:avLst/>
-          </a:prstGeom>
-          <a:solidFill>
-            <a:srgbClr val="646464"/>
-          </a:solidFill>
-          <a:ln>
-            <a:noFill/>
-          </a:ln>
-        </p:spPr>
-        <p:style>
-          <a:lnRef idx="1">
-            <a:schemeClr val="accent1"/>
-          </a:lnRef>
-          <a:fillRef idx="3">
-            <a:schemeClr val="accent1"/>
-          </a:fillRef>
-          <a:effectRef idx="2">
-            <a:schemeClr val="accent1"/>
-          </a:effectRef>
-          <a:fontRef idx="minor">
-            <a:schemeClr val="lt1"/>
-          </a:fontRef>
-        </p:style>
-        <p:txBody>
-          <a:bodyPr rtlCol="0" anchor="ctr"/>
-          <a:lstStyle/>
-          <a:p>
-            <a:pPr algn="ctr"/>
-          </a:p>
-        </p:txBody>
-      </p:sp>
-      <p:sp>
-        <p:nvSpPr>
-          <p:cNvPr id="18" name="Rectangle 17"/>
-          <p:cNvSpPr/>
-          <p:nvPr/>
-        </p:nvSpPr>
-        <p:spPr>
-          <a:xfrm>
-            <a:off x="7040880" y="4846326"/>
-            <a:ext cx="2011680" cy="3"/>
-          </a:xfrm>
-          <a:prstGeom prst="rect">
-            <a:avLst/>
-          </a:prstGeom>
-          <a:solidFill>
-            <a:srgbClr val="646464"/>
-          </a:solidFill>
-          <a:ln>
-            <a:noFill/>
-          </a:ln>
-        </p:spPr>
-        <p:style>
-          <a:lnRef idx="1">
-            <a:schemeClr val="accent1"/>
-          </a:lnRef>
-          <a:fillRef idx="3">
-            <a:schemeClr val="accent1"/>
-          </a:fillRef>
-          <a:effectRef idx="2">
-            <a:schemeClr val="accent1"/>
-          </a:effectRef>
-          <a:fontRef idx="minor">
-            <a:schemeClr val="lt1"/>
-          </a:fontRef>
-        </p:style>
-        <p:txBody>
-          <a:bodyPr rtlCol="0" anchor="ctr"/>
-          <a:lstStyle/>
-          <a:p>
-            <a:pPr algn="ctr"/>
-          </a:p>
-        </p:txBody>
-      </p:sp>
-      <p:sp>
-        <p:nvSpPr>
-          <p:cNvPr id="19" name="Rectangle 18"/>
-          <p:cNvSpPr/>
-          <p:nvPr/>
-        </p:nvSpPr>
-        <p:spPr>
-          <a:xfrm>
-            <a:off x="7040878" y="4846328"/>
-            <a:ext cx="3" cy="640072"/>
           </a:xfrm>
           <a:prstGeom prst="rect">
             <a:avLst/>
@@ -15094,7 +15094,7 @@
         <p:spPr>
           <a:xfrm>
             <a:off x="5029198" y="2011680"/>
-            <a:ext cx="3" cy="640072"/>
+            <a:ext cx="3" cy="640080"/>
           </a:xfrm>
           <a:prstGeom prst="rect">
             <a:avLst/>
@@ -15136,7 +15136,7 @@
         </p:nvSpPr>
         <p:spPr>
           <a:xfrm>
-            <a:off x="1342103" y="2651750"/>
+            <a:off x="1342103" y="2651758"/>
             <a:ext cx="3687096" cy="3"/>
           </a:xfrm>
           <a:prstGeom prst="rect">
@@ -15179,8 +15179,8 @@
         </p:nvSpPr>
         <p:spPr>
           <a:xfrm>
-            <a:off x="1342101" y="2651752"/>
-            <a:ext cx="3" cy="640088"/>
+            <a:off x="1342101" y="2651760"/>
+            <a:ext cx="3" cy="640080"/>
           </a:xfrm>
           <a:prstGeom prst="rect">
             <a:avLst/>
@@ -15223,7 +15223,7 @@
         <p:spPr>
           <a:xfrm>
             <a:off x="5029198" y="2011680"/>
-            <a:ext cx="3" cy="640072"/>
+            <a:ext cx="3" cy="640080"/>
           </a:xfrm>
           <a:prstGeom prst="rect">
             <a:avLst/>
@@ -15265,8 +15265,8 @@
         </p:nvSpPr>
         <p:spPr>
           <a:xfrm>
-            <a:off x="5029198" y="2651752"/>
-            <a:ext cx="3" cy="640088"/>
+            <a:off x="5029198" y="2651760"/>
+            <a:ext cx="3" cy="640080"/>
           </a:xfrm>
           <a:prstGeom prst="rect">
             <a:avLst/>
@@ -15309,7 +15309,7 @@
         <p:spPr>
           <a:xfrm>
             <a:off x="5029198" y="2011680"/>
-            <a:ext cx="3" cy="640072"/>
+            <a:ext cx="3" cy="640080"/>
           </a:xfrm>
           <a:prstGeom prst="rect">
             <a:avLst/>
@@ -15351,7 +15351,7 @@
         </p:nvSpPr>
         <p:spPr>
           <a:xfrm>
-            <a:off x="5029200" y="2651750"/>
+            <a:off x="5029200" y="2651758"/>
             <a:ext cx="3687096" cy="3"/>
           </a:xfrm>
           <a:prstGeom prst="rect">
@@ -15394,8 +15394,8 @@
         </p:nvSpPr>
         <p:spPr>
           <a:xfrm>
-            <a:off x="8716295" y="2651752"/>
-            <a:ext cx="3" cy="640088"/>
+            <a:off x="8716295" y="2651760"/>
+            <a:ext cx="3" cy="640080"/>
           </a:xfrm>
           <a:prstGeom prst="rect">
             <a:avLst/>

</xml_diff>

<commit_message>
Adjust to run on linux and pm2
</commit_message>
<xml_diff>
--- a/utilities/org_chart/src/org_chart_usat_by_dept_responsive_ordered_wrapped_tenure.pptx
+++ b/utilities/org_chart/src/org_chart_usat_by_dept_responsive_ordered_wrapped_tenure.pptx
@@ -4143,7 +4143,7 @@
         <p:spPr>
           <a:xfrm>
             <a:off x="8716295" y="4206240"/>
-            <a:ext cx="3" cy="640072"/>
+            <a:ext cx="3" cy="640080"/>
           </a:xfrm>
           <a:prstGeom prst="rect">
             <a:avLst/>
@@ -4185,7 +4185,7 @@
         </p:nvSpPr>
         <p:spPr>
           <a:xfrm>
-            <a:off x="5029200" y="4846310"/>
+            <a:off x="5029200" y="4846318"/>
             <a:ext cx="3687096" cy="3"/>
           </a:xfrm>
           <a:prstGeom prst="rect">
@@ -4228,8 +4228,8 @@
         </p:nvSpPr>
         <p:spPr>
           <a:xfrm>
-            <a:off x="5029198" y="4846312"/>
-            <a:ext cx="3" cy="640088"/>
+            <a:off x="5029198" y="4846320"/>
+            <a:ext cx="3" cy="640080"/>
           </a:xfrm>
           <a:prstGeom prst="rect">
             <a:avLst/>
@@ -4272,6 +4272,92 @@
         <p:spPr>
           <a:xfrm>
             <a:off x="5029198" y="2011680"/>
+            <a:ext cx="3" cy="640096"/>
+          </a:xfrm>
+          <a:prstGeom prst="rect">
+            <a:avLst/>
+          </a:prstGeom>
+          <a:solidFill>
+            <a:srgbClr val="646464"/>
+          </a:solidFill>
+          <a:ln>
+            <a:noFill/>
+          </a:ln>
+        </p:spPr>
+        <p:style>
+          <a:lnRef idx="1">
+            <a:schemeClr val="accent1"/>
+          </a:lnRef>
+          <a:fillRef idx="3">
+            <a:schemeClr val="accent1"/>
+          </a:fillRef>
+          <a:effectRef idx="2">
+            <a:schemeClr val="accent1"/>
+          </a:effectRef>
+          <a:fontRef idx="minor">
+            <a:schemeClr val="lt1"/>
+          </a:fontRef>
+        </p:style>
+        <p:txBody>
+          <a:bodyPr rtlCol="0" anchor="ctr"/>
+          <a:lstStyle/>
+          <a:p>
+            <a:pPr algn="ctr"/>
+          </a:p>
+        </p:txBody>
+      </p:sp>
+      <p:sp>
+        <p:nvSpPr>
+          <p:cNvPr id="12" name="Rectangle 11"/>
+          <p:cNvSpPr/>
+          <p:nvPr/>
+        </p:nvSpPr>
+        <p:spPr>
+          <a:xfrm>
+            <a:off x="1342103" y="2651774"/>
+            <a:ext cx="3687096" cy="3"/>
+          </a:xfrm>
+          <a:prstGeom prst="rect">
+            <a:avLst/>
+          </a:prstGeom>
+          <a:solidFill>
+            <a:srgbClr val="646464"/>
+          </a:solidFill>
+          <a:ln>
+            <a:noFill/>
+          </a:ln>
+        </p:spPr>
+        <p:style>
+          <a:lnRef idx="1">
+            <a:schemeClr val="accent1"/>
+          </a:lnRef>
+          <a:fillRef idx="3">
+            <a:schemeClr val="accent1"/>
+          </a:fillRef>
+          <a:effectRef idx="2">
+            <a:schemeClr val="accent1"/>
+          </a:effectRef>
+          <a:fontRef idx="minor">
+            <a:schemeClr val="lt1"/>
+          </a:fontRef>
+        </p:style>
+        <p:txBody>
+          <a:bodyPr rtlCol="0" anchor="ctr"/>
+          <a:lstStyle/>
+          <a:p>
+            <a:pPr algn="ctr"/>
+          </a:p>
+        </p:txBody>
+      </p:sp>
+      <p:sp>
+        <p:nvSpPr>
+          <p:cNvPr id="13" name="Rectangle 12"/>
+          <p:cNvSpPr/>
+          <p:nvPr/>
+        </p:nvSpPr>
+        <p:spPr>
+          <a:xfrm>
+            <a:off x="1342101" y="2651776"/>
             <a:ext cx="3" cy="640064"/>
           </a:xfrm>
           <a:prstGeom prst="rect">
@@ -4308,13 +4394,142 @@
       </p:sp>
       <p:sp>
         <p:nvSpPr>
-          <p:cNvPr id="12" name="Rectangle 11"/>
-          <p:cNvSpPr/>
-          <p:nvPr/>
-        </p:nvSpPr>
-        <p:spPr>
-          <a:xfrm>
-            <a:off x="1342103" y="2651742"/>
+          <p:cNvPr id="14" name="Rectangle 13"/>
+          <p:cNvSpPr/>
+          <p:nvPr/>
+        </p:nvSpPr>
+        <p:spPr>
+          <a:xfrm>
+            <a:off x="5029198" y="2011680"/>
+            <a:ext cx="3" cy="640096"/>
+          </a:xfrm>
+          <a:prstGeom prst="rect">
+            <a:avLst/>
+          </a:prstGeom>
+          <a:solidFill>
+            <a:srgbClr val="646464"/>
+          </a:solidFill>
+          <a:ln>
+            <a:noFill/>
+          </a:ln>
+        </p:spPr>
+        <p:style>
+          <a:lnRef idx="1">
+            <a:schemeClr val="accent1"/>
+          </a:lnRef>
+          <a:fillRef idx="3">
+            <a:schemeClr val="accent1"/>
+          </a:fillRef>
+          <a:effectRef idx="2">
+            <a:schemeClr val="accent1"/>
+          </a:effectRef>
+          <a:fontRef idx="minor">
+            <a:schemeClr val="lt1"/>
+          </a:fontRef>
+        </p:style>
+        <p:txBody>
+          <a:bodyPr rtlCol="0" anchor="ctr"/>
+          <a:lstStyle/>
+          <a:p>
+            <a:pPr algn="ctr"/>
+          </a:p>
+        </p:txBody>
+      </p:sp>
+      <p:sp>
+        <p:nvSpPr>
+          <p:cNvPr id="15" name="Rectangle 14"/>
+          <p:cNvSpPr/>
+          <p:nvPr/>
+        </p:nvSpPr>
+        <p:spPr>
+          <a:xfrm>
+            <a:off x="5029198" y="2651776"/>
+            <a:ext cx="3" cy="640064"/>
+          </a:xfrm>
+          <a:prstGeom prst="rect">
+            <a:avLst/>
+          </a:prstGeom>
+          <a:solidFill>
+            <a:srgbClr val="646464"/>
+          </a:solidFill>
+          <a:ln>
+            <a:noFill/>
+          </a:ln>
+        </p:spPr>
+        <p:style>
+          <a:lnRef idx="1">
+            <a:schemeClr val="accent1"/>
+          </a:lnRef>
+          <a:fillRef idx="3">
+            <a:schemeClr val="accent1"/>
+          </a:fillRef>
+          <a:effectRef idx="2">
+            <a:schemeClr val="accent1"/>
+          </a:effectRef>
+          <a:fontRef idx="minor">
+            <a:schemeClr val="lt1"/>
+          </a:fontRef>
+        </p:style>
+        <p:txBody>
+          <a:bodyPr rtlCol="0" anchor="ctr"/>
+          <a:lstStyle/>
+          <a:p>
+            <a:pPr algn="ctr"/>
+          </a:p>
+        </p:txBody>
+      </p:sp>
+      <p:sp>
+        <p:nvSpPr>
+          <p:cNvPr id="16" name="Rectangle 15"/>
+          <p:cNvSpPr/>
+          <p:nvPr/>
+        </p:nvSpPr>
+        <p:spPr>
+          <a:xfrm>
+            <a:off x="5029198" y="2011680"/>
+            <a:ext cx="3" cy="640096"/>
+          </a:xfrm>
+          <a:prstGeom prst="rect">
+            <a:avLst/>
+          </a:prstGeom>
+          <a:solidFill>
+            <a:srgbClr val="646464"/>
+          </a:solidFill>
+          <a:ln>
+            <a:noFill/>
+          </a:ln>
+        </p:spPr>
+        <p:style>
+          <a:lnRef idx="1">
+            <a:schemeClr val="accent1"/>
+          </a:lnRef>
+          <a:fillRef idx="3">
+            <a:schemeClr val="accent1"/>
+          </a:fillRef>
+          <a:effectRef idx="2">
+            <a:schemeClr val="accent1"/>
+          </a:effectRef>
+          <a:fontRef idx="minor">
+            <a:schemeClr val="lt1"/>
+          </a:fontRef>
+        </p:style>
+        <p:txBody>
+          <a:bodyPr rtlCol="0" anchor="ctr"/>
+          <a:lstStyle/>
+          <a:p>
+            <a:pPr algn="ctr"/>
+          </a:p>
+        </p:txBody>
+      </p:sp>
+      <p:sp>
+        <p:nvSpPr>
+          <p:cNvPr id="17" name="Rectangle 16"/>
+          <p:cNvSpPr/>
+          <p:nvPr/>
+        </p:nvSpPr>
+        <p:spPr>
+          <a:xfrm>
+            <a:off x="5029200" y="2651774"/>
             <a:ext cx="3687096" cy="3"/>
           </a:xfrm>
           <a:prstGeom prst="rect">
@@ -4351,229 +4566,14 @@
       </p:sp>
       <p:sp>
         <p:nvSpPr>
-          <p:cNvPr id="13" name="Rectangle 12"/>
-          <p:cNvSpPr/>
-          <p:nvPr/>
-        </p:nvSpPr>
-        <p:spPr>
-          <a:xfrm>
-            <a:off x="1342101" y="2651744"/>
-            <a:ext cx="3" cy="640096"/>
-          </a:xfrm>
-          <a:prstGeom prst="rect">
-            <a:avLst/>
-          </a:prstGeom>
-          <a:solidFill>
-            <a:srgbClr val="646464"/>
-          </a:solidFill>
-          <a:ln>
-            <a:noFill/>
-          </a:ln>
-        </p:spPr>
-        <p:style>
-          <a:lnRef idx="1">
-            <a:schemeClr val="accent1"/>
-          </a:lnRef>
-          <a:fillRef idx="3">
-            <a:schemeClr val="accent1"/>
-          </a:fillRef>
-          <a:effectRef idx="2">
-            <a:schemeClr val="accent1"/>
-          </a:effectRef>
-          <a:fontRef idx="minor">
-            <a:schemeClr val="lt1"/>
-          </a:fontRef>
-        </p:style>
-        <p:txBody>
-          <a:bodyPr rtlCol="0" anchor="ctr"/>
-          <a:lstStyle/>
-          <a:p>
-            <a:pPr algn="ctr"/>
-          </a:p>
-        </p:txBody>
-      </p:sp>
-      <p:sp>
-        <p:nvSpPr>
-          <p:cNvPr id="14" name="Rectangle 13"/>
-          <p:cNvSpPr/>
-          <p:nvPr/>
-        </p:nvSpPr>
-        <p:spPr>
-          <a:xfrm>
-            <a:off x="5029198" y="2011680"/>
+          <p:cNvPr id="18" name="Rectangle 17"/>
+          <p:cNvSpPr/>
+          <p:nvPr/>
+        </p:nvSpPr>
+        <p:spPr>
+          <a:xfrm>
+            <a:off x="8716295" y="2651776"/>
             <a:ext cx="3" cy="640064"/>
-          </a:xfrm>
-          <a:prstGeom prst="rect">
-            <a:avLst/>
-          </a:prstGeom>
-          <a:solidFill>
-            <a:srgbClr val="646464"/>
-          </a:solidFill>
-          <a:ln>
-            <a:noFill/>
-          </a:ln>
-        </p:spPr>
-        <p:style>
-          <a:lnRef idx="1">
-            <a:schemeClr val="accent1"/>
-          </a:lnRef>
-          <a:fillRef idx="3">
-            <a:schemeClr val="accent1"/>
-          </a:fillRef>
-          <a:effectRef idx="2">
-            <a:schemeClr val="accent1"/>
-          </a:effectRef>
-          <a:fontRef idx="minor">
-            <a:schemeClr val="lt1"/>
-          </a:fontRef>
-        </p:style>
-        <p:txBody>
-          <a:bodyPr rtlCol="0" anchor="ctr"/>
-          <a:lstStyle/>
-          <a:p>
-            <a:pPr algn="ctr"/>
-          </a:p>
-        </p:txBody>
-      </p:sp>
-      <p:sp>
-        <p:nvSpPr>
-          <p:cNvPr id="15" name="Rectangle 14"/>
-          <p:cNvSpPr/>
-          <p:nvPr/>
-        </p:nvSpPr>
-        <p:spPr>
-          <a:xfrm>
-            <a:off x="5029198" y="2651744"/>
-            <a:ext cx="3" cy="640096"/>
-          </a:xfrm>
-          <a:prstGeom prst="rect">
-            <a:avLst/>
-          </a:prstGeom>
-          <a:solidFill>
-            <a:srgbClr val="646464"/>
-          </a:solidFill>
-          <a:ln>
-            <a:noFill/>
-          </a:ln>
-        </p:spPr>
-        <p:style>
-          <a:lnRef idx="1">
-            <a:schemeClr val="accent1"/>
-          </a:lnRef>
-          <a:fillRef idx="3">
-            <a:schemeClr val="accent1"/>
-          </a:fillRef>
-          <a:effectRef idx="2">
-            <a:schemeClr val="accent1"/>
-          </a:effectRef>
-          <a:fontRef idx="minor">
-            <a:schemeClr val="lt1"/>
-          </a:fontRef>
-        </p:style>
-        <p:txBody>
-          <a:bodyPr rtlCol="0" anchor="ctr"/>
-          <a:lstStyle/>
-          <a:p>
-            <a:pPr algn="ctr"/>
-          </a:p>
-        </p:txBody>
-      </p:sp>
-      <p:sp>
-        <p:nvSpPr>
-          <p:cNvPr id="16" name="Rectangle 15"/>
-          <p:cNvSpPr/>
-          <p:nvPr/>
-        </p:nvSpPr>
-        <p:spPr>
-          <a:xfrm>
-            <a:off x="5029198" y="2011680"/>
-            <a:ext cx="3" cy="640064"/>
-          </a:xfrm>
-          <a:prstGeom prst="rect">
-            <a:avLst/>
-          </a:prstGeom>
-          <a:solidFill>
-            <a:srgbClr val="646464"/>
-          </a:solidFill>
-          <a:ln>
-            <a:noFill/>
-          </a:ln>
-        </p:spPr>
-        <p:style>
-          <a:lnRef idx="1">
-            <a:schemeClr val="accent1"/>
-          </a:lnRef>
-          <a:fillRef idx="3">
-            <a:schemeClr val="accent1"/>
-          </a:fillRef>
-          <a:effectRef idx="2">
-            <a:schemeClr val="accent1"/>
-          </a:effectRef>
-          <a:fontRef idx="minor">
-            <a:schemeClr val="lt1"/>
-          </a:fontRef>
-        </p:style>
-        <p:txBody>
-          <a:bodyPr rtlCol="0" anchor="ctr"/>
-          <a:lstStyle/>
-          <a:p>
-            <a:pPr algn="ctr"/>
-          </a:p>
-        </p:txBody>
-      </p:sp>
-      <p:sp>
-        <p:nvSpPr>
-          <p:cNvPr id="17" name="Rectangle 16"/>
-          <p:cNvSpPr/>
-          <p:nvPr/>
-        </p:nvSpPr>
-        <p:spPr>
-          <a:xfrm>
-            <a:off x="5029200" y="2651742"/>
-            <a:ext cx="3687096" cy="3"/>
-          </a:xfrm>
-          <a:prstGeom prst="rect">
-            <a:avLst/>
-          </a:prstGeom>
-          <a:solidFill>
-            <a:srgbClr val="646464"/>
-          </a:solidFill>
-          <a:ln>
-            <a:noFill/>
-          </a:ln>
-        </p:spPr>
-        <p:style>
-          <a:lnRef idx="1">
-            <a:schemeClr val="accent1"/>
-          </a:lnRef>
-          <a:fillRef idx="3">
-            <a:schemeClr val="accent1"/>
-          </a:fillRef>
-          <a:effectRef idx="2">
-            <a:schemeClr val="accent1"/>
-          </a:effectRef>
-          <a:fontRef idx="minor">
-            <a:schemeClr val="lt1"/>
-          </a:fontRef>
-        </p:style>
-        <p:txBody>
-          <a:bodyPr rtlCol="0" anchor="ctr"/>
-          <a:lstStyle/>
-          <a:p>
-            <a:pPr algn="ctr"/>
-          </a:p>
-        </p:txBody>
-      </p:sp>
-      <p:sp>
-        <p:nvSpPr>
-          <p:cNvPr id="18" name="Rectangle 17"/>
-          <p:cNvSpPr/>
-          <p:nvPr/>
-        </p:nvSpPr>
-        <p:spPr>
-          <a:xfrm>
-            <a:off x="8716295" y="2651744"/>
-            <a:ext cx="3" cy="640096"/>
           </a:xfrm>
           <a:prstGeom prst="rect">
             <a:avLst/>
@@ -5425,6 +5425,92 @@
         <p:spPr>
           <a:xfrm>
             <a:off x="6342991" y="4206240"/>
+            <a:ext cx="3" cy="640072"/>
+          </a:xfrm>
+          <a:prstGeom prst="rect">
+            <a:avLst/>
+          </a:prstGeom>
+          <a:solidFill>
+            <a:srgbClr val="646464"/>
+          </a:solidFill>
+          <a:ln>
+            <a:noFill/>
+          </a:ln>
+        </p:spPr>
+        <p:style>
+          <a:lnRef idx="1">
+            <a:schemeClr val="accent1"/>
+          </a:lnRef>
+          <a:fillRef idx="3">
+            <a:schemeClr val="accent1"/>
+          </a:fillRef>
+          <a:effectRef idx="2">
+            <a:schemeClr val="accent1"/>
+          </a:effectRef>
+          <a:fontRef idx="minor">
+            <a:schemeClr val="lt1"/>
+          </a:fontRef>
+        </p:style>
+        <p:txBody>
+          <a:bodyPr rtlCol="0" anchor="ctr"/>
+          <a:lstStyle/>
+          <a:p>
+            <a:pPr algn="ctr"/>
+          </a:p>
+        </p:txBody>
+      </p:sp>
+      <p:sp>
+        <p:nvSpPr>
+          <p:cNvPr id="13" name="Rectangle 12"/>
+          <p:cNvSpPr/>
+          <p:nvPr/>
+        </p:nvSpPr>
+        <p:spPr>
+          <a:xfrm>
+            <a:off x="6342991" y="4846312"/>
+            <a:ext cx="3" cy="640088"/>
+          </a:xfrm>
+          <a:prstGeom prst="rect">
+            <a:avLst/>
+          </a:prstGeom>
+          <a:solidFill>
+            <a:srgbClr val="646464"/>
+          </a:solidFill>
+          <a:ln>
+            <a:noFill/>
+          </a:ln>
+        </p:spPr>
+        <p:style>
+          <a:lnRef idx="1">
+            <a:schemeClr val="accent1"/>
+          </a:lnRef>
+          <a:fillRef idx="3">
+            <a:schemeClr val="accent1"/>
+          </a:fillRef>
+          <a:effectRef idx="2">
+            <a:schemeClr val="accent1"/>
+          </a:effectRef>
+          <a:fontRef idx="minor">
+            <a:schemeClr val="lt1"/>
+          </a:fontRef>
+        </p:style>
+        <p:txBody>
+          <a:bodyPr rtlCol="0" anchor="ctr"/>
+          <a:lstStyle/>
+          <a:p>
+            <a:pPr algn="ctr"/>
+          </a:p>
+        </p:txBody>
+      </p:sp>
+      <p:sp>
+        <p:nvSpPr>
+          <p:cNvPr id="14" name="Rectangle 13"/>
+          <p:cNvSpPr/>
+          <p:nvPr/>
+        </p:nvSpPr>
+        <p:spPr>
+          <a:xfrm>
+            <a:off x="1087819" y="4206240"/>
             <a:ext cx="3" cy="640080"/>
           </a:xfrm>
           <a:prstGeom prst="rect">
@@ -5461,13 +5547,13 @@
       </p:sp>
       <p:sp>
         <p:nvSpPr>
-          <p:cNvPr id="13" name="Rectangle 12"/>
-          <p:cNvSpPr/>
-          <p:nvPr/>
-        </p:nvSpPr>
-        <p:spPr>
-          <a:xfrm>
-            <a:off x="6342991" y="4846320"/>
+          <p:cNvPr id="15" name="Rectangle 14"/>
+          <p:cNvSpPr/>
+          <p:nvPr/>
+        </p:nvSpPr>
+        <p:spPr>
+          <a:xfrm>
+            <a:off x="1087819" y="4846320"/>
             <a:ext cx="3" cy="640080"/>
           </a:xfrm>
           <a:prstGeom prst="rect">
@@ -5504,13 +5590,142 @@
       </p:sp>
       <p:sp>
         <p:nvSpPr>
-          <p:cNvPr id="14" name="Rectangle 13"/>
+          <p:cNvPr id="16" name="Rectangle 15"/>
           <p:cNvSpPr/>
           <p:nvPr/>
         </p:nvSpPr>
         <p:spPr>
           <a:xfrm>
             <a:off x="1087819" y="4206240"/>
+            <a:ext cx="3" cy="640080"/>
+          </a:xfrm>
+          <a:prstGeom prst="rect">
+            <a:avLst/>
+          </a:prstGeom>
+          <a:solidFill>
+            <a:srgbClr val="646464"/>
+          </a:solidFill>
+          <a:ln>
+            <a:noFill/>
+          </a:ln>
+        </p:spPr>
+        <p:style>
+          <a:lnRef idx="1">
+            <a:schemeClr val="accent1"/>
+          </a:lnRef>
+          <a:fillRef idx="3">
+            <a:schemeClr val="accent1"/>
+          </a:fillRef>
+          <a:effectRef idx="2">
+            <a:schemeClr val="accent1"/>
+          </a:effectRef>
+          <a:fontRef idx="minor">
+            <a:schemeClr val="lt1"/>
+          </a:fontRef>
+        </p:style>
+        <p:txBody>
+          <a:bodyPr rtlCol="0" anchor="ctr"/>
+          <a:lstStyle/>
+          <a:p>
+            <a:pPr algn="ctr"/>
+          </a:p>
+        </p:txBody>
+      </p:sp>
+      <p:sp>
+        <p:nvSpPr>
+          <p:cNvPr id="17" name="Rectangle 16"/>
+          <p:cNvSpPr/>
+          <p:nvPr/>
+        </p:nvSpPr>
+        <p:spPr>
+          <a:xfrm>
+            <a:off x="1087820" y="4846318"/>
+            <a:ext cx="2627586" cy="3"/>
+          </a:xfrm>
+          <a:prstGeom prst="rect">
+            <a:avLst/>
+          </a:prstGeom>
+          <a:solidFill>
+            <a:srgbClr val="646464"/>
+          </a:solidFill>
+          <a:ln>
+            <a:noFill/>
+          </a:ln>
+        </p:spPr>
+        <p:style>
+          <a:lnRef idx="1">
+            <a:schemeClr val="accent1"/>
+          </a:lnRef>
+          <a:fillRef idx="3">
+            <a:schemeClr val="accent1"/>
+          </a:fillRef>
+          <a:effectRef idx="2">
+            <a:schemeClr val="accent1"/>
+          </a:effectRef>
+          <a:fontRef idx="minor">
+            <a:schemeClr val="lt1"/>
+          </a:fontRef>
+        </p:style>
+        <p:txBody>
+          <a:bodyPr rtlCol="0" anchor="ctr"/>
+          <a:lstStyle/>
+          <a:p>
+            <a:pPr algn="ctr"/>
+          </a:p>
+        </p:txBody>
+      </p:sp>
+      <p:sp>
+        <p:nvSpPr>
+          <p:cNvPr id="18" name="Rectangle 17"/>
+          <p:cNvSpPr/>
+          <p:nvPr/>
+        </p:nvSpPr>
+        <p:spPr>
+          <a:xfrm>
+            <a:off x="3715405" y="4846320"/>
+            <a:ext cx="3" cy="640080"/>
+          </a:xfrm>
+          <a:prstGeom prst="rect">
+            <a:avLst/>
+          </a:prstGeom>
+          <a:solidFill>
+            <a:srgbClr val="646464"/>
+          </a:solidFill>
+          <a:ln>
+            <a:noFill/>
+          </a:ln>
+        </p:spPr>
+        <p:style>
+          <a:lnRef idx="1">
+            <a:schemeClr val="accent1"/>
+          </a:lnRef>
+          <a:fillRef idx="3">
+            <a:schemeClr val="accent1"/>
+          </a:fillRef>
+          <a:effectRef idx="2">
+            <a:schemeClr val="accent1"/>
+          </a:effectRef>
+          <a:fontRef idx="minor">
+            <a:schemeClr val="lt1"/>
+          </a:fontRef>
+        </p:style>
+        <p:txBody>
+          <a:bodyPr rtlCol="0" anchor="ctr"/>
+          <a:lstStyle/>
+          <a:p>
+            <a:pPr algn="ctr"/>
+          </a:p>
+        </p:txBody>
+      </p:sp>
+      <p:sp>
+        <p:nvSpPr>
+          <p:cNvPr id="19" name="Rectangle 18"/>
+          <p:cNvSpPr/>
+          <p:nvPr/>
+        </p:nvSpPr>
+        <p:spPr>
+          <a:xfrm>
+            <a:off x="8970577" y="4206240"/>
             <a:ext cx="3" cy="640072"/>
           </a:xfrm>
           <a:prstGeom prst="rect">
@@ -5547,229 +5762,14 @@
       </p:sp>
       <p:sp>
         <p:nvSpPr>
-          <p:cNvPr id="15" name="Rectangle 14"/>
-          <p:cNvSpPr/>
-          <p:nvPr/>
-        </p:nvSpPr>
-        <p:spPr>
-          <a:xfrm>
-            <a:off x="1087819" y="4846312"/>
+          <p:cNvPr id="20" name="Rectangle 19"/>
+          <p:cNvSpPr/>
+          <p:nvPr/>
+        </p:nvSpPr>
+        <p:spPr>
+          <a:xfrm>
+            <a:off x="8970577" y="4846312"/>
             <a:ext cx="3" cy="640088"/>
-          </a:xfrm>
-          <a:prstGeom prst="rect">
-            <a:avLst/>
-          </a:prstGeom>
-          <a:solidFill>
-            <a:srgbClr val="646464"/>
-          </a:solidFill>
-          <a:ln>
-            <a:noFill/>
-          </a:ln>
-        </p:spPr>
-        <p:style>
-          <a:lnRef idx="1">
-            <a:schemeClr val="accent1"/>
-          </a:lnRef>
-          <a:fillRef idx="3">
-            <a:schemeClr val="accent1"/>
-          </a:fillRef>
-          <a:effectRef idx="2">
-            <a:schemeClr val="accent1"/>
-          </a:effectRef>
-          <a:fontRef idx="minor">
-            <a:schemeClr val="lt1"/>
-          </a:fontRef>
-        </p:style>
-        <p:txBody>
-          <a:bodyPr rtlCol="0" anchor="ctr"/>
-          <a:lstStyle/>
-          <a:p>
-            <a:pPr algn="ctr"/>
-          </a:p>
-        </p:txBody>
-      </p:sp>
-      <p:sp>
-        <p:nvSpPr>
-          <p:cNvPr id="16" name="Rectangle 15"/>
-          <p:cNvSpPr/>
-          <p:nvPr/>
-        </p:nvSpPr>
-        <p:spPr>
-          <a:xfrm>
-            <a:off x="1087819" y="4206240"/>
-            <a:ext cx="3" cy="640072"/>
-          </a:xfrm>
-          <a:prstGeom prst="rect">
-            <a:avLst/>
-          </a:prstGeom>
-          <a:solidFill>
-            <a:srgbClr val="646464"/>
-          </a:solidFill>
-          <a:ln>
-            <a:noFill/>
-          </a:ln>
-        </p:spPr>
-        <p:style>
-          <a:lnRef idx="1">
-            <a:schemeClr val="accent1"/>
-          </a:lnRef>
-          <a:fillRef idx="3">
-            <a:schemeClr val="accent1"/>
-          </a:fillRef>
-          <a:effectRef idx="2">
-            <a:schemeClr val="accent1"/>
-          </a:effectRef>
-          <a:fontRef idx="minor">
-            <a:schemeClr val="lt1"/>
-          </a:fontRef>
-        </p:style>
-        <p:txBody>
-          <a:bodyPr rtlCol="0" anchor="ctr"/>
-          <a:lstStyle/>
-          <a:p>
-            <a:pPr algn="ctr"/>
-          </a:p>
-        </p:txBody>
-      </p:sp>
-      <p:sp>
-        <p:nvSpPr>
-          <p:cNvPr id="17" name="Rectangle 16"/>
-          <p:cNvSpPr/>
-          <p:nvPr/>
-        </p:nvSpPr>
-        <p:spPr>
-          <a:xfrm>
-            <a:off x="1087820" y="4846310"/>
-            <a:ext cx="2627586" cy="3"/>
-          </a:xfrm>
-          <a:prstGeom prst="rect">
-            <a:avLst/>
-          </a:prstGeom>
-          <a:solidFill>
-            <a:srgbClr val="646464"/>
-          </a:solidFill>
-          <a:ln>
-            <a:noFill/>
-          </a:ln>
-        </p:spPr>
-        <p:style>
-          <a:lnRef idx="1">
-            <a:schemeClr val="accent1"/>
-          </a:lnRef>
-          <a:fillRef idx="3">
-            <a:schemeClr val="accent1"/>
-          </a:fillRef>
-          <a:effectRef idx="2">
-            <a:schemeClr val="accent1"/>
-          </a:effectRef>
-          <a:fontRef idx="minor">
-            <a:schemeClr val="lt1"/>
-          </a:fontRef>
-        </p:style>
-        <p:txBody>
-          <a:bodyPr rtlCol="0" anchor="ctr"/>
-          <a:lstStyle/>
-          <a:p>
-            <a:pPr algn="ctr"/>
-          </a:p>
-        </p:txBody>
-      </p:sp>
-      <p:sp>
-        <p:nvSpPr>
-          <p:cNvPr id="18" name="Rectangle 17"/>
-          <p:cNvSpPr/>
-          <p:nvPr/>
-        </p:nvSpPr>
-        <p:spPr>
-          <a:xfrm>
-            <a:off x="3715405" y="4846312"/>
-            <a:ext cx="3" cy="640088"/>
-          </a:xfrm>
-          <a:prstGeom prst="rect">
-            <a:avLst/>
-          </a:prstGeom>
-          <a:solidFill>
-            <a:srgbClr val="646464"/>
-          </a:solidFill>
-          <a:ln>
-            <a:noFill/>
-          </a:ln>
-        </p:spPr>
-        <p:style>
-          <a:lnRef idx="1">
-            <a:schemeClr val="accent1"/>
-          </a:lnRef>
-          <a:fillRef idx="3">
-            <a:schemeClr val="accent1"/>
-          </a:fillRef>
-          <a:effectRef idx="2">
-            <a:schemeClr val="accent1"/>
-          </a:effectRef>
-          <a:fontRef idx="minor">
-            <a:schemeClr val="lt1"/>
-          </a:fontRef>
-        </p:style>
-        <p:txBody>
-          <a:bodyPr rtlCol="0" anchor="ctr"/>
-          <a:lstStyle/>
-          <a:p>
-            <a:pPr algn="ctr"/>
-          </a:p>
-        </p:txBody>
-      </p:sp>
-      <p:sp>
-        <p:nvSpPr>
-          <p:cNvPr id="19" name="Rectangle 18"/>
-          <p:cNvSpPr/>
-          <p:nvPr/>
-        </p:nvSpPr>
-        <p:spPr>
-          <a:xfrm>
-            <a:off x="8970577" y="4206240"/>
-            <a:ext cx="3" cy="640096"/>
-          </a:xfrm>
-          <a:prstGeom prst="rect">
-            <a:avLst/>
-          </a:prstGeom>
-          <a:solidFill>
-            <a:srgbClr val="646464"/>
-          </a:solidFill>
-          <a:ln>
-            <a:noFill/>
-          </a:ln>
-        </p:spPr>
-        <p:style>
-          <a:lnRef idx="1">
-            <a:schemeClr val="accent1"/>
-          </a:lnRef>
-          <a:fillRef idx="3">
-            <a:schemeClr val="accent1"/>
-          </a:fillRef>
-          <a:effectRef idx="2">
-            <a:schemeClr val="accent1"/>
-          </a:effectRef>
-          <a:fontRef idx="minor">
-            <a:schemeClr val="lt1"/>
-          </a:fontRef>
-        </p:style>
-        <p:txBody>
-          <a:bodyPr rtlCol="0" anchor="ctr"/>
-          <a:lstStyle/>
-          <a:p>
-            <a:pPr algn="ctr"/>
-          </a:p>
-        </p:txBody>
-      </p:sp>
-      <p:sp>
-        <p:nvSpPr>
-          <p:cNvPr id="20" name="Rectangle 19"/>
-          <p:cNvSpPr/>
-          <p:nvPr/>
-        </p:nvSpPr>
-        <p:spPr>
-          <a:xfrm>
-            <a:off x="8970577" y="4846336"/>
-            <a:ext cx="3" cy="640064"/>
           </a:xfrm>
           <a:prstGeom prst="rect">
             <a:avLst/>
@@ -7059,7 +7059,7 @@
         <p:spPr>
           <a:xfrm>
             <a:off x="5029198" y="2011680"/>
-            <a:ext cx="3" cy="640064"/>
+            <a:ext cx="3" cy="640088"/>
           </a:xfrm>
           <a:prstGeom prst="rect">
             <a:avLst/>
@@ -7101,7 +7101,7 @@
         </p:nvSpPr>
         <p:spPr>
           <a:xfrm>
-            <a:off x="1005840" y="2651742"/>
+            <a:off x="1005840" y="2651766"/>
             <a:ext cx="4023360" cy="3"/>
           </a:xfrm>
           <a:prstGeom prst="rect">
@@ -7144,8 +7144,8 @@
         </p:nvSpPr>
         <p:spPr>
           <a:xfrm>
-            <a:off x="1005838" y="2651744"/>
-            <a:ext cx="3" cy="640096"/>
+            <a:off x="1005838" y="2651768"/>
+            <a:ext cx="3" cy="640072"/>
           </a:xfrm>
           <a:prstGeom prst="rect">
             <a:avLst/>
@@ -7188,7 +7188,7 @@
         <p:spPr>
           <a:xfrm>
             <a:off x="5029198" y="2011680"/>
-            <a:ext cx="3" cy="640064"/>
+            <a:ext cx="3" cy="640088"/>
           </a:xfrm>
           <a:prstGeom prst="rect">
             <a:avLst/>
@@ -7230,7 +7230,7 @@
         </p:nvSpPr>
         <p:spPr>
           <a:xfrm>
-            <a:off x="2615184" y="2651742"/>
+            <a:off x="2615184" y="2651766"/>
             <a:ext cx="2414016" cy="3"/>
           </a:xfrm>
           <a:prstGeom prst="rect">
@@ -7273,8 +7273,8 @@
         </p:nvSpPr>
         <p:spPr>
           <a:xfrm>
-            <a:off x="2615182" y="2651744"/>
-            <a:ext cx="3" cy="640096"/>
+            <a:off x="2615182" y="2651768"/>
+            <a:ext cx="3" cy="640072"/>
           </a:xfrm>
           <a:prstGeom prst="rect">
             <a:avLst/>
@@ -7317,7 +7317,7 @@
         <p:spPr>
           <a:xfrm>
             <a:off x="5029198" y="2011680"/>
-            <a:ext cx="3" cy="640064"/>
+            <a:ext cx="3" cy="640088"/>
           </a:xfrm>
           <a:prstGeom prst="rect">
             <a:avLst/>
@@ -7359,7 +7359,7 @@
         </p:nvSpPr>
         <p:spPr>
           <a:xfrm>
-            <a:off x="4224528" y="2651742"/>
+            <a:off x="4224528" y="2651766"/>
             <a:ext cx="804672" cy="3"/>
           </a:xfrm>
           <a:prstGeom prst="rect">
@@ -7402,8 +7402,8 @@
         </p:nvSpPr>
         <p:spPr>
           <a:xfrm>
-            <a:off x="4224526" y="2651744"/>
-            <a:ext cx="3" cy="640096"/>
+            <a:off x="4224526" y="2651768"/>
+            <a:ext cx="3" cy="640072"/>
           </a:xfrm>
           <a:prstGeom prst="rect">
             <a:avLst/>
@@ -7446,7 +7446,7 @@
         <p:spPr>
           <a:xfrm>
             <a:off x="5029198" y="2011680"/>
-            <a:ext cx="3" cy="640064"/>
+            <a:ext cx="3" cy="640088"/>
           </a:xfrm>
           <a:prstGeom prst="rect">
             <a:avLst/>
@@ -7488,7 +7488,7 @@
         </p:nvSpPr>
         <p:spPr>
           <a:xfrm>
-            <a:off x="5029200" y="2651742"/>
+            <a:off x="5029200" y="2651766"/>
             <a:ext cx="804671" cy="3"/>
           </a:xfrm>
           <a:prstGeom prst="rect">
@@ -7531,8 +7531,8 @@
         </p:nvSpPr>
         <p:spPr>
           <a:xfrm>
-            <a:off x="5833870" y="2651744"/>
-            <a:ext cx="3" cy="640096"/>
+            <a:off x="5833870" y="2651768"/>
+            <a:ext cx="3" cy="640072"/>
           </a:xfrm>
           <a:prstGeom prst="rect">
             <a:avLst/>
@@ -7575,7 +7575,7 @@
         <p:spPr>
           <a:xfrm>
             <a:off x="5029198" y="2011680"/>
-            <a:ext cx="3" cy="640064"/>
+            <a:ext cx="3" cy="640088"/>
           </a:xfrm>
           <a:prstGeom prst="rect">
             <a:avLst/>
@@ -7617,7 +7617,7 @@
         </p:nvSpPr>
         <p:spPr>
           <a:xfrm>
-            <a:off x="5029200" y="2651742"/>
+            <a:off x="5029200" y="2651766"/>
             <a:ext cx="2414015" cy="3"/>
           </a:xfrm>
           <a:prstGeom prst="rect">
@@ -7660,8 +7660,8 @@
         </p:nvSpPr>
         <p:spPr>
           <a:xfrm>
-            <a:off x="7443214" y="2651744"/>
-            <a:ext cx="3" cy="640096"/>
+            <a:off x="7443214" y="2651768"/>
+            <a:ext cx="3" cy="640072"/>
           </a:xfrm>
           <a:prstGeom prst="rect">
             <a:avLst/>
@@ -7704,7 +7704,7 @@
         <p:spPr>
           <a:xfrm>
             <a:off x="5029198" y="2011680"/>
-            <a:ext cx="3" cy="640064"/>
+            <a:ext cx="3" cy="640088"/>
           </a:xfrm>
           <a:prstGeom prst="rect">
             <a:avLst/>
@@ -7746,7 +7746,7 @@
         </p:nvSpPr>
         <p:spPr>
           <a:xfrm>
-            <a:off x="5029200" y="2651742"/>
+            <a:off x="5029200" y="2651766"/>
             <a:ext cx="4023360" cy="3"/>
           </a:xfrm>
           <a:prstGeom prst="rect">
@@ -7789,8 +7789,8 @@
         </p:nvSpPr>
         <p:spPr>
           <a:xfrm>
-            <a:off x="9052558" y="2651744"/>
-            <a:ext cx="3" cy="640096"/>
+            <a:off x="9052558" y="2651768"/>
+            <a:ext cx="3" cy="640072"/>
           </a:xfrm>
           <a:prstGeom prst="rect">
             <a:avLst/>
@@ -7833,7 +7833,7 @@
         <p:spPr>
           <a:xfrm>
             <a:off x="5029198" y="2011680"/>
-            <a:ext cx="3" cy="1737344"/>
+            <a:ext cx="3" cy="1737368"/>
           </a:xfrm>
           <a:prstGeom prst="rect">
             <a:avLst/>
@@ -7875,8 +7875,8 @@
         </p:nvSpPr>
         <p:spPr>
           <a:xfrm>
-            <a:off x="5029198" y="3749024"/>
-            <a:ext cx="3" cy="1737376"/>
+            <a:off x="5029198" y="3749048"/>
+            <a:ext cx="3" cy="1737352"/>
           </a:xfrm>
           <a:prstGeom prst="rect">
             <a:avLst/>
@@ -8494,7 +8494,7 @@
         <p:spPr>
           <a:xfrm>
             <a:off x="3185650" y="4206240"/>
-            <a:ext cx="3" cy="640080"/>
+            <a:ext cx="3" cy="640064"/>
           </a:xfrm>
           <a:prstGeom prst="rect">
             <a:avLst/>
@@ -8536,7 +8536,7 @@
         </p:nvSpPr>
         <p:spPr>
           <a:xfrm>
-            <a:off x="1342103" y="4846318"/>
+            <a:off x="1342103" y="4846302"/>
             <a:ext cx="1843548" cy="3"/>
           </a:xfrm>
           <a:prstGeom prst="rect">
@@ -8579,8 +8579,8 @@
         </p:nvSpPr>
         <p:spPr>
           <a:xfrm>
-            <a:off x="1342101" y="4846320"/>
-            <a:ext cx="3" cy="640080"/>
+            <a:off x="1342101" y="4846304"/>
+            <a:ext cx="3" cy="640096"/>
           </a:xfrm>
           <a:prstGeom prst="rect">
             <a:avLst/>
@@ -8623,7 +8623,7 @@
         <p:spPr>
           <a:xfrm>
             <a:off x="3185650" y="4206240"/>
-            <a:ext cx="3" cy="640080"/>
+            <a:ext cx="3" cy="640064"/>
           </a:xfrm>
           <a:prstGeom prst="rect">
             <a:avLst/>
@@ -8665,7 +8665,7 @@
         </p:nvSpPr>
         <p:spPr>
           <a:xfrm>
-            <a:off x="3185651" y="4846318"/>
+            <a:off x="3185651" y="4846302"/>
             <a:ext cx="1843548" cy="3"/>
           </a:xfrm>
           <a:prstGeom prst="rect">
@@ -8708,8 +8708,8 @@
         </p:nvSpPr>
         <p:spPr>
           <a:xfrm>
-            <a:off x="5029198" y="4846320"/>
-            <a:ext cx="3" cy="640080"/>
+            <a:off x="5029198" y="4846304"/>
+            <a:ext cx="3" cy="640096"/>
           </a:xfrm>
           <a:prstGeom prst="rect">
             <a:avLst/>
@@ -8752,7 +8752,7 @@
         <p:spPr>
           <a:xfrm>
             <a:off x="3185650" y="4206240"/>
-            <a:ext cx="3" cy="640080"/>
+            <a:ext cx="3" cy="640064"/>
           </a:xfrm>
           <a:prstGeom prst="rect">
             <a:avLst/>
@@ -8794,7 +8794,7 @@
         </p:nvSpPr>
         <p:spPr>
           <a:xfrm>
-            <a:off x="3185651" y="4846318"/>
+            <a:off x="3185651" y="4846302"/>
             <a:ext cx="5530645" cy="3"/>
           </a:xfrm>
           <a:prstGeom prst="rect">
@@ -8837,8 +8837,8 @@
         </p:nvSpPr>
         <p:spPr>
           <a:xfrm>
-            <a:off x="8716295" y="4846320"/>
-            <a:ext cx="3" cy="640080"/>
+            <a:off x="8716295" y="4846304"/>
+            <a:ext cx="3" cy="640096"/>
           </a:xfrm>
           <a:prstGeom prst="rect">
             <a:avLst/>
@@ -8881,7 +8881,7 @@
         <p:spPr>
           <a:xfrm>
             <a:off x="5029198" y="2011680"/>
-            <a:ext cx="3" cy="640064"/>
+            <a:ext cx="3" cy="640088"/>
           </a:xfrm>
           <a:prstGeom prst="rect">
             <a:avLst/>
@@ -8923,7 +8923,7 @@
         </p:nvSpPr>
         <p:spPr>
           <a:xfrm>
-            <a:off x="3185651" y="2651742"/>
+            <a:off x="3185651" y="2651766"/>
             <a:ext cx="1843548" cy="3"/>
           </a:xfrm>
           <a:prstGeom prst="rect">
@@ -8966,8 +8966,8 @@
         </p:nvSpPr>
         <p:spPr>
           <a:xfrm>
-            <a:off x="3185650" y="2651744"/>
-            <a:ext cx="3" cy="640096"/>
+            <a:off x="3185650" y="2651768"/>
+            <a:ext cx="3" cy="640072"/>
           </a:xfrm>
           <a:prstGeom prst="rect">
             <a:avLst/>
@@ -9010,7 +9010,7 @@
         <p:spPr>
           <a:xfrm>
             <a:off x="5029198" y="2011680"/>
-            <a:ext cx="3" cy="640064"/>
+            <a:ext cx="3" cy="640088"/>
           </a:xfrm>
           <a:prstGeom prst="rect">
             <a:avLst/>
@@ -9052,7 +9052,7 @@
         </p:nvSpPr>
         <p:spPr>
           <a:xfrm>
-            <a:off x="5029200" y="2651742"/>
+            <a:off x="5029200" y="2651766"/>
             <a:ext cx="1843548" cy="3"/>
           </a:xfrm>
           <a:prstGeom prst="rect">
@@ -9095,8 +9095,8 @@
         </p:nvSpPr>
         <p:spPr>
           <a:xfrm>
-            <a:off x="6872746" y="2651744"/>
-            <a:ext cx="3" cy="640096"/>
+            <a:off x="6872746" y="2651768"/>
+            <a:ext cx="3" cy="640072"/>
           </a:xfrm>
           <a:prstGeom prst="rect">
             <a:avLst/>
@@ -9558,7 +9558,7 @@
         <p:spPr>
           <a:xfrm>
             <a:off x="5029198" y="2011680"/>
-            <a:ext cx="3" cy="640064"/>
+            <a:ext cx="3" cy="640080"/>
           </a:xfrm>
           <a:prstGeom prst="rect">
             <a:avLst/>
@@ -9600,7 +9600,7 @@
         </p:nvSpPr>
         <p:spPr>
           <a:xfrm>
-            <a:off x="1342103" y="2651742"/>
+            <a:off x="1342103" y="2651758"/>
             <a:ext cx="3687096" cy="3"/>
           </a:xfrm>
           <a:prstGeom prst="rect">
@@ -9643,8 +9643,8 @@
         </p:nvSpPr>
         <p:spPr>
           <a:xfrm>
-            <a:off x="1342101" y="2651744"/>
-            <a:ext cx="3" cy="640096"/>
+            <a:off x="1342101" y="2651760"/>
+            <a:ext cx="3" cy="640080"/>
           </a:xfrm>
           <a:prstGeom prst="rect">
             <a:avLst/>
@@ -9687,7 +9687,7 @@
         <p:spPr>
           <a:xfrm>
             <a:off x="5029198" y="2011680"/>
-            <a:ext cx="3" cy="640064"/>
+            <a:ext cx="3" cy="640080"/>
           </a:xfrm>
           <a:prstGeom prst="rect">
             <a:avLst/>
@@ -9729,8 +9729,8 @@
         </p:nvSpPr>
         <p:spPr>
           <a:xfrm>
-            <a:off x="5029198" y="2651744"/>
-            <a:ext cx="3" cy="640096"/>
+            <a:off x="5029198" y="2651760"/>
+            <a:ext cx="3" cy="640080"/>
           </a:xfrm>
           <a:prstGeom prst="rect">
             <a:avLst/>
@@ -9773,7 +9773,7 @@
         <p:spPr>
           <a:xfrm>
             <a:off x="5029198" y="2011680"/>
-            <a:ext cx="3" cy="640064"/>
+            <a:ext cx="3" cy="640080"/>
           </a:xfrm>
           <a:prstGeom prst="rect">
             <a:avLst/>
@@ -9815,7 +9815,7 @@
         </p:nvSpPr>
         <p:spPr>
           <a:xfrm>
-            <a:off x="5029200" y="2651742"/>
+            <a:off x="5029200" y="2651758"/>
             <a:ext cx="3687096" cy="3"/>
           </a:xfrm>
           <a:prstGeom prst="rect">
@@ -9858,8 +9858,8 @@
         </p:nvSpPr>
         <p:spPr>
           <a:xfrm>
-            <a:off x="8716295" y="2651744"/>
-            <a:ext cx="3" cy="640096"/>
+            <a:off x="8716295" y="2651760"/>
+            <a:ext cx="3" cy="640080"/>
           </a:xfrm>
           <a:prstGeom prst="rect">
             <a:avLst/>
@@ -10399,7 +10399,7 @@
         <p:spPr>
           <a:xfrm>
             <a:off x="5029198" y="2011680"/>
-            <a:ext cx="3" cy="640080"/>
+            <a:ext cx="3" cy="640088"/>
           </a:xfrm>
           <a:prstGeom prst="rect">
             <a:avLst/>
@@ -10441,7 +10441,7 @@
         </p:nvSpPr>
         <p:spPr>
           <a:xfrm>
-            <a:off x="1087820" y="2651758"/>
+            <a:off x="1087820" y="2651766"/>
             <a:ext cx="3941379" cy="3"/>
           </a:xfrm>
           <a:prstGeom prst="rect">
@@ -10484,8 +10484,8 @@
         </p:nvSpPr>
         <p:spPr>
           <a:xfrm>
-            <a:off x="1087819" y="2651760"/>
-            <a:ext cx="3" cy="640080"/>
+            <a:off x="1087819" y="2651768"/>
+            <a:ext cx="3" cy="640072"/>
           </a:xfrm>
           <a:prstGeom prst="rect">
             <a:avLst/>
@@ -10528,7 +10528,7 @@
         <p:spPr>
           <a:xfrm>
             <a:off x="5029198" y="2011680"/>
-            <a:ext cx="3" cy="640080"/>
+            <a:ext cx="3" cy="640088"/>
           </a:xfrm>
           <a:prstGeom prst="rect">
             <a:avLst/>
@@ -10570,7 +10570,7 @@
         </p:nvSpPr>
         <p:spPr>
           <a:xfrm>
-            <a:off x="3715406" y="2651758"/>
+            <a:off x="3715406" y="2651766"/>
             <a:ext cx="1313793" cy="3"/>
           </a:xfrm>
           <a:prstGeom prst="rect">
@@ -10613,8 +10613,8 @@
         </p:nvSpPr>
         <p:spPr>
           <a:xfrm>
-            <a:off x="3715405" y="2651760"/>
-            <a:ext cx="3" cy="640080"/>
+            <a:off x="3715405" y="2651768"/>
+            <a:ext cx="3" cy="640072"/>
           </a:xfrm>
           <a:prstGeom prst="rect">
             <a:avLst/>
@@ -10657,7 +10657,7 @@
         <p:spPr>
           <a:xfrm>
             <a:off x="5029198" y="2011680"/>
-            <a:ext cx="3" cy="640080"/>
+            <a:ext cx="3" cy="640088"/>
           </a:xfrm>
           <a:prstGeom prst="rect">
             <a:avLst/>
@@ -10699,7 +10699,7 @@
         </p:nvSpPr>
         <p:spPr>
           <a:xfrm>
-            <a:off x="5029200" y="2651758"/>
+            <a:off x="5029200" y="2651766"/>
             <a:ext cx="1313793" cy="3"/>
           </a:xfrm>
           <a:prstGeom prst="rect">
@@ -10742,8 +10742,8 @@
         </p:nvSpPr>
         <p:spPr>
           <a:xfrm>
-            <a:off x="6342991" y="2651760"/>
-            <a:ext cx="3" cy="640080"/>
+            <a:off x="6342991" y="2651768"/>
+            <a:ext cx="3" cy="640072"/>
           </a:xfrm>
           <a:prstGeom prst="rect">
             <a:avLst/>
@@ -10786,7 +10786,7 @@
         <p:spPr>
           <a:xfrm>
             <a:off x="5029198" y="2011680"/>
-            <a:ext cx="3" cy="640080"/>
+            <a:ext cx="3" cy="640088"/>
           </a:xfrm>
           <a:prstGeom prst="rect">
             <a:avLst/>
@@ -10828,7 +10828,7 @@
         </p:nvSpPr>
         <p:spPr>
           <a:xfrm>
-            <a:off x="5029200" y="2651758"/>
+            <a:off x="5029200" y="2651766"/>
             <a:ext cx="3941379" cy="3"/>
           </a:xfrm>
           <a:prstGeom prst="rect">
@@ -10871,8 +10871,8 @@
         </p:nvSpPr>
         <p:spPr>
           <a:xfrm>
-            <a:off x="8970577" y="2651760"/>
-            <a:ext cx="3" cy="640080"/>
+            <a:off x="8970577" y="2651768"/>
+            <a:ext cx="3" cy="640072"/>
           </a:xfrm>
           <a:prstGeom prst="rect">
             <a:avLst/>
@@ -12060,7 +12060,7 @@
         <p:spPr>
           <a:xfrm>
             <a:off x="3017518" y="4206240"/>
-            <a:ext cx="3" cy="640080"/>
+            <a:ext cx="3" cy="640096"/>
           </a:xfrm>
           <a:prstGeom prst="rect">
             <a:avLst/>
@@ -12102,7 +12102,7 @@
         </p:nvSpPr>
         <p:spPr>
           <a:xfrm>
-            <a:off x="2011679" y="4846318"/>
+            <a:off x="2011679" y="4846334"/>
             <a:ext cx="1005840" cy="3"/>
           </a:xfrm>
           <a:prstGeom prst="rect">
@@ -12145,8 +12145,8 @@
         </p:nvSpPr>
         <p:spPr>
           <a:xfrm>
-            <a:off x="2011678" y="4846320"/>
-            <a:ext cx="3" cy="640080"/>
+            <a:off x="2011678" y="4846336"/>
+            <a:ext cx="3" cy="640064"/>
           </a:xfrm>
           <a:prstGeom prst="rect">
             <a:avLst/>
@@ -12189,6 +12189,92 @@
         <p:spPr>
           <a:xfrm>
             <a:off x="7040878" y="4206240"/>
+            <a:ext cx="3" cy="640088"/>
+          </a:xfrm>
+          <a:prstGeom prst="rect">
+            <a:avLst/>
+          </a:prstGeom>
+          <a:solidFill>
+            <a:srgbClr val="646464"/>
+          </a:solidFill>
+          <a:ln>
+            <a:noFill/>
+          </a:ln>
+        </p:spPr>
+        <p:style>
+          <a:lnRef idx="1">
+            <a:schemeClr val="accent1"/>
+          </a:lnRef>
+          <a:fillRef idx="3">
+            <a:schemeClr val="accent1"/>
+          </a:fillRef>
+          <a:effectRef idx="2">
+            <a:schemeClr val="accent1"/>
+          </a:effectRef>
+          <a:fontRef idx="minor">
+            <a:schemeClr val="lt1"/>
+          </a:fontRef>
+        </p:style>
+        <p:txBody>
+          <a:bodyPr rtlCol="0" anchor="ctr"/>
+          <a:lstStyle/>
+          <a:p>
+            <a:pPr algn="ctr"/>
+          </a:p>
+        </p:txBody>
+      </p:sp>
+      <p:sp>
+        <p:nvSpPr>
+          <p:cNvPr id="23" name="Rectangle 22"/>
+          <p:cNvSpPr/>
+          <p:nvPr/>
+        </p:nvSpPr>
+        <p:spPr>
+          <a:xfrm>
+            <a:off x="4023360" y="4846326"/>
+            <a:ext cx="3017520" cy="3"/>
+          </a:xfrm>
+          <a:prstGeom prst="rect">
+            <a:avLst/>
+          </a:prstGeom>
+          <a:solidFill>
+            <a:srgbClr val="646464"/>
+          </a:solidFill>
+          <a:ln>
+            <a:noFill/>
+          </a:ln>
+        </p:spPr>
+        <p:style>
+          <a:lnRef idx="1">
+            <a:schemeClr val="accent1"/>
+          </a:lnRef>
+          <a:fillRef idx="3">
+            <a:schemeClr val="accent1"/>
+          </a:fillRef>
+          <a:effectRef idx="2">
+            <a:schemeClr val="accent1"/>
+          </a:effectRef>
+          <a:fontRef idx="minor">
+            <a:schemeClr val="lt1"/>
+          </a:fontRef>
+        </p:style>
+        <p:txBody>
+          <a:bodyPr rtlCol="0" anchor="ctr"/>
+          <a:lstStyle/>
+          <a:p>
+            <a:pPr algn="ctr"/>
+          </a:p>
+        </p:txBody>
+      </p:sp>
+      <p:sp>
+        <p:nvSpPr>
+          <p:cNvPr id="24" name="Rectangle 23"/>
+          <p:cNvSpPr/>
+          <p:nvPr/>
+        </p:nvSpPr>
+        <p:spPr>
+          <a:xfrm>
+            <a:off x="4023358" y="4846328"/>
             <a:ext cx="3" cy="640072"/>
           </a:xfrm>
           <a:prstGeom prst="rect">
@@ -12225,14 +12311,14 @@
       </p:sp>
       <p:sp>
         <p:nvSpPr>
-          <p:cNvPr id="23" name="Rectangle 22"/>
-          <p:cNvSpPr/>
-          <p:nvPr/>
-        </p:nvSpPr>
-        <p:spPr>
-          <a:xfrm>
-            <a:off x="4023360" y="4846310"/>
-            <a:ext cx="3017520" cy="3"/>
+          <p:cNvPr id="25" name="Rectangle 24"/>
+          <p:cNvSpPr/>
+          <p:nvPr/>
+        </p:nvSpPr>
+        <p:spPr>
+          <a:xfrm>
+            <a:off x="5029198" y="2011680"/>
+            <a:ext cx="3" cy="640064"/>
           </a:xfrm>
           <a:prstGeom prst="rect">
             <a:avLst/>
@@ -12268,14 +12354,14 @@
       </p:sp>
       <p:sp>
         <p:nvSpPr>
-          <p:cNvPr id="24" name="Rectangle 23"/>
-          <p:cNvSpPr/>
-          <p:nvPr/>
-        </p:nvSpPr>
-        <p:spPr>
-          <a:xfrm>
-            <a:off x="4023358" y="4846312"/>
-            <a:ext cx="3" cy="640088"/>
+          <p:cNvPr id="26" name="Rectangle 25"/>
+          <p:cNvSpPr/>
+          <p:nvPr/>
+        </p:nvSpPr>
+        <p:spPr>
+          <a:xfrm>
+            <a:off x="1005840" y="2651742"/>
+            <a:ext cx="4023360" cy="3"/>
           </a:xfrm>
           <a:prstGeom prst="rect">
             <a:avLst/>
@@ -12311,14 +12397,57 @@
       </p:sp>
       <p:sp>
         <p:nvSpPr>
-          <p:cNvPr id="25" name="Rectangle 24"/>
+          <p:cNvPr id="27" name="Rectangle 26"/>
+          <p:cNvSpPr/>
+          <p:nvPr/>
+        </p:nvSpPr>
+        <p:spPr>
+          <a:xfrm>
+            <a:off x="1005838" y="2651744"/>
+            <a:ext cx="3" cy="640096"/>
+          </a:xfrm>
+          <a:prstGeom prst="rect">
+            <a:avLst/>
+          </a:prstGeom>
+          <a:solidFill>
+            <a:srgbClr val="646464"/>
+          </a:solidFill>
+          <a:ln>
+            <a:noFill/>
+          </a:ln>
+        </p:spPr>
+        <p:style>
+          <a:lnRef idx="1">
+            <a:schemeClr val="accent1"/>
+          </a:lnRef>
+          <a:fillRef idx="3">
+            <a:schemeClr val="accent1"/>
+          </a:fillRef>
+          <a:effectRef idx="2">
+            <a:schemeClr val="accent1"/>
+          </a:effectRef>
+          <a:fontRef idx="minor">
+            <a:schemeClr val="lt1"/>
+          </a:fontRef>
+        </p:style>
+        <p:txBody>
+          <a:bodyPr rtlCol="0" anchor="ctr"/>
+          <a:lstStyle/>
+          <a:p>
+            <a:pPr algn="ctr"/>
+          </a:p>
+        </p:txBody>
+      </p:sp>
+      <p:sp>
+        <p:nvSpPr>
+          <p:cNvPr id="28" name="Rectangle 27"/>
           <p:cNvSpPr/>
           <p:nvPr/>
         </p:nvSpPr>
         <p:spPr>
           <a:xfrm>
             <a:off x="5029198" y="2011680"/>
-            <a:ext cx="3" cy="640088"/>
+            <a:ext cx="3" cy="640064"/>
           </a:xfrm>
           <a:prstGeom prst="rect">
             <a:avLst/>
@@ -12354,13 +12483,357 @@
       </p:sp>
       <p:sp>
         <p:nvSpPr>
-          <p:cNvPr id="26" name="Rectangle 25"/>
-          <p:cNvSpPr/>
-          <p:nvPr/>
-        </p:nvSpPr>
-        <p:spPr>
-          <a:xfrm>
-            <a:off x="1005840" y="2651766"/>
+          <p:cNvPr id="29" name="Rectangle 28"/>
+          <p:cNvSpPr/>
+          <p:nvPr/>
+        </p:nvSpPr>
+        <p:spPr>
+          <a:xfrm>
+            <a:off x="3017520" y="2651742"/>
+            <a:ext cx="2011680" cy="3"/>
+          </a:xfrm>
+          <a:prstGeom prst="rect">
+            <a:avLst/>
+          </a:prstGeom>
+          <a:solidFill>
+            <a:srgbClr val="646464"/>
+          </a:solidFill>
+          <a:ln>
+            <a:noFill/>
+          </a:ln>
+        </p:spPr>
+        <p:style>
+          <a:lnRef idx="1">
+            <a:schemeClr val="accent1"/>
+          </a:lnRef>
+          <a:fillRef idx="3">
+            <a:schemeClr val="accent1"/>
+          </a:fillRef>
+          <a:effectRef idx="2">
+            <a:schemeClr val="accent1"/>
+          </a:effectRef>
+          <a:fontRef idx="minor">
+            <a:schemeClr val="lt1"/>
+          </a:fontRef>
+        </p:style>
+        <p:txBody>
+          <a:bodyPr rtlCol="0" anchor="ctr"/>
+          <a:lstStyle/>
+          <a:p>
+            <a:pPr algn="ctr"/>
+          </a:p>
+        </p:txBody>
+      </p:sp>
+      <p:sp>
+        <p:nvSpPr>
+          <p:cNvPr id="30" name="Rectangle 29"/>
+          <p:cNvSpPr/>
+          <p:nvPr/>
+        </p:nvSpPr>
+        <p:spPr>
+          <a:xfrm>
+            <a:off x="3017518" y="2651744"/>
+            <a:ext cx="3" cy="640096"/>
+          </a:xfrm>
+          <a:prstGeom prst="rect">
+            <a:avLst/>
+          </a:prstGeom>
+          <a:solidFill>
+            <a:srgbClr val="646464"/>
+          </a:solidFill>
+          <a:ln>
+            <a:noFill/>
+          </a:ln>
+        </p:spPr>
+        <p:style>
+          <a:lnRef idx="1">
+            <a:schemeClr val="accent1"/>
+          </a:lnRef>
+          <a:fillRef idx="3">
+            <a:schemeClr val="accent1"/>
+          </a:fillRef>
+          <a:effectRef idx="2">
+            <a:schemeClr val="accent1"/>
+          </a:effectRef>
+          <a:fontRef idx="minor">
+            <a:schemeClr val="lt1"/>
+          </a:fontRef>
+        </p:style>
+        <p:txBody>
+          <a:bodyPr rtlCol="0" anchor="ctr"/>
+          <a:lstStyle/>
+          <a:p>
+            <a:pPr algn="ctr"/>
+          </a:p>
+        </p:txBody>
+      </p:sp>
+      <p:sp>
+        <p:nvSpPr>
+          <p:cNvPr id="31" name="Rectangle 30"/>
+          <p:cNvSpPr/>
+          <p:nvPr/>
+        </p:nvSpPr>
+        <p:spPr>
+          <a:xfrm>
+            <a:off x="5029198" y="2011680"/>
+            <a:ext cx="3" cy="640064"/>
+          </a:xfrm>
+          <a:prstGeom prst="rect">
+            <a:avLst/>
+          </a:prstGeom>
+          <a:solidFill>
+            <a:srgbClr val="646464"/>
+          </a:solidFill>
+          <a:ln>
+            <a:noFill/>
+          </a:ln>
+        </p:spPr>
+        <p:style>
+          <a:lnRef idx="1">
+            <a:schemeClr val="accent1"/>
+          </a:lnRef>
+          <a:fillRef idx="3">
+            <a:schemeClr val="accent1"/>
+          </a:fillRef>
+          <a:effectRef idx="2">
+            <a:schemeClr val="accent1"/>
+          </a:effectRef>
+          <a:fontRef idx="minor">
+            <a:schemeClr val="lt1"/>
+          </a:fontRef>
+        </p:style>
+        <p:txBody>
+          <a:bodyPr rtlCol="0" anchor="ctr"/>
+          <a:lstStyle/>
+          <a:p>
+            <a:pPr algn="ctr"/>
+          </a:p>
+        </p:txBody>
+      </p:sp>
+      <p:sp>
+        <p:nvSpPr>
+          <p:cNvPr id="32" name="Rectangle 31"/>
+          <p:cNvSpPr/>
+          <p:nvPr/>
+        </p:nvSpPr>
+        <p:spPr>
+          <a:xfrm>
+            <a:off x="5029198" y="2651744"/>
+            <a:ext cx="3" cy="640096"/>
+          </a:xfrm>
+          <a:prstGeom prst="rect">
+            <a:avLst/>
+          </a:prstGeom>
+          <a:solidFill>
+            <a:srgbClr val="646464"/>
+          </a:solidFill>
+          <a:ln>
+            <a:noFill/>
+          </a:ln>
+        </p:spPr>
+        <p:style>
+          <a:lnRef idx="1">
+            <a:schemeClr val="accent1"/>
+          </a:lnRef>
+          <a:fillRef idx="3">
+            <a:schemeClr val="accent1"/>
+          </a:fillRef>
+          <a:effectRef idx="2">
+            <a:schemeClr val="accent1"/>
+          </a:effectRef>
+          <a:fontRef idx="minor">
+            <a:schemeClr val="lt1"/>
+          </a:fontRef>
+        </p:style>
+        <p:txBody>
+          <a:bodyPr rtlCol="0" anchor="ctr"/>
+          <a:lstStyle/>
+          <a:p>
+            <a:pPr algn="ctr"/>
+          </a:p>
+        </p:txBody>
+      </p:sp>
+      <p:sp>
+        <p:nvSpPr>
+          <p:cNvPr id="33" name="Rectangle 32"/>
+          <p:cNvSpPr/>
+          <p:nvPr/>
+        </p:nvSpPr>
+        <p:spPr>
+          <a:xfrm>
+            <a:off x="5029198" y="2011680"/>
+            <a:ext cx="3" cy="640064"/>
+          </a:xfrm>
+          <a:prstGeom prst="rect">
+            <a:avLst/>
+          </a:prstGeom>
+          <a:solidFill>
+            <a:srgbClr val="646464"/>
+          </a:solidFill>
+          <a:ln>
+            <a:noFill/>
+          </a:ln>
+        </p:spPr>
+        <p:style>
+          <a:lnRef idx="1">
+            <a:schemeClr val="accent1"/>
+          </a:lnRef>
+          <a:fillRef idx="3">
+            <a:schemeClr val="accent1"/>
+          </a:fillRef>
+          <a:effectRef idx="2">
+            <a:schemeClr val="accent1"/>
+          </a:effectRef>
+          <a:fontRef idx="minor">
+            <a:schemeClr val="lt1"/>
+          </a:fontRef>
+        </p:style>
+        <p:txBody>
+          <a:bodyPr rtlCol="0" anchor="ctr"/>
+          <a:lstStyle/>
+          <a:p>
+            <a:pPr algn="ctr"/>
+          </a:p>
+        </p:txBody>
+      </p:sp>
+      <p:sp>
+        <p:nvSpPr>
+          <p:cNvPr id="34" name="Rectangle 33"/>
+          <p:cNvSpPr/>
+          <p:nvPr/>
+        </p:nvSpPr>
+        <p:spPr>
+          <a:xfrm>
+            <a:off x="5029200" y="2651742"/>
+            <a:ext cx="2011680" cy="3"/>
+          </a:xfrm>
+          <a:prstGeom prst="rect">
+            <a:avLst/>
+          </a:prstGeom>
+          <a:solidFill>
+            <a:srgbClr val="646464"/>
+          </a:solidFill>
+          <a:ln>
+            <a:noFill/>
+          </a:ln>
+        </p:spPr>
+        <p:style>
+          <a:lnRef idx="1">
+            <a:schemeClr val="accent1"/>
+          </a:lnRef>
+          <a:fillRef idx="3">
+            <a:schemeClr val="accent1"/>
+          </a:fillRef>
+          <a:effectRef idx="2">
+            <a:schemeClr val="accent1"/>
+          </a:effectRef>
+          <a:fontRef idx="minor">
+            <a:schemeClr val="lt1"/>
+          </a:fontRef>
+        </p:style>
+        <p:txBody>
+          <a:bodyPr rtlCol="0" anchor="ctr"/>
+          <a:lstStyle/>
+          <a:p>
+            <a:pPr algn="ctr"/>
+          </a:p>
+        </p:txBody>
+      </p:sp>
+      <p:sp>
+        <p:nvSpPr>
+          <p:cNvPr id="35" name="Rectangle 34"/>
+          <p:cNvSpPr/>
+          <p:nvPr/>
+        </p:nvSpPr>
+        <p:spPr>
+          <a:xfrm>
+            <a:off x="7040878" y="2651744"/>
+            <a:ext cx="3" cy="640096"/>
+          </a:xfrm>
+          <a:prstGeom prst="rect">
+            <a:avLst/>
+          </a:prstGeom>
+          <a:solidFill>
+            <a:srgbClr val="646464"/>
+          </a:solidFill>
+          <a:ln>
+            <a:noFill/>
+          </a:ln>
+        </p:spPr>
+        <p:style>
+          <a:lnRef idx="1">
+            <a:schemeClr val="accent1"/>
+          </a:lnRef>
+          <a:fillRef idx="3">
+            <a:schemeClr val="accent1"/>
+          </a:fillRef>
+          <a:effectRef idx="2">
+            <a:schemeClr val="accent1"/>
+          </a:effectRef>
+          <a:fontRef idx="minor">
+            <a:schemeClr val="lt1"/>
+          </a:fontRef>
+        </p:style>
+        <p:txBody>
+          <a:bodyPr rtlCol="0" anchor="ctr"/>
+          <a:lstStyle/>
+          <a:p>
+            <a:pPr algn="ctr"/>
+          </a:p>
+        </p:txBody>
+      </p:sp>
+      <p:sp>
+        <p:nvSpPr>
+          <p:cNvPr id="36" name="Rectangle 35"/>
+          <p:cNvSpPr/>
+          <p:nvPr/>
+        </p:nvSpPr>
+        <p:spPr>
+          <a:xfrm>
+            <a:off x="5029198" y="2011680"/>
+            <a:ext cx="3" cy="640064"/>
+          </a:xfrm>
+          <a:prstGeom prst="rect">
+            <a:avLst/>
+          </a:prstGeom>
+          <a:solidFill>
+            <a:srgbClr val="646464"/>
+          </a:solidFill>
+          <a:ln>
+            <a:noFill/>
+          </a:ln>
+        </p:spPr>
+        <p:style>
+          <a:lnRef idx="1">
+            <a:schemeClr val="accent1"/>
+          </a:lnRef>
+          <a:fillRef idx="3">
+            <a:schemeClr val="accent1"/>
+          </a:fillRef>
+          <a:effectRef idx="2">
+            <a:schemeClr val="accent1"/>
+          </a:effectRef>
+          <a:fontRef idx="minor">
+            <a:schemeClr val="lt1"/>
+          </a:fontRef>
+        </p:style>
+        <p:txBody>
+          <a:bodyPr rtlCol="0" anchor="ctr"/>
+          <a:lstStyle/>
+          <a:p>
+            <a:pPr algn="ctr"/>
+          </a:p>
+        </p:txBody>
+      </p:sp>
+      <p:sp>
+        <p:nvSpPr>
+          <p:cNvPr id="37" name="Rectangle 36"/>
+          <p:cNvSpPr/>
+          <p:nvPr/>
+        </p:nvSpPr>
+        <p:spPr>
+          <a:xfrm>
+            <a:off x="5029200" y="2651742"/>
             <a:ext cx="4023360" cy="3"/>
           </a:xfrm>
           <a:prstGeom prst="rect">
@@ -12397,487 +12870,14 @@
       </p:sp>
       <p:sp>
         <p:nvSpPr>
-          <p:cNvPr id="27" name="Rectangle 26"/>
-          <p:cNvSpPr/>
-          <p:nvPr/>
-        </p:nvSpPr>
-        <p:spPr>
-          <a:xfrm>
-            <a:off x="1005838" y="2651768"/>
-            <a:ext cx="3" cy="640072"/>
-          </a:xfrm>
-          <a:prstGeom prst="rect">
-            <a:avLst/>
-          </a:prstGeom>
-          <a:solidFill>
-            <a:srgbClr val="646464"/>
-          </a:solidFill>
-          <a:ln>
-            <a:noFill/>
-          </a:ln>
-        </p:spPr>
-        <p:style>
-          <a:lnRef idx="1">
-            <a:schemeClr val="accent1"/>
-          </a:lnRef>
-          <a:fillRef idx="3">
-            <a:schemeClr val="accent1"/>
-          </a:fillRef>
-          <a:effectRef idx="2">
-            <a:schemeClr val="accent1"/>
-          </a:effectRef>
-          <a:fontRef idx="minor">
-            <a:schemeClr val="lt1"/>
-          </a:fontRef>
-        </p:style>
-        <p:txBody>
-          <a:bodyPr rtlCol="0" anchor="ctr"/>
-          <a:lstStyle/>
-          <a:p>
-            <a:pPr algn="ctr"/>
-          </a:p>
-        </p:txBody>
-      </p:sp>
-      <p:sp>
-        <p:nvSpPr>
-          <p:cNvPr id="28" name="Rectangle 27"/>
-          <p:cNvSpPr/>
-          <p:nvPr/>
-        </p:nvSpPr>
-        <p:spPr>
-          <a:xfrm>
-            <a:off x="5029198" y="2011680"/>
-            <a:ext cx="3" cy="640088"/>
-          </a:xfrm>
-          <a:prstGeom prst="rect">
-            <a:avLst/>
-          </a:prstGeom>
-          <a:solidFill>
-            <a:srgbClr val="646464"/>
-          </a:solidFill>
-          <a:ln>
-            <a:noFill/>
-          </a:ln>
-        </p:spPr>
-        <p:style>
-          <a:lnRef idx="1">
-            <a:schemeClr val="accent1"/>
-          </a:lnRef>
-          <a:fillRef idx="3">
-            <a:schemeClr val="accent1"/>
-          </a:fillRef>
-          <a:effectRef idx="2">
-            <a:schemeClr val="accent1"/>
-          </a:effectRef>
-          <a:fontRef idx="minor">
-            <a:schemeClr val="lt1"/>
-          </a:fontRef>
-        </p:style>
-        <p:txBody>
-          <a:bodyPr rtlCol="0" anchor="ctr"/>
-          <a:lstStyle/>
-          <a:p>
-            <a:pPr algn="ctr"/>
-          </a:p>
-        </p:txBody>
-      </p:sp>
-      <p:sp>
-        <p:nvSpPr>
-          <p:cNvPr id="29" name="Rectangle 28"/>
-          <p:cNvSpPr/>
-          <p:nvPr/>
-        </p:nvSpPr>
-        <p:spPr>
-          <a:xfrm>
-            <a:off x="3017520" y="2651766"/>
-            <a:ext cx="2011680" cy="3"/>
-          </a:xfrm>
-          <a:prstGeom prst="rect">
-            <a:avLst/>
-          </a:prstGeom>
-          <a:solidFill>
-            <a:srgbClr val="646464"/>
-          </a:solidFill>
-          <a:ln>
-            <a:noFill/>
-          </a:ln>
-        </p:spPr>
-        <p:style>
-          <a:lnRef idx="1">
-            <a:schemeClr val="accent1"/>
-          </a:lnRef>
-          <a:fillRef idx="3">
-            <a:schemeClr val="accent1"/>
-          </a:fillRef>
-          <a:effectRef idx="2">
-            <a:schemeClr val="accent1"/>
-          </a:effectRef>
-          <a:fontRef idx="minor">
-            <a:schemeClr val="lt1"/>
-          </a:fontRef>
-        </p:style>
-        <p:txBody>
-          <a:bodyPr rtlCol="0" anchor="ctr"/>
-          <a:lstStyle/>
-          <a:p>
-            <a:pPr algn="ctr"/>
-          </a:p>
-        </p:txBody>
-      </p:sp>
-      <p:sp>
-        <p:nvSpPr>
-          <p:cNvPr id="30" name="Rectangle 29"/>
-          <p:cNvSpPr/>
-          <p:nvPr/>
-        </p:nvSpPr>
-        <p:spPr>
-          <a:xfrm>
-            <a:off x="3017518" y="2651768"/>
-            <a:ext cx="3" cy="640072"/>
-          </a:xfrm>
-          <a:prstGeom prst="rect">
-            <a:avLst/>
-          </a:prstGeom>
-          <a:solidFill>
-            <a:srgbClr val="646464"/>
-          </a:solidFill>
-          <a:ln>
-            <a:noFill/>
-          </a:ln>
-        </p:spPr>
-        <p:style>
-          <a:lnRef idx="1">
-            <a:schemeClr val="accent1"/>
-          </a:lnRef>
-          <a:fillRef idx="3">
-            <a:schemeClr val="accent1"/>
-          </a:fillRef>
-          <a:effectRef idx="2">
-            <a:schemeClr val="accent1"/>
-          </a:effectRef>
-          <a:fontRef idx="minor">
-            <a:schemeClr val="lt1"/>
-          </a:fontRef>
-        </p:style>
-        <p:txBody>
-          <a:bodyPr rtlCol="0" anchor="ctr"/>
-          <a:lstStyle/>
-          <a:p>
-            <a:pPr algn="ctr"/>
-          </a:p>
-        </p:txBody>
-      </p:sp>
-      <p:sp>
-        <p:nvSpPr>
-          <p:cNvPr id="31" name="Rectangle 30"/>
-          <p:cNvSpPr/>
-          <p:nvPr/>
-        </p:nvSpPr>
-        <p:spPr>
-          <a:xfrm>
-            <a:off x="5029198" y="2011680"/>
-            <a:ext cx="3" cy="640088"/>
-          </a:xfrm>
-          <a:prstGeom prst="rect">
-            <a:avLst/>
-          </a:prstGeom>
-          <a:solidFill>
-            <a:srgbClr val="646464"/>
-          </a:solidFill>
-          <a:ln>
-            <a:noFill/>
-          </a:ln>
-        </p:spPr>
-        <p:style>
-          <a:lnRef idx="1">
-            <a:schemeClr val="accent1"/>
-          </a:lnRef>
-          <a:fillRef idx="3">
-            <a:schemeClr val="accent1"/>
-          </a:fillRef>
-          <a:effectRef idx="2">
-            <a:schemeClr val="accent1"/>
-          </a:effectRef>
-          <a:fontRef idx="minor">
-            <a:schemeClr val="lt1"/>
-          </a:fontRef>
-        </p:style>
-        <p:txBody>
-          <a:bodyPr rtlCol="0" anchor="ctr"/>
-          <a:lstStyle/>
-          <a:p>
-            <a:pPr algn="ctr"/>
-          </a:p>
-        </p:txBody>
-      </p:sp>
-      <p:sp>
-        <p:nvSpPr>
-          <p:cNvPr id="32" name="Rectangle 31"/>
-          <p:cNvSpPr/>
-          <p:nvPr/>
-        </p:nvSpPr>
-        <p:spPr>
-          <a:xfrm>
-            <a:off x="5029198" y="2651768"/>
-            <a:ext cx="3" cy="640072"/>
-          </a:xfrm>
-          <a:prstGeom prst="rect">
-            <a:avLst/>
-          </a:prstGeom>
-          <a:solidFill>
-            <a:srgbClr val="646464"/>
-          </a:solidFill>
-          <a:ln>
-            <a:noFill/>
-          </a:ln>
-        </p:spPr>
-        <p:style>
-          <a:lnRef idx="1">
-            <a:schemeClr val="accent1"/>
-          </a:lnRef>
-          <a:fillRef idx="3">
-            <a:schemeClr val="accent1"/>
-          </a:fillRef>
-          <a:effectRef idx="2">
-            <a:schemeClr val="accent1"/>
-          </a:effectRef>
-          <a:fontRef idx="minor">
-            <a:schemeClr val="lt1"/>
-          </a:fontRef>
-        </p:style>
-        <p:txBody>
-          <a:bodyPr rtlCol="0" anchor="ctr"/>
-          <a:lstStyle/>
-          <a:p>
-            <a:pPr algn="ctr"/>
-          </a:p>
-        </p:txBody>
-      </p:sp>
-      <p:sp>
-        <p:nvSpPr>
-          <p:cNvPr id="33" name="Rectangle 32"/>
-          <p:cNvSpPr/>
-          <p:nvPr/>
-        </p:nvSpPr>
-        <p:spPr>
-          <a:xfrm>
-            <a:off x="5029198" y="2011680"/>
-            <a:ext cx="3" cy="640088"/>
-          </a:xfrm>
-          <a:prstGeom prst="rect">
-            <a:avLst/>
-          </a:prstGeom>
-          <a:solidFill>
-            <a:srgbClr val="646464"/>
-          </a:solidFill>
-          <a:ln>
-            <a:noFill/>
-          </a:ln>
-        </p:spPr>
-        <p:style>
-          <a:lnRef idx="1">
-            <a:schemeClr val="accent1"/>
-          </a:lnRef>
-          <a:fillRef idx="3">
-            <a:schemeClr val="accent1"/>
-          </a:fillRef>
-          <a:effectRef idx="2">
-            <a:schemeClr val="accent1"/>
-          </a:effectRef>
-          <a:fontRef idx="minor">
-            <a:schemeClr val="lt1"/>
-          </a:fontRef>
-        </p:style>
-        <p:txBody>
-          <a:bodyPr rtlCol="0" anchor="ctr"/>
-          <a:lstStyle/>
-          <a:p>
-            <a:pPr algn="ctr"/>
-          </a:p>
-        </p:txBody>
-      </p:sp>
-      <p:sp>
-        <p:nvSpPr>
-          <p:cNvPr id="34" name="Rectangle 33"/>
-          <p:cNvSpPr/>
-          <p:nvPr/>
-        </p:nvSpPr>
-        <p:spPr>
-          <a:xfrm>
-            <a:off x="5029200" y="2651766"/>
-            <a:ext cx="2011680" cy="3"/>
-          </a:xfrm>
-          <a:prstGeom prst="rect">
-            <a:avLst/>
-          </a:prstGeom>
-          <a:solidFill>
-            <a:srgbClr val="646464"/>
-          </a:solidFill>
-          <a:ln>
-            <a:noFill/>
-          </a:ln>
-        </p:spPr>
-        <p:style>
-          <a:lnRef idx="1">
-            <a:schemeClr val="accent1"/>
-          </a:lnRef>
-          <a:fillRef idx="3">
-            <a:schemeClr val="accent1"/>
-          </a:fillRef>
-          <a:effectRef idx="2">
-            <a:schemeClr val="accent1"/>
-          </a:effectRef>
-          <a:fontRef idx="minor">
-            <a:schemeClr val="lt1"/>
-          </a:fontRef>
-        </p:style>
-        <p:txBody>
-          <a:bodyPr rtlCol="0" anchor="ctr"/>
-          <a:lstStyle/>
-          <a:p>
-            <a:pPr algn="ctr"/>
-          </a:p>
-        </p:txBody>
-      </p:sp>
-      <p:sp>
-        <p:nvSpPr>
-          <p:cNvPr id="35" name="Rectangle 34"/>
-          <p:cNvSpPr/>
-          <p:nvPr/>
-        </p:nvSpPr>
-        <p:spPr>
-          <a:xfrm>
-            <a:off x="7040878" y="2651768"/>
-            <a:ext cx="3" cy="640072"/>
-          </a:xfrm>
-          <a:prstGeom prst="rect">
-            <a:avLst/>
-          </a:prstGeom>
-          <a:solidFill>
-            <a:srgbClr val="646464"/>
-          </a:solidFill>
-          <a:ln>
-            <a:noFill/>
-          </a:ln>
-        </p:spPr>
-        <p:style>
-          <a:lnRef idx="1">
-            <a:schemeClr val="accent1"/>
-          </a:lnRef>
-          <a:fillRef idx="3">
-            <a:schemeClr val="accent1"/>
-          </a:fillRef>
-          <a:effectRef idx="2">
-            <a:schemeClr val="accent1"/>
-          </a:effectRef>
-          <a:fontRef idx="minor">
-            <a:schemeClr val="lt1"/>
-          </a:fontRef>
-        </p:style>
-        <p:txBody>
-          <a:bodyPr rtlCol="0" anchor="ctr"/>
-          <a:lstStyle/>
-          <a:p>
-            <a:pPr algn="ctr"/>
-          </a:p>
-        </p:txBody>
-      </p:sp>
-      <p:sp>
-        <p:nvSpPr>
-          <p:cNvPr id="36" name="Rectangle 35"/>
-          <p:cNvSpPr/>
-          <p:nvPr/>
-        </p:nvSpPr>
-        <p:spPr>
-          <a:xfrm>
-            <a:off x="5029198" y="2011680"/>
-            <a:ext cx="3" cy="640088"/>
-          </a:xfrm>
-          <a:prstGeom prst="rect">
-            <a:avLst/>
-          </a:prstGeom>
-          <a:solidFill>
-            <a:srgbClr val="646464"/>
-          </a:solidFill>
-          <a:ln>
-            <a:noFill/>
-          </a:ln>
-        </p:spPr>
-        <p:style>
-          <a:lnRef idx="1">
-            <a:schemeClr val="accent1"/>
-          </a:lnRef>
-          <a:fillRef idx="3">
-            <a:schemeClr val="accent1"/>
-          </a:fillRef>
-          <a:effectRef idx="2">
-            <a:schemeClr val="accent1"/>
-          </a:effectRef>
-          <a:fontRef idx="minor">
-            <a:schemeClr val="lt1"/>
-          </a:fontRef>
-        </p:style>
-        <p:txBody>
-          <a:bodyPr rtlCol="0" anchor="ctr"/>
-          <a:lstStyle/>
-          <a:p>
-            <a:pPr algn="ctr"/>
-          </a:p>
-        </p:txBody>
-      </p:sp>
-      <p:sp>
-        <p:nvSpPr>
-          <p:cNvPr id="37" name="Rectangle 36"/>
-          <p:cNvSpPr/>
-          <p:nvPr/>
-        </p:nvSpPr>
-        <p:spPr>
-          <a:xfrm>
-            <a:off x="5029200" y="2651766"/>
-            <a:ext cx="4023360" cy="3"/>
-          </a:xfrm>
-          <a:prstGeom prst="rect">
-            <a:avLst/>
-          </a:prstGeom>
-          <a:solidFill>
-            <a:srgbClr val="646464"/>
-          </a:solidFill>
-          <a:ln>
-            <a:noFill/>
-          </a:ln>
-        </p:spPr>
-        <p:style>
-          <a:lnRef idx="1">
-            <a:schemeClr val="accent1"/>
-          </a:lnRef>
-          <a:fillRef idx="3">
-            <a:schemeClr val="accent1"/>
-          </a:fillRef>
-          <a:effectRef idx="2">
-            <a:schemeClr val="accent1"/>
-          </a:effectRef>
-          <a:fontRef idx="minor">
-            <a:schemeClr val="lt1"/>
-          </a:fontRef>
-        </p:style>
-        <p:txBody>
-          <a:bodyPr rtlCol="0" anchor="ctr"/>
-          <a:lstStyle/>
-          <a:p>
-            <a:pPr algn="ctr"/>
-          </a:p>
-        </p:txBody>
-      </p:sp>
-      <p:sp>
-        <p:nvSpPr>
           <p:cNvPr id="38" name="Rectangle 37"/>
           <p:cNvSpPr/>
           <p:nvPr/>
         </p:nvSpPr>
         <p:spPr>
           <a:xfrm>
-            <a:off x="9052558" y="2651768"/>
-            <a:ext cx="3" cy="640072"/>
+            <a:off x="9052558" y="2651744"/>
+            <a:ext cx="3" cy="640096"/>
           </a:xfrm>
           <a:prstGeom prst="rect">
             <a:avLst/>
@@ -13815,6 +13815,350 @@
         <p:spPr>
           <a:xfrm>
             <a:off x="9052558" y="4206240"/>
+            <a:ext cx="3" cy="640096"/>
+          </a:xfrm>
+          <a:prstGeom prst="rect">
+            <a:avLst/>
+          </a:prstGeom>
+          <a:solidFill>
+            <a:srgbClr val="646464"/>
+          </a:solidFill>
+          <a:ln>
+            <a:noFill/>
+          </a:ln>
+        </p:spPr>
+        <p:style>
+          <a:lnRef idx="1">
+            <a:schemeClr val="accent1"/>
+          </a:lnRef>
+          <a:fillRef idx="3">
+            <a:schemeClr val="accent1"/>
+          </a:fillRef>
+          <a:effectRef idx="2">
+            <a:schemeClr val="accent1"/>
+          </a:effectRef>
+          <a:fontRef idx="minor">
+            <a:schemeClr val="lt1"/>
+          </a:fontRef>
+        </p:style>
+        <p:txBody>
+          <a:bodyPr rtlCol="0" anchor="ctr"/>
+          <a:lstStyle/>
+          <a:p>
+            <a:pPr algn="ctr"/>
+          </a:p>
+        </p:txBody>
+      </p:sp>
+      <p:sp>
+        <p:nvSpPr>
+          <p:cNvPr id="15" name="Rectangle 14"/>
+          <p:cNvSpPr/>
+          <p:nvPr/>
+        </p:nvSpPr>
+        <p:spPr>
+          <a:xfrm>
+            <a:off x="5029200" y="4846334"/>
+            <a:ext cx="4023360" cy="3"/>
+          </a:xfrm>
+          <a:prstGeom prst="rect">
+            <a:avLst/>
+          </a:prstGeom>
+          <a:solidFill>
+            <a:srgbClr val="646464"/>
+          </a:solidFill>
+          <a:ln>
+            <a:noFill/>
+          </a:ln>
+        </p:spPr>
+        <p:style>
+          <a:lnRef idx="1">
+            <a:schemeClr val="accent1"/>
+          </a:lnRef>
+          <a:fillRef idx="3">
+            <a:schemeClr val="accent1"/>
+          </a:fillRef>
+          <a:effectRef idx="2">
+            <a:schemeClr val="accent1"/>
+          </a:effectRef>
+          <a:fontRef idx="minor">
+            <a:schemeClr val="lt1"/>
+          </a:fontRef>
+        </p:style>
+        <p:txBody>
+          <a:bodyPr rtlCol="0" anchor="ctr"/>
+          <a:lstStyle/>
+          <a:p>
+            <a:pPr algn="ctr"/>
+          </a:p>
+        </p:txBody>
+      </p:sp>
+      <p:sp>
+        <p:nvSpPr>
+          <p:cNvPr id="16" name="Rectangle 15"/>
+          <p:cNvSpPr/>
+          <p:nvPr/>
+        </p:nvSpPr>
+        <p:spPr>
+          <a:xfrm>
+            <a:off x="5029198" y="4846336"/>
+            <a:ext cx="3" cy="640064"/>
+          </a:xfrm>
+          <a:prstGeom prst="rect">
+            <a:avLst/>
+          </a:prstGeom>
+          <a:solidFill>
+            <a:srgbClr val="646464"/>
+          </a:solidFill>
+          <a:ln>
+            <a:noFill/>
+          </a:ln>
+        </p:spPr>
+        <p:style>
+          <a:lnRef idx="1">
+            <a:schemeClr val="accent1"/>
+          </a:lnRef>
+          <a:fillRef idx="3">
+            <a:schemeClr val="accent1"/>
+          </a:fillRef>
+          <a:effectRef idx="2">
+            <a:schemeClr val="accent1"/>
+          </a:effectRef>
+          <a:fontRef idx="minor">
+            <a:schemeClr val="lt1"/>
+          </a:fontRef>
+        </p:style>
+        <p:txBody>
+          <a:bodyPr rtlCol="0" anchor="ctr"/>
+          <a:lstStyle/>
+          <a:p>
+            <a:pPr algn="ctr"/>
+          </a:p>
+        </p:txBody>
+      </p:sp>
+      <p:sp>
+        <p:nvSpPr>
+          <p:cNvPr id="17" name="Rectangle 16"/>
+          <p:cNvSpPr/>
+          <p:nvPr/>
+        </p:nvSpPr>
+        <p:spPr>
+          <a:xfrm>
+            <a:off x="9052558" y="4206240"/>
+            <a:ext cx="3" cy="640096"/>
+          </a:xfrm>
+          <a:prstGeom prst="rect">
+            <a:avLst/>
+          </a:prstGeom>
+          <a:solidFill>
+            <a:srgbClr val="646464"/>
+          </a:solidFill>
+          <a:ln>
+            <a:noFill/>
+          </a:ln>
+        </p:spPr>
+        <p:style>
+          <a:lnRef idx="1">
+            <a:schemeClr val="accent1"/>
+          </a:lnRef>
+          <a:fillRef idx="3">
+            <a:schemeClr val="accent1"/>
+          </a:fillRef>
+          <a:effectRef idx="2">
+            <a:schemeClr val="accent1"/>
+          </a:effectRef>
+          <a:fontRef idx="minor">
+            <a:schemeClr val="lt1"/>
+          </a:fontRef>
+        </p:style>
+        <p:txBody>
+          <a:bodyPr rtlCol="0" anchor="ctr"/>
+          <a:lstStyle/>
+          <a:p>
+            <a:pPr algn="ctr"/>
+          </a:p>
+        </p:txBody>
+      </p:sp>
+      <p:sp>
+        <p:nvSpPr>
+          <p:cNvPr id="18" name="Rectangle 17"/>
+          <p:cNvSpPr/>
+          <p:nvPr/>
+        </p:nvSpPr>
+        <p:spPr>
+          <a:xfrm>
+            <a:off x="7040880" y="4846334"/>
+            <a:ext cx="2011680" cy="3"/>
+          </a:xfrm>
+          <a:prstGeom prst="rect">
+            <a:avLst/>
+          </a:prstGeom>
+          <a:solidFill>
+            <a:srgbClr val="646464"/>
+          </a:solidFill>
+          <a:ln>
+            <a:noFill/>
+          </a:ln>
+        </p:spPr>
+        <p:style>
+          <a:lnRef idx="1">
+            <a:schemeClr val="accent1"/>
+          </a:lnRef>
+          <a:fillRef idx="3">
+            <a:schemeClr val="accent1"/>
+          </a:fillRef>
+          <a:effectRef idx="2">
+            <a:schemeClr val="accent1"/>
+          </a:effectRef>
+          <a:fontRef idx="minor">
+            <a:schemeClr val="lt1"/>
+          </a:fontRef>
+        </p:style>
+        <p:txBody>
+          <a:bodyPr rtlCol="0" anchor="ctr"/>
+          <a:lstStyle/>
+          <a:p>
+            <a:pPr algn="ctr"/>
+          </a:p>
+        </p:txBody>
+      </p:sp>
+      <p:sp>
+        <p:nvSpPr>
+          <p:cNvPr id="19" name="Rectangle 18"/>
+          <p:cNvSpPr/>
+          <p:nvPr/>
+        </p:nvSpPr>
+        <p:spPr>
+          <a:xfrm>
+            <a:off x="7040878" y="4846336"/>
+            <a:ext cx="3" cy="640064"/>
+          </a:xfrm>
+          <a:prstGeom prst="rect">
+            <a:avLst/>
+          </a:prstGeom>
+          <a:solidFill>
+            <a:srgbClr val="646464"/>
+          </a:solidFill>
+          <a:ln>
+            <a:noFill/>
+          </a:ln>
+        </p:spPr>
+        <p:style>
+          <a:lnRef idx="1">
+            <a:schemeClr val="accent1"/>
+          </a:lnRef>
+          <a:fillRef idx="3">
+            <a:schemeClr val="accent1"/>
+          </a:fillRef>
+          <a:effectRef idx="2">
+            <a:schemeClr val="accent1"/>
+          </a:effectRef>
+          <a:fontRef idx="minor">
+            <a:schemeClr val="lt1"/>
+          </a:fontRef>
+        </p:style>
+        <p:txBody>
+          <a:bodyPr rtlCol="0" anchor="ctr"/>
+          <a:lstStyle/>
+          <a:p>
+            <a:pPr algn="ctr"/>
+          </a:p>
+        </p:txBody>
+      </p:sp>
+      <p:sp>
+        <p:nvSpPr>
+          <p:cNvPr id="20" name="Rectangle 19"/>
+          <p:cNvSpPr/>
+          <p:nvPr/>
+        </p:nvSpPr>
+        <p:spPr>
+          <a:xfrm>
+            <a:off x="5029198" y="2011680"/>
+            <a:ext cx="3" cy="640088"/>
+          </a:xfrm>
+          <a:prstGeom prst="rect">
+            <a:avLst/>
+          </a:prstGeom>
+          <a:solidFill>
+            <a:srgbClr val="646464"/>
+          </a:solidFill>
+          <a:ln>
+            <a:noFill/>
+          </a:ln>
+        </p:spPr>
+        <p:style>
+          <a:lnRef idx="1">
+            <a:schemeClr val="accent1"/>
+          </a:lnRef>
+          <a:fillRef idx="3">
+            <a:schemeClr val="accent1"/>
+          </a:fillRef>
+          <a:effectRef idx="2">
+            <a:schemeClr val="accent1"/>
+          </a:effectRef>
+          <a:fontRef idx="minor">
+            <a:schemeClr val="lt1"/>
+          </a:fontRef>
+        </p:style>
+        <p:txBody>
+          <a:bodyPr rtlCol="0" anchor="ctr"/>
+          <a:lstStyle/>
+          <a:p>
+            <a:pPr algn="ctr"/>
+          </a:p>
+        </p:txBody>
+      </p:sp>
+      <p:sp>
+        <p:nvSpPr>
+          <p:cNvPr id="21" name="Rectangle 20"/>
+          <p:cNvSpPr/>
+          <p:nvPr/>
+        </p:nvSpPr>
+        <p:spPr>
+          <a:xfrm>
+            <a:off x="1005840" y="2651766"/>
+            <a:ext cx="4023360" cy="3"/>
+          </a:xfrm>
+          <a:prstGeom prst="rect">
+            <a:avLst/>
+          </a:prstGeom>
+          <a:solidFill>
+            <a:srgbClr val="646464"/>
+          </a:solidFill>
+          <a:ln>
+            <a:noFill/>
+          </a:ln>
+        </p:spPr>
+        <p:style>
+          <a:lnRef idx="1">
+            <a:schemeClr val="accent1"/>
+          </a:lnRef>
+          <a:fillRef idx="3">
+            <a:schemeClr val="accent1"/>
+          </a:fillRef>
+          <a:effectRef idx="2">
+            <a:schemeClr val="accent1"/>
+          </a:effectRef>
+          <a:fontRef idx="minor">
+            <a:schemeClr val="lt1"/>
+          </a:fontRef>
+        </p:style>
+        <p:txBody>
+          <a:bodyPr rtlCol="0" anchor="ctr"/>
+          <a:lstStyle/>
+          <a:p>
+            <a:pPr algn="ctr"/>
+          </a:p>
+        </p:txBody>
+      </p:sp>
+      <p:sp>
+        <p:nvSpPr>
+          <p:cNvPr id="22" name="Rectangle 21"/>
+          <p:cNvSpPr/>
+          <p:nvPr/>
+        </p:nvSpPr>
+        <p:spPr>
+          <a:xfrm>
+            <a:off x="1005838" y="2651768"/>
             <a:ext cx="3" cy="640072"/>
           </a:xfrm>
           <a:prstGeom prst="rect">
@@ -13851,13 +14195,400 @@
       </p:sp>
       <p:sp>
         <p:nvSpPr>
-          <p:cNvPr id="15" name="Rectangle 14"/>
-          <p:cNvSpPr/>
-          <p:nvPr/>
-        </p:nvSpPr>
-        <p:spPr>
-          <a:xfrm>
-            <a:off x="5029200" y="4846310"/>
+          <p:cNvPr id="23" name="Rectangle 22"/>
+          <p:cNvSpPr/>
+          <p:nvPr/>
+        </p:nvSpPr>
+        <p:spPr>
+          <a:xfrm>
+            <a:off x="5029198" y="2011680"/>
+            <a:ext cx="3" cy="640088"/>
+          </a:xfrm>
+          <a:prstGeom prst="rect">
+            <a:avLst/>
+          </a:prstGeom>
+          <a:solidFill>
+            <a:srgbClr val="646464"/>
+          </a:solidFill>
+          <a:ln>
+            <a:noFill/>
+          </a:ln>
+        </p:spPr>
+        <p:style>
+          <a:lnRef idx="1">
+            <a:schemeClr val="accent1"/>
+          </a:lnRef>
+          <a:fillRef idx="3">
+            <a:schemeClr val="accent1"/>
+          </a:fillRef>
+          <a:effectRef idx="2">
+            <a:schemeClr val="accent1"/>
+          </a:effectRef>
+          <a:fontRef idx="minor">
+            <a:schemeClr val="lt1"/>
+          </a:fontRef>
+        </p:style>
+        <p:txBody>
+          <a:bodyPr rtlCol="0" anchor="ctr"/>
+          <a:lstStyle/>
+          <a:p>
+            <a:pPr algn="ctr"/>
+          </a:p>
+        </p:txBody>
+      </p:sp>
+      <p:sp>
+        <p:nvSpPr>
+          <p:cNvPr id="24" name="Rectangle 23"/>
+          <p:cNvSpPr/>
+          <p:nvPr/>
+        </p:nvSpPr>
+        <p:spPr>
+          <a:xfrm>
+            <a:off x="3017520" y="2651766"/>
+            <a:ext cx="2011680" cy="3"/>
+          </a:xfrm>
+          <a:prstGeom prst="rect">
+            <a:avLst/>
+          </a:prstGeom>
+          <a:solidFill>
+            <a:srgbClr val="646464"/>
+          </a:solidFill>
+          <a:ln>
+            <a:noFill/>
+          </a:ln>
+        </p:spPr>
+        <p:style>
+          <a:lnRef idx="1">
+            <a:schemeClr val="accent1"/>
+          </a:lnRef>
+          <a:fillRef idx="3">
+            <a:schemeClr val="accent1"/>
+          </a:fillRef>
+          <a:effectRef idx="2">
+            <a:schemeClr val="accent1"/>
+          </a:effectRef>
+          <a:fontRef idx="minor">
+            <a:schemeClr val="lt1"/>
+          </a:fontRef>
+        </p:style>
+        <p:txBody>
+          <a:bodyPr rtlCol="0" anchor="ctr"/>
+          <a:lstStyle/>
+          <a:p>
+            <a:pPr algn="ctr"/>
+          </a:p>
+        </p:txBody>
+      </p:sp>
+      <p:sp>
+        <p:nvSpPr>
+          <p:cNvPr id="25" name="Rectangle 24"/>
+          <p:cNvSpPr/>
+          <p:nvPr/>
+        </p:nvSpPr>
+        <p:spPr>
+          <a:xfrm>
+            <a:off x="3017518" y="2651768"/>
+            <a:ext cx="3" cy="640072"/>
+          </a:xfrm>
+          <a:prstGeom prst="rect">
+            <a:avLst/>
+          </a:prstGeom>
+          <a:solidFill>
+            <a:srgbClr val="646464"/>
+          </a:solidFill>
+          <a:ln>
+            <a:noFill/>
+          </a:ln>
+        </p:spPr>
+        <p:style>
+          <a:lnRef idx="1">
+            <a:schemeClr val="accent1"/>
+          </a:lnRef>
+          <a:fillRef idx="3">
+            <a:schemeClr val="accent1"/>
+          </a:fillRef>
+          <a:effectRef idx="2">
+            <a:schemeClr val="accent1"/>
+          </a:effectRef>
+          <a:fontRef idx="minor">
+            <a:schemeClr val="lt1"/>
+          </a:fontRef>
+        </p:style>
+        <p:txBody>
+          <a:bodyPr rtlCol="0" anchor="ctr"/>
+          <a:lstStyle/>
+          <a:p>
+            <a:pPr algn="ctr"/>
+          </a:p>
+        </p:txBody>
+      </p:sp>
+      <p:sp>
+        <p:nvSpPr>
+          <p:cNvPr id="26" name="Rectangle 25"/>
+          <p:cNvSpPr/>
+          <p:nvPr/>
+        </p:nvSpPr>
+        <p:spPr>
+          <a:xfrm>
+            <a:off x="5029198" y="2011680"/>
+            <a:ext cx="3" cy="640088"/>
+          </a:xfrm>
+          <a:prstGeom prst="rect">
+            <a:avLst/>
+          </a:prstGeom>
+          <a:solidFill>
+            <a:srgbClr val="646464"/>
+          </a:solidFill>
+          <a:ln>
+            <a:noFill/>
+          </a:ln>
+        </p:spPr>
+        <p:style>
+          <a:lnRef idx="1">
+            <a:schemeClr val="accent1"/>
+          </a:lnRef>
+          <a:fillRef idx="3">
+            <a:schemeClr val="accent1"/>
+          </a:fillRef>
+          <a:effectRef idx="2">
+            <a:schemeClr val="accent1"/>
+          </a:effectRef>
+          <a:fontRef idx="minor">
+            <a:schemeClr val="lt1"/>
+          </a:fontRef>
+        </p:style>
+        <p:txBody>
+          <a:bodyPr rtlCol="0" anchor="ctr"/>
+          <a:lstStyle/>
+          <a:p>
+            <a:pPr algn="ctr"/>
+          </a:p>
+        </p:txBody>
+      </p:sp>
+      <p:sp>
+        <p:nvSpPr>
+          <p:cNvPr id="27" name="Rectangle 26"/>
+          <p:cNvSpPr/>
+          <p:nvPr/>
+        </p:nvSpPr>
+        <p:spPr>
+          <a:xfrm>
+            <a:off x="5029198" y="2651768"/>
+            <a:ext cx="3" cy="640072"/>
+          </a:xfrm>
+          <a:prstGeom prst="rect">
+            <a:avLst/>
+          </a:prstGeom>
+          <a:solidFill>
+            <a:srgbClr val="646464"/>
+          </a:solidFill>
+          <a:ln>
+            <a:noFill/>
+          </a:ln>
+        </p:spPr>
+        <p:style>
+          <a:lnRef idx="1">
+            <a:schemeClr val="accent1"/>
+          </a:lnRef>
+          <a:fillRef idx="3">
+            <a:schemeClr val="accent1"/>
+          </a:fillRef>
+          <a:effectRef idx="2">
+            <a:schemeClr val="accent1"/>
+          </a:effectRef>
+          <a:fontRef idx="minor">
+            <a:schemeClr val="lt1"/>
+          </a:fontRef>
+        </p:style>
+        <p:txBody>
+          <a:bodyPr rtlCol="0" anchor="ctr"/>
+          <a:lstStyle/>
+          <a:p>
+            <a:pPr algn="ctr"/>
+          </a:p>
+        </p:txBody>
+      </p:sp>
+      <p:sp>
+        <p:nvSpPr>
+          <p:cNvPr id="28" name="Rectangle 27"/>
+          <p:cNvSpPr/>
+          <p:nvPr/>
+        </p:nvSpPr>
+        <p:spPr>
+          <a:xfrm>
+            <a:off x="5029198" y="2011680"/>
+            <a:ext cx="3" cy="640088"/>
+          </a:xfrm>
+          <a:prstGeom prst="rect">
+            <a:avLst/>
+          </a:prstGeom>
+          <a:solidFill>
+            <a:srgbClr val="646464"/>
+          </a:solidFill>
+          <a:ln>
+            <a:noFill/>
+          </a:ln>
+        </p:spPr>
+        <p:style>
+          <a:lnRef idx="1">
+            <a:schemeClr val="accent1"/>
+          </a:lnRef>
+          <a:fillRef idx="3">
+            <a:schemeClr val="accent1"/>
+          </a:fillRef>
+          <a:effectRef idx="2">
+            <a:schemeClr val="accent1"/>
+          </a:effectRef>
+          <a:fontRef idx="minor">
+            <a:schemeClr val="lt1"/>
+          </a:fontRef>
+        </p:style>
+        <p:txBody>
+          <a:bodyPr rtlCol="0" anchor="ctr"/>
+          <a:lstStyle/>
+          <a:p>
+            <a:pPr algn="ctr"/>
+          </a:p>
+        </p:txBody>
+      </p:sp>
+      <p:sp>
+        <p:nvSpPr>
+          <p:cNvPr id="29" name="Rectangle 28"/>
+          <p:cNvSpPr/>
+          <p:nvPr/>
+        </p:nvSpPr>
+        <p:spPr>
+          <a:xfrm>
+            <a:off x="5029200" y="2651766"/>
+            <a:ext cx="2011680" cy="3"/>
+          </a:xfrm>
+          <a:prstGeom prst="rect">
+            <a:avLst/>
+          </a:prstGeom>
+          <a:solidFill>
+            <a:srgbClr val="646464"/>
+          </a:solidFill>
+          <a:ln>
+            <a:noFill/>
+          </a:ln>
+        </p:spPr>
+        <p:style>
+          <a:lnRef idx="1">
+            <a:schemeClr val="accent1"/>
+          </a:lnRef>
+          <a:fillRef idx="3">
+            <a:schemeClr val="accent1"/>
+          </a:fillRef>
+          <a:effectRef idx="2">
+            <a:schemeClr val="accent1"/>
+          </a:effectRef>
+          <a:fontRef idx="minor">
+            <a:schemeClr val="lt1"/>
+          </a:fontRef>
+        </p:style>
+        <p:txBody>
+          <a:bodyPr rtlCol="0" anchor="ctr"/>
+          <a:lstStyle/>
+          <a:p>
+            <a:pPr algn="ctr"/>
+          </a:p>
+        </p:txBody>
+      </p:sp>
+      <p:sp>
+        <p:nvSpPr>
+          <p:cNvPr id="30" name="Rectangle 29"/>
+          <p:cNvSpPr/>
+          <p:nvPr/>
+        </p:nvSpPr>
+        <p:spPr>
+          <a:xfrm>
+            <a:off x="7040878" y="2651768"/>
+            <a:ext cx="3" cy="640072"/>
+          </a:xfrm>
+          <a:prstGeom prst="rect">
+            <a:avLst/>
+          </a:prstGeom>
+          <a:solidFill>
+            <a:srgbClr val="646464"/>
+          </a:solidFill>
+          <a:ln>
+            <a:noFill/>
+          </a:ln>
+        </p:spPr>
+        <p:style>
+          <a:lnRef idx="1">
+            <a:schemeClr val="accent1"/>
+          </a:lnRef>
+          <a:fillRef idx="3">
+            <a:schemeClr val="accent1"/>
+          </a:fillRef>
+          <a:effectRef idx="2">
+            <a:schemeClr val="accent1"/>
+          </a:effectRef>
+          <a:fontRef idx="minor">
+            <a:schemeClr val="lt1"/>
+          </a:fontRef>
+        </p:style>
+        <p:txBody>
+          <a:bodyPr rtlCol="0" anchor="ctr"/>
+          <a:lstStyle/>
+          <a:p>
+            <a:pPr algn="ctr"/>
+          </a:p>
+        </p:txBody>
+      </p:sp>
+      <p:sp>
+        <p:nvSpPr>
+          <p:cNvPr id="31" name="Rectangle 30"/>
+          <p:cNvSpPr/>
+          <p:nvPr/>
+        </p:nvSpPr>
+        <p:spPr>
+          <a:xfrm>
+            <a:off x="5029198" y="2011680"/>
+            <a:ext cx="3" cy="640088"/>
+          </a:xfrm>
+          <a:prstGeom prst="rect">
+            <a:avLst/>
+          </a:prstGeom>
+          <a:solidFill>
+            <a:srgbClr val="646464"/>
+          </a:solidFill>
+          <a:ln>
+            <a:noFill/>
+          </a:ln>
+        </p:spPr>
+        <p:style>
+          <a:lnRef idx="1">
+            <a:schemeClr val="accent1"/>
+          </a:lnRef>
+          <a:fillRef idx="3">
+            <a:schemeClr val="accent1"/>
+          </a:fillRef>
+          <a:effectRef idx="2">
+            <a:schemeClr val="accent1"/>
+          </a:effectRef>
+          <a:fontRef idx="minor">
+            <a:schemeClr val="lt1"/>
+          </a:fontRef>
+        </p:style>
+        <p:txBody>
+          <a:bodyPr rtlCol="0" anchor="ctr"/>
+          <a:lstStyle/>
+          <a:p>
+            <a:pPr algn="ctr"/>
+          </a:p>
+        </p:txBody>
+      </p:sp>
+      <p:sp>
+        <p:nvSpPr>
+          <p:cNvPr id="32" name="Rectangle 31"/>
+          <p:cNvSpPr/>
+          <p:nvPr/>
+        </p:nvSpPr>
+        <p:spPr>
+          <a:xfrm>
+            <a:off x="5029200" y="2651766"/>
             <a:ext cx="4023360" cy="3"/>
           </a:xfrm>
           <a:prstGeom prst="rect">
@@ -13894,745 +14625,14 @@
       </p:sp>
       <p:sp>
         <p:nvSpPr>
-          <p:cNvPr id="16" name="Rectangle 15"/>
-          <p:cNvSpPr/>
-          <p:nvPr/>
-        </p:nvSpPr>
-        <p:spPr>
-          <a:xfrm>
-            <a:off x="5029198" y="4846312"/>
-            <a:ext cx="3" cy="640088"/>
-          </a:xfrm>
-          <a:prstGeom prst="rect">
-            <a:avLst/>
-          </a:prstGeom>
-          <a:solidFill>
-            <a:srgbClr val="646464"/>
-          </a:solidFill>
-          <a:ln>
-            <a:noFill/>
-          </a:ln>
-        </p:spPr>
-        <p:style>
-          <a:lnRef idx="1">
-            <a:schemeClr val="accent1"/>
-          </a:lnRef>
-          <a:fillRef idx="3">
-            <a:schemeClr val="accent1"/>
-          </a:fillRef>
-          <a:effectRef idx="2">
-            <a:schemeClr val="accent1"/>
-          </a:effectRef>
-          <a:fontRef idx="minor">
-            <a:schemeClr val="lt1"/>
-          </a:fontRef>
-        </p:style>
-        <p:txBody>
-          <a:bodyPr rtlCol="0" anchor="ctr"/>
-          <a:lstStyle/>
-          <a:p>
-            <a:pPr algn="ctr"/>
-          </a:p>
-        </p:txBody>
-      </p:sp>
-      <p:sp>
-        <p:nvSpPr>
-          <p:cNvPr id="17" name="Rectangle 16"/>
-          <p:cNvSpPr/>
-          <p:nvPr/>
-        </p:nvSpPr>
-        <p:spPr>
-          <a:xfrm>
-            <a:off x="9052558" y="4206240"/>
+          <p:cNvPr id="33" name="Rectangle 32"/>
+          <p:cNvSpPr/>
+          <p:nvPr/>
+        </p:nvSpPr>
+        <p:spPr>
+          <a:xfrm>
+            <a:off x="9052558" y="2651768"/>
             <a:ext cx="3" cy="640072"/>
-          </a:xfrm>
-          <a:prstGeom prst="rect">
-            <a:avLst/>
-          </a:prstGeom>
-          <a:solidFill>
-            <a:srgbClr val="646464"/>
-          </a:solidFill>
-          <a:ln>
-            <a:noFill/>
-          </a:ln>
-        </p:spPr>
-        <p:style>
-          <a:lnRef idx="1">
-            <a:schemeClr val="accent1"/>
-          </a:lnRef>
-          <a:fillRef idx="3">
-            <a:schemeClr val="accent1"/>
-          </a:fillRef>
-          <a:effectRef idx="2">
-            <a:schemeClr val="accent1"/>
-          </a:effectRef>
-          <a:fontRef idx="minor">
-            <a:schemeClr val="lt1"/>
-          </a:fontRef>
-        </p:style>
-        <p:txBody>
-          <a:bodyPr rtlCol="0" anchor="ctr"/>
-          <a:lstStyle/>
-          <a:p>
-            <a:pPr algn="ctr"/>
-          </a:p>
-        </p:txBody>
-      </p:sp>
-      <p:sp>
-        <p:nvSpPr>
-          <p:cNvPr id="18" name="Rectangle 17"/>
-          <p:cNvSpPr/>
-          <p:nvPr/>
-        </p:nvSpPr>
-        <p:spPr>
-          <a:xfrm>
-            <a:off x="7040880" y="4846310"/>
-            <a:ext cx="2011680" cy="3"/>
-          </a:xfrm>
-          <a:prstGeom prst="rect">
-            <a:avLst/>
-          </a:prstGeom>
-          <a:solidFill>
-            <a:srgbClr val="646464"/>
-          </a:solidFill>
-          <a:ln>
-            <a:noFill/>
-          </a:ln>
-        </p:spPr>
-        <p:style>
-          <a:lnRef idx="1">
-            <a:schemeClr val="accent1"/>
-          </a:lnRef>
-          <a:fillRef idx="3">
-            <a:schemeClr val="accent1"/>
-          </a:fillRef>
-          <a:effectRef idx="2">
-            <a:schemeClr val="accent1"/>
-          </a:effectRef>
-          <a:fontRef idx="minor">
-            <a:schemeClr val="lt1"/>
-          </a:fontRef>
-        </p:style>
-        <p:txBody>
-          <a:bodyPr rtlCol="0" anchor="ctr"/>
-          <a:lstStyle/>
-          <a:p>
-            <a:pPr algn="ctr"/>
-          </a:p>
-        </p:txBody>
-      </p:sp>
-      <p:sp>
-        <p:nvSpPr>
-          <p:cNvPr id="19" name="Rectangle 18"/>
-          <p:cNvSpPr/>
-          <p:nvPr/>
-        </p:nvSpPr>
-        <p:spPr>
-          <a:xfrm>
-            <a:off x="7040878" y="4846312"/>
-            <a:ext cx="3" cy="640088"/>
-          </a:xfrm>
-          <a:prstGeom prst="rect">
-            <a:avLst/>
-          </a:prstGeom>
-          <a:solidFill>
-            <a:srgbClr val="646464"/>
-          </a:solidFill>
-          <a:ln>
-            <a:noFill/>
-          </a:ln>
-        </p:spPr>
-        <p:style>
-          <a:lnRef idx="1">
-            <a:schemeClr val="accent1"/>
-          </a:lnRef>
-          <a:fillRef idx="3">
-            <a:schemeClr val="accent1"/>
-          </a:fillRef>
-          <a:effectRef idx="2">
-            <a:schemeClr val="accent1"/>
-          </a:effectRef>
-          <a:fontRef idx="minor">
-            <a:schemeClr val="lt1"/>
-          </a:fontRef>
-        </p:style>
-        <p:txBody>
-          <a:bodyPr rtlCol="0" anchor="ctr"/>
-          <a:lstStyle/>
-          <a:p>
-            <a:pPr algn="ctr"/>
-          </a:p>
-        </p:txBody>
-      </p:sp>
-      <p:sp>
-        <p:nvSpPr>
-          <p:cNvPr id="20" name="Rectangle 19"/>
-          <p:cNvSpPr/>
-          <p:nvPr/>
-        </p:nvSpPr>
-        <p:spPr>
-          <a:xfrm>
-            <a:off x="5029198" y="2011680"/>
-            <a:ext cx="3" cy="640072"/>
-          </a:xfrm>
-          <a:prstGeom prst="rect">
-            <a:avLst/>
-          </a:prstGeom>
-          <a:solidFill>
-            <a:srgbClr val="646464"/>
-          </a:solidFill>
-          <a:ln>
-            <a:noFill/>
-          </a:ln>
-        </p:spPr>
-        <p:style>
-          <a:lnRef idx="1">
-            <a:schemeClr val="accent1"/>
-          </a:lnRef>
-          <a:fillRef idx="3">
-            <a:schemeClr val="accent1"/>
-          </a:fillRef>
-          <a:effectRef idx="2">
-            <a:schemeClr val="accent1"/>
-          </a:effectRef>
-          <a:fontRef idx="minor">
-            <a:schemeClr val="lt1"/>
-          </a:fontRef>
-        </p:style>
-        <p:txBody>
-          <a:bodyPr rtlCol="0" anchor="ctr"/>
-          <a:lstStyle/>
-          <a:p>
-            <a:pPr algn="ctr"/>
-          </a:p>
-        </p:txBody>
-      </p:sp>
-      <p:sp>
-        <p:nvSpPr>
-          <p:cNvPr id="21" name="Rectangle 20"/>
-          <p:cNvSpPr/>
-          <p:nvPr/>
-        </p:nvSpPr>
-        <p:spPr>
-          <a:xfrm>
-            <a:off x="1005840" y="2651750"/>
-            <a:ext cx="4023360" cy="3"/>
-          </a:xfrm>
-          <a:prstGeom prst="rect">
-            <a:avLst/>
-          </a:prstGeom>
-          <a:solidFill>
-            <a:srgbClr val="646464"/>
-          </a:solidFill>
-          <a:ln>
-            <a:noFill/>
-          </a:ln>
-        </p:spPr>
-        <p:style>
-          <a:lnRef idx="1">
-            <a:schemeClr val="accent1"/>
-          </a:lnRef>
-          <a:fillRef idx="3">
-            <a:schemeClr val="accent1"/>
-          </a:fillRef>
-          <a:effectRef idx="2">
-            <a:schemeClr val="accent1"/>
-          </a:effectRef>
-          <a:fontRef idx="minor">
-            <a:schemeClr val="lt1"/>
-          </a:fontRef>
-        </p:style>
-        <p:txBody>
-          <a:bodyPr rtlCol="0" anchor="ctr"/>
-          <a:lstStyle/>
-          <a:p>
-            <a:pPr algn="ctr"/>
-          </a:p>
-        </p:txBody>
-      </p:sp>
-      <p:sp>
-        <p:nvSpPr>
-          <p:cNvPr id="22" name="Rectangle 21"/>
-          <p:cNvSpPr/>
-          <p:nvPr/>
-        </p:nvSpPr>
-        <p:spPr>
-          <a:xfrm>
-            <a:off x="1005838" y="2651752"/>
-            <a:ext cx="3" cy="640088"/>
-          </a:xfrm>
-          <a:prstGeom prst="rect">
-            <a:avLst/>
-          </a:prstGeom>
-          <a:solidFill>
-            <a:srgbClr val="646464"/>
-          </a:solidFill>
-          <a:ln>
-            <a:noFill/>
-          </a:ln>
-        </p:spPr>
-        <p:style>
-          <a:lnRef idx="1">
-            <a:schemeClr val="accent1"/>
-          </a:lnRef>
-          <a:fillRef idx="3">
-            <a:schemeClr val="accent1"/>
-          </a:fillRef>
-          <a:effectRef idx="2">
-            <a:schemeClr val="accent1"/>
-          </a:effectRef>
-          <a:fontRef idx="minor">
-            <a:schemeClr val="lt1"/>
-          </a:fontRef>
-        </p:style>
-        <p:txBody>
-          <a:bodyPr rtlCol="0" anchor="ctr"/>
-          <a:lstStyle/>
-          <a:p>
-            <a:pPr algn="ctr"/>
-          </a:p>
-        </p:txBody>
-      </p:sp>
-      <p:sp>
-        <p:nvSpPr>
-          <p:cNvPr id="23" name="Rectangle 22"/>
-          <p:cNvSpPr/>
-          <p:nvPr/>
-        </p:nvSpPr>
-        <p:spPr>
-          <a:xfrm>
-            <a:off x="5029198" y="2011680"/>
-            <a:ext cx="3" cy="640072"/>
-          </a:xfrm>
-          <a:prstGeom prst="rect">
-            <a:avLst/>
-          </a:prstGeom>
-          <a:solidFill>
-            <a:srgbClr val="646464"/>
-          </a:solidFill>
-          <a:ln>
-            <a:noFill/>
-          </a:ln>
-        </p:spPr>
-        <p:style>
-          <a:lnRef idx="1">
-            <a:schemeClr val="accent1"/>
-          </a:lnRef>
-          <a:fillRef idx="3">
-            <a:schemeClr val="accent1"/>
-          </a:fillRef>
-          <a:effectRef idx="2">
-            <a:schemeClr val="accent1"/>
-          </a:effectRef>
-          <a:fontRef idx="minor">
-            <a:schemeClr val="lt1"/>
-          </a:fontRef>
-        </p:style>
-        <p:txBody>
-          <a:bodyPr rtlCol="0" anchor="ctr"/>
-          <a:lstStyle/>
-          <a:p>
-            <a:pPr algn="ctr"/>
-          </a:p>
-        </p:txBody>
-      </p:sp>
-      <p:sp>
-        <p:nvSpPr>
-          <p:cNvPr id="24" name="Rectangle 23"/>
-          <p:cNvSpPr/>
-          <p:nvPr/>
-        </p:nvSpPr>
-        <p:spPr>
-          <a:xfrm>
-            <a:off x="3017520" y="2651750"/>
-            <a:ext cx="2011680" cy="3"/>
-          </a:xfrm>
-          <a:prstGeom prst="rect">
-            <a:avLst/>
-          </a:prstGeom>
-          <a:solidFill>
-            <a:srgbClr val="646464"/>
-          </a:solidFill>
-          <a:ln>
-            <a:noFill/>
-          </a:ln>
-        </p:spPr>
-        <p:style>
-          <a:lnRef idx="1">
-            <a:schemeClr val="accent1"/>
-          </a:lnRef>
-          <a:fillRef idx="3">
-            <a:schemeClr val="accent1"/>
-          </a:fillRef>
-          <a:effectRef idx="2">
-            <a:schemeClr val="accent1"/>
-          </a:effectRef>
-          <a:fontRef idx="minor">
-            <a:schemeClr val="lt1"/>
-          </a:fontRef>
-        </p:style>
-        <p:txBody>
-          <a:bodyPr rtlCol="0" anchor="ctr"/>
-          <a:lstStyle/>
-          <a:p>
-            <a:pPr algn="ctr"/>
-          </a:p>
-        </p:txBody>
-      </p:sp>
-      <p:sp>
-        <p:nvSpPr>
-          <p:cNvPr id="25" name="Rectangle 24"/>
-          <p:cNvSpPr/>
-          <p:nvPr/>
-        </p:nvSpPr>
-        <p:spPr>
-          <a:xfrm>
-            <a:off x="3017518" y="2651752"/>
-            <a:ext cx="3" cy="640088"/>
-          </a:xfrm>
-          <a:prstGeom prst="rect">
-            <a:avLst/>
-          </a:prstGeom>
-          <a:solidFill>
-            <a:srgbClr val="646464"/>
-          </a:solidFill>
-          <a:ln>
-            <a:noFill/>
-          </a:ln>
-        </p:spPr>
-        <p:style>
-          <a:lnRef idx="1">
-            <a:schemeClr val="accent1"/>
-          </a:lnRef>
-          <a:fillRef idx="3">
-            <a:schemeClr val="accent1"/>
-          </a:fillRef>
-          <a:effectRef idx="2">
-            <a:schemeClr val="accent1"/>
-          </a:effectRef>
-          <a:fontRef idx="minor">
-            <a:schemeClr val="lt1"/>
-          </a:fontRef>
-        </p:style>
-        <p:txBody>
-          <a:bodyPr rtlCol="0" anchor="ctr"/>
-          <a:lstStyle/>
-          <a:p>
-            <a:pPr algn="ctr"/>
-          </a:p>
-        </p:txBody>
-      </p:sp>
-      <p:sp>
-        <p:nvSpPr>
-          <p:cNvPr id="26" name="Rectangle 25"/>
-          <p:cNvSpPr/>
-          <p:nvPr/>
-        </p:nvSpPr>
-        <p:spPr>
-          <a:xfrm>
-            <a:off x="5029198" y="2011680"/>
-            <a:ext cx="3" cy="640072"/>
-          </a:xfrm>
-          <a:prstGeom prst="rect">
-            <a:avLst/>
-          </a:prstGeom>
-          <a:solidFill>
-            <a:srgbClr val="646464"/>
-          </a:solidFill>
-          <a:ln>
-            <a:noFill/>
-          </a:ln>
-        </p:spPr>
-        <p:style>
-          <a:lnRef idx="1">
-            <a:schemeClr val="accent1"/>
-          </a:lnRef>
-          <a:fillRef idx="3">
-            <a:schemeClr val="accent1"/>
-          </a:fillRef>
-          <a:effectRef idx="2">
-            <a:schemeClr val="accent1"/>
-          </a:effectRef>
-          <a:fontRef idx="minor">
-            <a:schemeClr val="lt1"/>
-          </a:fontRef>
-        </p:style>
-        <p:txBody>
-          <a:bodyPr rtlCol="0" anchor="ctr"/>
-          <a:lstStyle/>
-          <a:p>
-            <a:pPr algn="ctr"/>
-          </a:p>
-        </p:txBody>
-      </p:sp>
-      <p:sp>
-        <p:nvSpPr>
-          <p:cNvPr id="27" name="Rectangle 26"/>
-          <p:cNvSpPr/>
-          <p:nvPr/>
-        </p:nvSpPr>
-        <p:spPr>
-          <a:xfrm>
-            <a:off x="5029198" y="2651752"/>
-            <a:ext cx="3" cy="640088"/>
-          </a:xfrm>
-          <a:prstGeom prst="rect">
-            <a:avLst/>
-          </a:prstGeom>
-          <a:solidFill>
-            <a:srgbClr val="646464"/>
-          </a:solidFill>
-          <a:ln>
-            <a:noFill/>
-          </a:ln>
-        </p:spPr>
-        <p:style>
-          <a:lnRef idx="1">
-            <a:schemeClr val="accent1"/>
-          </a:lnRef>
-          <a:fillRef idx="3">
-            <a:schemeClr val="accent1"/>
-          </a:fillRef>
-          <a:effectRef idx="2">
-            <a:schemeClr val="accent1"/>
-          </a:effectRef>
-          <a:fontRef idx="minor">
-            <a:schemeClr val="lt1"/>
-          </a:fontRef>
-        </p:style>
-        <p:txBody>
-          <a:bodyPr rtlCol="0" anchor="ctr"/>
-          <a:lstStyle/>
-          <a:p>
-            <a:pPr algn="ctr"/>
-          </a:p>
-        </p:txBody>
-      </p:sp>
-      <p:sp>
-        <p:nvSpPr>
-          <p:cNvPr id="28" name="Rectangle 27"/>
-          <p:cNvSpPr/>
-          <p:nvPr/>
-        </p:nvSpPr>
-        <p:spPr>
-          <a:xfrm>
-            <a:off x="5029198" y="2011680"/>
-            <a:ext cx="3" cy="640072"/>
-          </a:xfrm>
-          <a:prstGeom prst="rect">
-            <a:avLst/>
-          </a:prstGeom>
-          <a:solidFill>
-            <a:srgbClr val="646464"/>
-          </a:solidFill>
-          <a:ln>
-            <a:noFill/>
-          </a:ln>
-        </p:spPr>
-        <p:style>
-          <a:lnRef idx="1">
-            <a:schemeClr val="accent1"/>
-          </a:lnRef>
-          <a:fillRef idx="3">
-            <a:schemeClr val="accent1"/>
-          </a:fillRef>
-          <a:effectRef idx="2">
-            <a:schemeClr val="accent1"/>
-          </a:effectRef>
-          <a:fontRef idx="minor">
-            <a:schemeClr val="lt1"/>
-          </a:fontRef>
-        </p:style>
-        <p:txBody>
-          <a:bodyPr rtlCol="0" anchor="ctr"/>
-          <a:lstStyle/>
-          <a:p>
-            <a:pPr algn="ctr"/>
-          </a:p>
-        </p:txBody>
-      </p:sp>
-      <p:sp>
-        <p:nvSpPr>
-          <p:cNvPr id="29" name="Rectangle 28"/>
-          <p:cNvSpPr/>
-          <p:nvPr/>
-        </p:nvSpPr>
-        <p:spPr>
-          <a:xfrm>
-            <a:off x="5029200" y="2651750"/>
-            <a:ext cx="2011680" cy="3"/>
-          </a:xfrm>
-          <a:prstGeom prst="rect">
-            <a:avLst/>
-          </a:prstGeom>
-          <a:solidFill>
-            <a:srgbClr val="646464"/>
-          </a:solidFill>
-          <a:ln>
-            <a:noFill/>
-          </a:ln>
-        </p:spPr>
-        <p:style>
-          <a:lnRef idx="1">
-            <a:schemeClr val="accent1"/>
-          </a:lnRef>
-          <a:fillRef idx="3">
-            <a:schemeClr val="accent1"/>
-          </a:fillRef>
-          <a:effectRef idx="2">
-            <a:schemeClr val="accent1"/>
-          </a:effectRef>
-          <a:fontRef idx="minor">
-            <a:schemeClr val="lt1"/>
-          </a:fontRef>
-        </p:style>
-        <p:txBody>
-          <a:bodyPr rtlCol="0" anchor="ctr"/>
-          <a:lstStyle/>
-          <a:p>
-            <a:pPr algn="ctr"/>
-          </a:p>
-        </p:txBody>
-      </p:sp>
-      <p:sp>
-        <p:nvSpPr>
-          <p:cNvPr id="30" name="Rectangle 29"/>
-          <p:cNvSpPr/>
-          <p:nvPr/>
-        </p:nvSpPr>
-        <p:spPr>
-          <a:xfrm>
-            <a:off x="7040878" y="2651752"/>
-            <a:ext cx="3" cy="640088"/>
-          </a:xfrm>
-          <a:prstGeom prst="rect">
-            <a:avLst/>
-          </a:prstGeom>
-          <a:solidFill>
-            <a:srgbClr val="646464"/>
-          </a:solidFill>
-          <a:ln>
-            <a:noFill/>
-          </a:ln>
-        </p:spPr>
-        <p:style>
-          <a:lnRef idx="1">
-            <a:schemeClr val="accent1"/>
-          </a:lnRef>
-          <a:fillRef idx="3">
-            <a:schemeClr val="accent1"/>
-          </a:fillRef>
-          <a:effectRef idx="2">
-            <a:schemeClr val="accent1"/>
-          </a:effectRef>
-          <a:fontRef idx="minor">
-            <a:schemeClr val="lt1"/>
-          </a:fontRef>
-        </p:style>
-        <p:txBody>
-          <a:bodyPr rtlCol="0" anchor="ctr"/>
-          <a:lstStyle/>
-          <a:p>
-            <a:pPr algn="ctr"/>
-          </a:p>
-        </p:txBody>
-      </p:sp>
-      <p:sp>
-        <p:nvSpPr>
-          <p:cNvPr id="31" name="Rectangle 30"/>
-          <p:cNvSpPr/>
-          <p:nvPr/>
-        </p:nvSpPr>
-        <p:spPr>
-          <a:xfrm>
-            <a:off x="5029198" y="2011680"/>
-            <a:ext cx="3" cy="640072"/>
-          </a:xfrm>
-          <a:prstGeom prst="rect">
-            <a:avLst/>
-          </a:prstGeom>
-          <a:solidFill>
-            <a:srgbClr val="646464"/>
-          </a:solidFill>
-          <a:ln>
-            <a:noFill/>
-          </a:ln>
-        </p:spPr>
-        <p:style>
-          <a:lnRef idx="1">
-            <a:schemeClr val="accent1"/>
-          </a:lnRef>
-          <a:fillRef idx="3">
-            <a:schemeClr val="accent1"/>
-          </a:fillRef>
-          <a:effectRef idx="2">
-            <a:schemeClr val="accent1"/>
-          </a:effectRef>
-          <a:fontRef idx="minor">
-            <a:schemeClr val="lt1"/>
-          </a:fontRef>
-        </p:style>
-        <p:txBody>
-          <a:bodyPr rtlCol="0" anchor="ctr"/>
-          <a:lstStyle/>
-          <a:p>
-            <a:pPr algn="ctr"/>
-          </a:p>
-        </p:txBody>
-      </p:sp>
-      <p:sp>
-        <p:nvSpPr>
-          <p:cNvPr id="32" name="Rectangle 31"/>
-          <p:cNvSpPr/>
-          <p:nvPr/>
-        </p:nvSpPr>
-        <p:spPr>
-          <a:xfrm>
-            <a:off x="5029200" y="2651750"/>
-            <a:ext cx="4023360" cy="3"/>
-          </a:xfrm>
-          <a:prstGeom prst="rect">
-            <a:avLst/>
-          </a:prstGeom>
-          <a:solidFill>
-            <a:srgbClr val="646464"/>
-          </a:solidFill>
-          <a:ln>
-            <a:noFill/>
-          </a:ln>
-        </p:spPr>
-        <p:style>
-          <a:lnRef idx="1">
-            <a:schemeClr val="accent1"/>
-          </a:lnRef>
-          <a:fillRef idx="3">
-            <a:schemeClr val="accent1"/>
-          </a:fillRef>
-          <a:effectRef idx="2">
-            <a:schemeClr val="accent1"/>
-          </a:effectRef>
-          <a:fontRef idx="minor">
-            <a:schemeClr val="lt1"/>
-          </a:fontRef>
-        </p:style>
-        <p:txBody>
-          <a:bodyPr rtlCol="0" anchor="ctr"/>
-          <a:lstStyle/>
-          <a:p>
-            <a:pPr algn="ctr"/>
-          </a:p>
-        </p:txBody>
-      </p:sp>
-      <p:sp>
-        <p:nvSpPr>
-          <p:cNvPr id="33" name="Rectangle 32"/>
-          <p:cNvSpPr/>
-          <p:nvPr/>
-        </p:nvSpPr>
-        <p:spPr>
-          <a:xfrm>
-            <a:off x="9052558" y="2651752"/>
-            <a:ext cx="3" cy="640088"/>
           </a:xfrm>
           <a:prstGeom prst="rect">
             <a:avLst/>
@@ -15094,7 +15094,7 @@
         <p:spPr>
           <a:xfrm>
             <a:off x="5029198" y="2011680"/>
-            <a:ext cx="3" cy="640080"/>
+            <a:ext cx="3" cy="640096"/>
           </a:xfrm>
           <a:prstGeom prst="rect">
             <a:avLst/>
@@ -15136,7 +15136,7 @@
         </p:nvSpPr>
         <p:spPr>
           <a:xfrm>
-            <a:off x="1342103" y="2651758"/>
+            <a:off x="1342103" y="2651774"/>
             <a:ext cx="3687096" cy="3"/>
           </a:xfrm>
           <a:prstGeom prst="rect">
@@ -15179,8 +15179,8 @@
         </p:nvSpPr>
         <p:spPr>
           <a:xfrm>
-            <a:off x="1342101" y="2651760"/>
-            <a:ext cx="3" cy="640080"/>
+            <a:off x="1342101" y="2651776"/>
+            <a:ext cx="3" cy="640064"/>
           </a:xfrm>
           <a:prstGeom prst="rect">
             <a:avLst/>
@@ -15223,7 +15223,7 @@
         <p:spPr>
           <a:xfrm>
             <a:off x="5029198" y="2011680"/>
-            <a:ext cx="3" cy="640080"/>
+            <a:ext cx="3" cy="640096"/>
           </a:xfrm>
           <a:prstGeom prst="rect">
             <a:avLst/>
@@ -15265,8 +15265,8 @@
         </p:nvSpPr>
         <p:spPr>
           <a:xfrm>
-            <a:off x="5029198" y="2651760"/>
-            <a:ext cx="3" cy="640080"/>
+            <a:off x="5029198" y="2651776"/>
+            <a:ext cx="3" cy="640064"/>
           </a:xfrm>
           <a:prstGeom prst="rect">
             <a:avLst/>
@@ -15309,7 +15309,7 @@
         <p:spPr>
           <a:xfrm>
             <a:off x="5029198" y="2011680"/>
-            <a:ext cx="3" cy="640080"/>
+            <a:ext cx="3" cy="640096"/>
           </a:xfrm>
           <a:prstGeom prst="rect">
             <a:avLst/>
@@ -15351,7 +15351,7 @@
         </p:nvSpPr>
         <p:spPr>
           <a:xfrm>
-            <a:off x="5029200" y="2651758"/>
+            <a:off x="5029200" y="2651774"/>
             <a:ext cx="3687096" cy="3"/>
           </a:xfrm>
           <a:prstGeom prst="rect">
@@ -15394,8 +15394,8 @@
         </p:nvSpPr>
         <p:spPr>
           <a:xfrm>
-            <a:off x="8716295" y="2651760"/>
-            <a:ext cx="3" cy="640080"/>
+            <a:off x="8716295" y="2651776"/>
+            <a:ext cx="3" cy="640064"/>
           </a:xfrm>
           <a:prstGeom prst="rect">
             <a:avLst/>
@@ -15701,7 +15701,7 @@
         <p:spPr>
           <a:xfrm>
             <a:off x="5029198" y="2011680"/>
-            <a:ext cx="3" cy="640096"/>
+            <a:ext cx="3" cy="640080"/>
           </a:xfrm>
           <a:prstGeom prst="rect">
             <a:avLst/>
@@ -15743,8 +15743,8 @@
         </p:nvSpPr>
         <p:spPr>
           <a:xfrm>
-            <a:off x="5029198" y="2651776"/>
-            <a:ext cx="3" cy="640064"/>
+            <a:off x="5029198" y="2651760"/>
+            <a:ext cx="3" cy="640080"/>
           </a:xfrm>
           <a:prstGeom prst="rect">
             <a:avLst/>

</xml_diff>